<commit_message>
changed my personal email
</commit_message>
<xml_diff>
--- a/cdc_git_ws1.pptx
+++ b/cdc_git_ws1.pptx
@@ -240,7 +240,7 @@
           <a:p>
             <a:fld id="{88EB923B-AC8F-4B84-A8E4-8B1F68B80157}" type="datetimeFigureOut">
               <a:rPr lang="en-US" smtClean="0"/>
-              <a:t>10/19/2016</a:t>
+              <a:t>10/20/2016</a:t>
             </a:fld>
             <a:endParaRPr lang="en-US"/>
           </a:p>
@@ -926,7 +926,7 @@
           <a:p>
             <a:fld id="{0C0B920D-9F26-4AE8-900D-2A69C73BB646}" type="datetimeFigureOut">
               <a:rPr lang="en-US" smtClean="0"/>
-              <a:t>10/19/2016</a:t>
+              <a:t>10/20/2016</a:t>
             </a:fld>
             <a:endParaRPr lang="en-US"/>
           </a:p>
@@ -1180,7 +1180,7 @@
           <a:p>
             <a:fld id="{0C0B920D-9F26-4AE8-900D-2A69C73BB646}" type="datetimeFigureOut">
               <a:rPr lang="en-US" smtClean="0"/>
-              <a:t>10/19/2016</a:t>
+              <a:t>10/20/2016</a:t>
             </a:fld>
             <a:endParaRPr lang="en-US"/>
           </a:p>
@@ -1418,7 +1418,7 @@
           <a:p>
             <a:fld id="{0C0B920D-9F26-4AE8-900D-2A69C73BB646}" type="datetimeFigureOut">
               <a:rPr lang="en-US" smtClean="0"/>
-              <a:t>10/19/2016</a:t>
+              <a:t>10/20/2016</a:t>
             </a:fld>
             <a:endParaRPr lang="en-US"/>
           </a:p>
@@ -1739,7 +1739,7 @@
           <a:p>
             <a:fld id="{0C0B920D-9F26-4AE8-900D-2A69C73BB646}" type="datetimeFigureOut">
               <a:rPr lang="en-US" smtClean="0"/>
-              <a:t>10/19/2016</a:t>
+              <a:t>10/20/2016</a:t>
             </a:fld>
             <a:endParaRPr lang="en-US"/>
           </a:p>
@@ -2005,7 +2005,7 @@
           <a:p>
             <a:fld id="{0C0B920D-9F26-4AE8-900D-2A69C73BB646}" type="datetimeFigureOut">
               <a:rPr lang="en-US" smtClean="0"/>
-              <a:t>10/19/2016</a:t>
+              <a:t>10/20/2016</a:t>
             </a:fld>
             <a:endParaRPr lang="en-US"/>
           </a:p>
@@ -2284,7 +2284,7 @@
           <a:p>
             <a:fld id="{0C0B920D-9F26-4AE8-900D-2A69C73BB646}" type="datetimeFigureOut">
               <a:rPr lang="en-US" smtClean="0"/>
-              <a:t>10/19/2016</a:t>
+              <a:t>10/20/2016</a:t>
             </a:fld>
             <a:endParaRPr lang="en-US"/>
           </a:p>
@@ -2765,12 +2765,6 @@
               </a:rPr>
               <a:t> </a:t>
             </a:r>
-            <a:endParaRPr lang="en-ID" b="1" dirty="0" smtClean="0">
-              <a:solidFill>
-                <a:srgbClr val="392900"/>
-              </a:solidFill>
-              <a:latin typeface="Bookman Old Style" panose="02050604050505020204" pitchFamily="18" charset="0"/>
-            </a:endParaRPr>
           </a:p>
           <a:p>
             <a:r>
@@ -2917,23 +2911,8 @@
                 </a:solidFill>
                 <a:latin typeface="Bookman Old Style" panose="02050604050505020204" pitchFamily="18" charset="0"/>
               </a:rPr>
-              <a:t>CDC – git merging / Part II – </a:t>
-            </a:r>
-            <a:r>
-              <a:rPr lang="en-ID" b="1" dirty="0" smtClean="0">
-                <a:solidFill>
-                  <a:srgbClr val="392900"/>
-                </a:solidFill>
-                <a:latin typeface="Bookman Old Style" panose="02050604050505020204" pitchFamily="18" charset="0"/>
-              </a:rPr>
-              <a:t>“Final Check!” </a:t>
-            </a:r>
-            <a:endParaRPr lang="en-ID" b="1" dirty="0" smtClean="0">
-              <a:solidFill>
-                <a:srgbClr val="392900"/>
-              </a:solidFill>
-              <a:latin typeface="Bookman Old Style" panose="02050604050505020204" pitchFamily="18" charset="0"/>
-            </a:endParaRPr>
+              <a:t>CDC – git merging / Part II – “Final Check!” </a:t>
+            </a:r>
           </a:p>
           <a:p>
             <a:endParaRPr lang="en-US" b="1" dirty="0">
@@ -3031,21 +3010,7 @@
                 <a:latin typeface="Courier New" panose="02070309020205020404" pitchFamily="49" charset="0"/>
                 <a:cs typeface="Courier New" panose="02070309020205020404" pitchFamily="49" charset="0"/>
               </a:rPr>
-              <a:t>git log --online --dec</a:t>
-            </a:r>
-            <a:r>
-              <a:rPr lang="en-ID" sz="1200" dirty="0" smtClean="0">
-                <a:latin typeface="Courier New" panose="02070309020205020404" pitchFamily="49" charset="0"/>
-                <a:cs typeface="Courier New" panose="02070309020205020404" pitchFamily="49" charset="0"/>
-              </a:rPr>
-              <a:t>orate</a:t>
-            </a:r>
-            <a:r>
-              <a:rPr lang="en-ID" sz="1200" dirty="0" smtClean="0">
-                <a:latin typeface="Courier New" panose="02070309020205020404" pitchFamily="49" charset="0"/>
-                <a:cs typeface="Courier New" panose="02070309020205020404" pitchFamily="49" charset="0"/>
-              </a:rPr>
-              <a:t> –graph --all</a:t>
+              <a:t>git log --online --decorate –graph --all</a:t>
             </a:r>
             <a:endParaRPr lang="en-US" sz="1200" dirty="0"/>
           </a:p>
@@ -3376,41 +3341,8 @@
                 </a:solidFill>
                 <a:latin typeface="Bookman Old Style" panose="02050604050505020204" pitchFamily="18" charset="0"/>
               </a:rPr>
-              <a:t>CDC – git merging / Part </a:t>
-            </a:r>
-            <a:r>
-              <a:rPr lang="en-ID" b="1" dirty="0" smtClean="0">
-                <a:solidFill>
-                  <a:srgbClr val="392900"/>
-                </a:solidFill>
-                <a:latin typeface="Bookman Old Style" panose="02050604050505020204" pitchFamily="18" charset="0"/>
-              </a:rPr>
-              <a:t>III </a:t>
-            </a:r>
-            <a:r>
-              <a:rPr lang="en-ID" b="1" dirty="0" smtClean="0">
-                <a:solidFill>
-                  <a:srgbClr val="392900"/>
-                </a:solidFill>
-                <a:latin typeface="Bookman Old Style" panose="02050604050505020204" pitchFamily="18" charset="0"/>
-              </a:rPr>
-              <a:t>– </a:t>
-            </a:r>
-            <a:r>
-              <a:rPr lang="en-ID" b="1" dirty="0" smtClean="0">
-                <a:solidFill>
-                  <a:srgbClr val="392900"/>
-                </a:solidFill>
-                <a:latin typeface="Bookman Old Style" panose="02050604050505020204" pitchFamily="18" charset="0"/>
-              </a:rPr>
-              <a:t>“Merge conflicts” </a:t>
-            </a:r>
-            <a:endParaRPr lang="en-ID" b="1" dirty="0" smtClean="0">
-              <a:solidFill>
-                <a:srgbClr val="392900"/>
-              </a:solidFill>
-              <a:latin typeface="Bookman Old Style" panose="02050604050505020204" pitchFamily="18" charset="0"/>
-            </a:endParaRPr>
+              <a:t>CDC – git merging / Part III – “Merge conflicts” </a:t>
+            </a:r>
           </a:p>
           <a:p>
             <a:endParaRPr lang="en-US" b="1" dirty="0">
@@ -3652,41 +3584,8 @@
                 </a:solidFill>
                 <a:latin typeface="Bookman Old Style" panose="02050604050505020204" pitchFamily="18" charset="0"/>
               </a:rPr>
-              <a:t>CDC – git merging / Part </a:t>
-            </a:r>
-            <a:r>
-              <a:rPr lang="en-ID" b="1" dirty="0" smtClean="0">
-                <a:solidFill>
-                  <a:srgbClr val="392900"/>
-                </a:solidFill>
-                <a:latin typeface="Bookman Old Style" panose="02050604050505020204" pitchFamily="18" charset="0"/>
-              </a:rPr>
-              <a:t>III </a:t>
-            </a:r>
-            <a:r>
-              <a:rPr lang="en-ID" b="1" dirty="0" smtClean="0">
-                <a:solidFill>
-                  <a:srgbClr val="392900"/>
-                </a:solidFill>
-                <a:latin typeface="Bookman Old Style" panose="02050604050505020204" pitchFamily="18" charset="0"/>
-              </a:rPr>
-              <a:t>– </a:t>
-            </a:r>
-            <a:r>
-              <a:rPr lang="en-ID" b="1" dirty="0" smtClean="0">
-                <a:solidFill>
-                  <a:srgbClr val="392900"/>
-                </a:solidFill>
-                <a:latin typeface="Bookman Old Style" panose="02050604050505020204" pitchFamily="18" charset="0"/>
-              </a:rPr>
-              <a:t>“Merge Theory” </a:t>
-            </a:r>
-            <a:endParaRPr lang="en-ID" b="1" dirty="0" smtClean="0">
-              <a:solidFill>
-                <a:srgbClr val="392900"/>
-              </a:solidFill>
-              <a:latin typeface="Bookman Old Style" panose="02050604050505020204" pitchFamily="18" charset="0"/>
-            </a:endParaRPr>
+              <a:t>CDC – git merging / Part III – “Merge Theory” </a:t>
+            </a:r>
           </a:p>
           <a:p>
             <a:endParaRPr lang="en-US" b="1" dirty="0">
@@ -4033,41 +3932,8 @@
                 </a:solidFill>
                 <a:latin typeface="Bookman Old Style" panose="02050604050505020204" pitchFamily="18" charset="0"/>
               </a:rPr>
-              <a:t>CDC – git merging / Part </a:t>
-            </a:r>
-            <a:r>
-              <a:rPr lang="en-ID" b="1" dirty="0" smtClean="0">
-                <a:solidFill>
-                  <a:srgbClr val="392900"/>
-                </a:solidFill>
-                <a:latin typeface="Bookman Old Style" panose="02050604050505020204" pitchFamily="18" charset="0"/>
-              </a:rPr>
-              <a:t>III </a:t>
-            </a:r>
-            <a:r>
-              <a:rPr lang="en-ID" b="1" dirty="0" smtClean="0">
-                <a:solidFill>
-                  <a:srgbClr val="392900"/>
-                </a:solidFill>
-                <a:latin typeface="Bookman Old Style" panose="02050604050505020204" pitchFamily="18" charset="0"/>
-              </a:rPr>
-              <a:t>– </a:t>
-            </a:r>
-            <a:r>
-              <a:rPr lang="en-ID" b="1" dirty="0" smtClean="0">
-                <a:solidFill>
-                  <a:srgbClr val="392900"/>
-                </a:solidFill>
-                <a:latin typeface="Bookman Old Style" panose="02050604050505020204" pitchFamily="18" charset="0"/>
-              </a:rPr>
-              <a:t>“Merge Theory” </a:t>
-            </a:r>
-            <a:endParaRPr lang="en-ID" b="1" dirty="0" smtClean="0">
-              <a:solidFill>
-                <a:srgbClr val="392900"/>
-              </a:solidFill>
-              <a:latin typeface="Bookman Old Style" panose="02050604050505020204" pitchFamily="18" charset="0"/>
-            </a:endParaRPr>
+              <a:t>CDC – git merging / Part III – “Merge Theory” </a:t>
+            </a:r>
           </a:p>
           <a:p>
             <a:endParaRPr lang="en-US" b="1" dirty="0">
@@ -4360,41 +4226,8 @@
                 </a:solidFill>
                 <a:latin typeface="Bookman Old Style" panose="02050604050505020204" pitchFamily="18" charset="0"/>
               </a:rPr>
-              <a:t>CDC – git merging / Part </a:t>
-            </a:r>
-            <a:r>
-              <a:rPr lang="en-ID" b="1" dirty="0" smtClean="0">
-                <a:solidFill>
-                  <a:srgbClr val="392900"/>
-                </a:solidFill>
-                <a:latin typeface="Bookman Old Style" panose="02050604050505020204" pitchFamily="18" charset="0"/>
-              </a:rPr>
-              <a:t>III </a:t>
-            </a:r>
-            <a:r>
-              <a:rPr lang="en-ID" b="1" dirty="0" smtClean="0">
-                <a:solidFill>
-                  <a:srgbClr val="392900"/>
-                </a:solidFill>
-                <a:latin typeface="Bookman Old Style" panose="02050604050505020204" pitchFamily="18" charset="0"/>
-              </a:rPr>
-              <a:t>– </a:t>
-            </a:r>
-            <a:r>
-              <a:rPr lang="en-ID" b="1" dirty="0" smtClean="0">
-                <a:solidFill>
-                  <a:srgbClr val="392900"/>
-                </a:solidFill>
-                <a:latin typeface="Bookman Old Style" panose="02050604050505020204" pitchFamily="18" charset="0"/>
-              </a:rPr>
-              <a:t>“Rebase – Why?” </a:t>
-            </a:r>
-            <a:endParaRPr lang="en-ID" b="1" dirty="0" smtClean="0">
-              <a:solidFill>
-                <a:srgbClr val="392900"/>
-              </a:solidFill>
-              <a:latin typeface="Bookman Old Style" panose="02050604050505020204" pitchFamily="18" charset="0"/>
-            </a:endParaRPr>
+              <a:t>CDC – git merging / Part III – “Rebase – Why?” </a:t>
+            </a:r>
           </a:p>
           <a:p>
             <a:endParaRPr lang="en-US" b="1" dirty="0">
@@ -4541,23 +4374,8 @@
                 </a:solidFill>
                 <a:latin typeface="Bookman Old Style" panose="02050604050505020204" pitchFamily="18" charset="0"/>
               </a:rPr>
-              <a:t>CDC – git merging / </a:t>
-            </a:r>
-            <a:r>
-              <a:rPr lang="en-ID" b="1" dirty="0" smtClean="0">
-                <a:solidFill>
-                  <a:srgbClr val="392900"/>
-                </a:solidFill>
-                <a:latin typeface="Bookman Old Style" panose="02050604050505020204" pitchFamily="18" charset="0"/>
-              </a:rPr>
-              <a:t>Theory </a:t>
-            </a:r>
-            <a:endParaRPr lang="en-ID" b="1" dirty="0" smtClean="0">
-              <a:solidFill>
-                <a:srgbClr val="392900"/>
-              </a:solidFill>
-              <a:latin typeface="Bookman Old Style" panose="02050604050505020204" pitchFamily="18" charset="0"/>
-            </a:endParaRPr>
+              <a:t>CDC – git merging / Theory </a:t>
+            </a:r>
           </a:p>
           <a:p>
             <a:r>
@@ -4644,23 +4462,8 @@
                 </a:solidFill>
                 <a:latin typeface="Bookman Old Style" panose="02050604050505020204" pitchFamily="18" charset="0"/>
               </a:rPr>
-              <a:t>CDC – git merging / </a:t>
-            </a:r>
-            <a:r>
-              <a:rPr lang="en-ID" b="1" dirty="0" smtClean="0">
-                <a:solidFill>
-                  <a:srgbClr val="392900"/>
-                </a:solidFill>
-                <a:latin typeface="Bookman Old Style" panose="02050604050505020204" pitchFamily="18" charset="0"/>
-              </a:rPr>
-              <a:t>Theory </a:t>
-            </a:r>
-            <a:endParaRPr lang="en-ID" b="1" dirty="0" smtClean="0">
-              <a:solidFill>
-                <a:srgbClr val="392900"/>
-              </a:solidFill>
-              <a:latin typeface="Bookman Old Style" panose="02050604050505020204" pitchFamily="18" charset="0"/>
-            </a:endParaRPr>
+              <a:t>CDC – git merging / Theory </a:t>
+            </a:r>
           </a:p>
           <a:p>
             <a:r>
@@ -4989,23 +4792,8 @@
                 </a:solidFill>
                 <a:latin typeface="Bookman Old Style" panose="02050604050505020204" pitchFamily="18" charset="0"/>
               </a:rPr>
-              <a:t>CDC – git merging / </a:t>
-            </a:r>
-            <a:r>
-              <a:rPr lang="en-ID" b="1" dirty="0" smtClean="0">
-                <a:solidFill>
-                  <a:srgbClr val="392900"/>
-                </a:solidFill>
-                <a:latin typeface="Bookman Old Style" panose="02050604050505020204" pitchFamily="18" charset="0"/>
-              </a:rPr>
-              <a:t>Theory </a:t>
-            </a:r>
-            <a:endParaRPr lang="en-ID" b="1" dirty="0" smtClean="0">
-              <a:solidFill>
-                <a:srgbClr val="392900"/>
-              </a:solidFill>
-              <a:latin typeface="Bookman Old Style" panose="02050604050505020204" pitchFamily="18" charset="0"/>
-            </a:endParaRPr>
+              <a:t>CDC – git merging / Theory </a:t>
+            </a:r>
           </a:p>
           <a:p>
             <a:r>
@@ -5113,12 +4901,6 @@
               </a:rPr>
               <a:t>Environment!</a:t>
             </a:r>
-            <a:endParaRPr lang="en-ID" b="1" dirty="0" smtClean="0">
-              <a:solidFill>
-                <a:srgbClr val="392900"/>
-              </a:solidFill>
-              <a:latin typeface="Bookman Old Style" panose="02050604050505020204" pitchFamily="18" charset="0"/>
-            </a:endParaRPr>
           </a:p>
           <a:p>
             <a:endParaRPr lang="en-US" b="1" dirty="0">
@@ -5182,13 +4964,8 @@
             </a:pPr>
             <a:r>
               <a:rPr lang="en-ID" dirty="0" smtClean="0"/>
-              <a:t>You agreed to a task/feature </a:t>
-            </a:r>
-            <a:r>
-              <a:rPr lang="en-ID" dirty="0" smtClean="0"/>
-              <a:t>and have no idea</a:t>
-            </a:r>
-            <a:endParaRPr lang="en-ID" dirty="0" smtClean="0"/>
+              <a:t>You agreed to a task/feature and have no idea</a:t>
+            </a:r>
           </a:p>
           <a:p>
             <a:pPr marL="1200150" lvl="2" indent="-285750">
@@ -5432,12 +5209,6 @@
               </a:rPr>
               <a:t>Requirements!</a:t>
             </a:r>
-            <a:endParaRPr lang="en-ID" b="1" dirty="0" smtClean="0">
-              <a:solidFill>
-                <a:srgbClr val="392900"/>
-              </a:solidFill>
-              <a:latin typeface="Bookman Old Style" panose="02050604050505020204" pitchFamily="18" charset="0"/>
-            </a:endParaRPr>
           </a:p>
           <a:p>
             <a:endParaRPr lang="en-US" b="1" dirty="0">
@@ -5487,11 +5258,7 @@
             </a:pPr>
             <a:r>
               <a:rPr lang="en-ID" dirty="0" smtClean="0"/>
-              <a:t>Existing </a:t>
-            </a:r>
-            <a:r>
-              <a:rPr lang="en-ID" dirty="0" smtClean="0"/>
-              <a:t>Github account</a:t>
+              <a:t>Existing Github account</a:t>
             </a:r>
           </a:p>
           <a:p>
@@ -5643,12 +5410,6 @@
               </a:rPr>
               <a:t>Configuration!</a:t>
             </a:r>
-            <a:endParaRPr lang="en-ID" b="1" dirty="0" smtClean="0">
-              <a:solidFill>
-                <a:srgbClr val="392900"/>
-              </a:solidFill>
-              <a:latin typeface="Bookman Old Style" panose="02050604050505020204" pitchFamily="18" charset="0"/>
-            </a:endParaRPr>
           </a:p>
           <a:p>
             <a:endParaRPr lang="en-US" b="1" dirty="0">
@@ -5919,18 +5680,11 @@
               <a:t>$git </a:t>
             </a:r>
             <a:r>
-              <a:rPr lang="en-ID" sz="1200" dirty="0" err="1">
-                <a:latin typeface="Courier New" panose="02070309020205020404" pitchFamily="49" charset="0"/>
-                <a:cs typeface="Courier New" panose="02070309020205020404" pitchFamily="49" charset="0"/>
-              </a:rPr>
-              <a:t>config</a:t>
-            </a:r>
-            <a:r>
               <a:rPr lang="en-ID" sz="1200" dirty="0">
                 <a:latin typeface="Courier New" panose="02070309020205020404" pitchFamily="49" charset="0"/>
                 <a:cs typeface="Courier New" panose="02070309020205020404" pitchFamily="49" charset="0"/>
               </a:rPr>
-              <a:t> </a:t>
+              <a:t>config </a:t>
             </a:r>
             <a:r>
               <a:rPr lang="en-ID" sz="1200" dirty="0" smtClean="0">
@@ -5944,21 +5698,14 @@
                 <a:latin typeface="Courier New" panose="02070309020205020404" pitchFamily="49" charset="0"/>
                 <a:cs typeface="Courier New" panose="02070309020205020404" pitchFamily="49" charset="0"/>
               </a:rPr>
-              <a:t>user.name “Thomas </a:t>
-            </a:r>
-            <a:r>
-              <a:rPr lang="en-ID" sz="1200" dirty="0" err="1">
-                <a:latin typeface="Courier New" panose="02070309020205020404" pitchFamily="49" charset="0"/>
-                <a:cs typeface="Courier New" panose="02070309020205020404" pitchFamily="49" charset="0"/>
-              </a:rPr>
-              <a:t>Rothe</a:t>
+              <a:t>user.name </a:t>
             </a:r>
             <a:r>
               <a:rPr lang="en-ID" sz="1200" dirty="0" smtClean="0">
                 <a:latin typeface="Courier New" panose="02070309020205020404" pitchFamily="49" charset="0"/>
                 <a:cs typeface="Courier New" panose="02070309020205020404" pitchFamily="49" charset="0"/>
               </a:rPr>
-              <a:t>”</a:t>
+              <a:t>“Ben Kenobi”</a:t>
             </a:r>
             <a:endParaRPr lang="en-ID" sz="1200" dirty="0">
               <a:latin typeface="Courier New" panose="02070309020205020404" pitchFamily="49" charset="0"/>
@@ -5974,31 +5721,24 @@
               <a:t>$git </a:t>
             </a:r>
             <a:r>
+              <a:rPr lang="en-ID" sz="1200" dirty="0">
+                <a:latin typeface="Courier New" panose="02070309020205020404" pitchFamily="49" charset="0"/>
+                <a:cs typeface="Courier New" panose="02070309020205020404" pitchFamily="49" charset="0"/>
+              </a:rPr>
+              <a:t>config --global </a:t>
+            </a:r>
+            <a:r>
               <a:rPr lang="en-ID" sz="1200" dirty="0" err="1">
                 <a:latin typeface="Courier New" panose="02070309020205020404" pitchFamily="49" charset="0"/>
                 <a:cs typeface="Courier New" panose="02070309020205020404" pitchFamily="49" charset="0"/>
               </a:rPr>
-              <a:t>config</a:t>
+              <a:t>user.email</a:t>
             </a:r>
             <a:r>
               <a:rPr lang="en-ID" sz="1200" dirty="0">
                 <a:latin typeface="Courier New" panose="02070309020205020404" pitchFamily="49" charset="0"/>
                 <a:cs typeface="Courier New" panose="02070309020205020404" pitchFamily="49" charset="0"/>
               </a:rPr>
-              <a:t> --global </a:t>
-            </a:r>
-            <a:r>
-              <a:rPr lang="en-ID" sz="1200" dirty="0" err="1">
-                <a:latin typeface="Courier New" panose="02070309020205020404" pitchFamily="49" charset="0"/>
-                <a:cs typeface="Courier New" panose="02070309020205020404" pitchFamily="49" charset="0"/>
-              </a:rPr>
-              <a:t>user.email</a:t>
-            </a:r>
-            <a:r>
-              <a:rPr lang="en-ID" sz="1200" dirty="0">
-                <a:latin typeface="Courier New" panose="02070309020205020404" pitchFamily="49" charset="0"/>
-                <a:cs typeface="Courier New" panose="02070309020205020404" pitchFamily="49" charset="0"/>
-              </a:rPr>
               <a:t> </a:t>
             </a:r>
             <a:r>
@@ -6006,7 +5746,28 @@
                 <a:latin typeface="Courier New" panose="02070309020205020404" pitchFamily="49" charset="0"/>
                 <a:cs typeface="Courier New" panose="02070309020205020404" pitchFamily="49" charset="0"/>
               </a:rPr>
-              <a:t>"thomas.rothe@mitrais.com"</a:t>
+              <a:t>“</a:t>
+            </a:r>
+            <a:r>
+              <a:rPr lang="en-ID" sz="1200" dirty="0" smtClean="0">
+                <a:latin typeface="Courier New" panose="02070309020205020404" pitchFamily="49" charset="0"/>
+                <a:cs typeface="Courier New" panose="02070309020205020404" pitchFamily="49" charset="0"/>
+              </a:rPr>
+              <a:t>ben</a:t>
+            </a:r>
+            <a:r>
+              <a:rPr lang="en-ID" sz="1200" dirty="0" smtClean="0">
+                <a:latin typeface="Courier New" panose="02070309020205020404" pitchFamily="49" charset="0"/>
+                <a:cs typeface="Courier New" panose="02070309020205020404" pitchFamily="49" charset="0"/>
+              </a:rPr>
+              <a:t>.kenobi@jedi.com</a:t>
+            </a:r>
+            <a:r>
+              <a:rPr lang="en-ID" sz="1200" dirty="0" smtClean="0">
+                <a:latin typeface="Courier New" panose="02070309020205020404" pitchFamily="49" charset="0"/>
+                <a:cs typeface="Courier New" panose="02070309020205020404" pitchFamily="49" charset="0"/>
+              </a:rPr>
+              <a:t>"</a:t>
             </a:r>
           </a:p>
           <a:p>
@@ -6309,25 +6070,7 @@
                 </a:solidFill>
                 <a:latin typeface="Bookman Old Style" panose="02050604050505020204" pitchFamily="18" charset="0"/>
               </a:rPr>
-              <a:t>CDC – git merging / Part II – “The </a:t>
-            </a:r>
-            <a:r>
-              <a:rPr lang="en-ID" b="1" dirty="0" smtClean="0">
-                <a:solidFill>
-                  <a:srgbClr val="392900"/>
-                </a:solidFill>
-                <a:latin typeface="Bookman Old Style" panose="02050604050505020204" pitchFamily="18" charset="0"/>
-              </a:rPr>
-              <a:t>Daily Work</a:t>
-            </a:r>
-            <a:r>
-              <a:rPr lang="en-ID" b="1" dirty="0" smtClean="0">
-                <a:solidFill>
-                  <a:srgbClr val="392900"/>
-                </a:solidFill>
-                <a:latin typeface="Bookman Old Style" panose="02050604050505020204" pitchFamily="18" charset="0"/>
-              </a:rPr>
-              <a:t>” </a:t>
+              <a:t>CDC – git merging / Part II – “The Daily Work” </a:t>
             </a:r>
           </a:p>
           <a:p>
@@ -6750,25 +6493,7 @@
                 </a:solidFill>
                 <a:latin typeface="Bookman Old Style" panose="02050604050505020204" pitchFamily="18" charset="0"/>
               </a:rPr>
-              <a:t>CDC – git merging / Part II – “Work </a:t>
-            </a:r>
-            <a:r>
-              <a:rPr lang="en-ID" b="1" dirty="0" smtClean="0">
-                <a:solidFill>
-                  <a:srgbClr val="392900"/>
-                </a:solidFill>
-                <a:latin typeface="Bookman Old Style" panose="02050604050505020204" pitchFamily="18" charset="0"/>
-              </a:rPr>
-              <a:t>Done</a:t>
-            </a:r>
-            <a:r>
-              <a:rPr lang="en-ID" b="1" dirty="0" smtClean="0">
-                <a:solidFill>
-                  <a:srgbClr val="392900"/>
-                </a:solidFill>
-                <a:latin typeface="Bookman Old Style" panose="02050604050505020204" pitchFamily="18" charset="0"/>
-              </a:rPr>
-              <a:t>!” </a:t>
+              <a:t>CDC – git merging / Part II – “Work Done!” </a:t>
             </a:r>
           </a:p>
           <a:p>
@@ -7818,18 +7543,18 @@
 </file>
 
 <file path=customXml/item2.xml><?xml version="1.0" encoding="utf-8"?>
-<p:properties xmlns:p="http://schemas.microsoft.com/office/2006/metadata/properties" xmlns:xsi="http://www.w3.org/2001/XMLSchema-instance" xmlns:pc="http://schemas.microsoft.com/office/infopath/2007/PartnerControls">
-  <documentManagement/>
-</p:properties>
-</file>
-
-<file path=customXml/item3.xml><?xml version="1.0" encoding="utf-8"?>
 <?mso-contentType ?>
 <FormTemplates xmlns="http://schemas.microsoft.com/sharepoint/v3/contenttype/forms">
   <Display>DocumentLibraryForm</Display>
   <Edit>DocumentLibraryForm</Edit>
   <New>DocumentLibraryForm</New>
 </FormTemplates>
+</file>
+
+<file path=customXml/item3.xml><?xml version="1.0" encoding="utf-8"?>
+<p:properties xmlns:p="http://schemas.microsoft.com/office/2006/metadata/properties" xmlns:xsi="http://www.w3.org/2001/XMLSchema-instance" xmlns:pc="http://schemas.microsoft.com/office/infopath/2007/PartnerControls">
+  <documentManagement/>
+</p:properties>
 </file>
 
 <file path=customXml/itemProps1.xml><?xml version="1.0" encoding="utf-8"?>
@@ -7849,6 +7574,14 @@
 </file>
 
 <file path=customXml/itemProps2.xml><?xml version="1.0" encoding="utf-8"?>
+<ds:datastoreItem xmlns:ds="http://schemas.openxmlformats.org/officeDocument/2006/customXml" ds:itemID="{DB5E681D-860B-4D22-80CF-C7472F8C312F}">
+  <ds:schemaRefs>
+    <ds:schemaRef ds:uri="http://schemas.microsoft.com/sharepoint/v3/contenttype/forms"/>
+  </ds:schemaRefs>
+</ds:datastoreItem>
+</file>
+
+<file path=customXml/itemProps3.xml><?xml version="1.0" encoding="utf-8"?>
 <ds:datastoreItem xmlns:ds="http://schemas.openxmlformats.org/officeDocument/2006/customXml" ds:itemID="{12B43294-76B4-4246-849F-628E6870A5FD}">
   <ds:schemaRefs>
     <ds:schemaRef ds:uri="http://purl.org/dc/elements/1.1/"/>
@@ -7861,12 +7594,4 @@
     <ds:schemaRef ds:uri="http://purl.org/dc/dcmitype/"/>
   </ds:schemaRefs>
 </ds:datastoreItem>
-</file>
-
-<file path=customXml/itemProps3.xml><?xml version="1.0" encoding="utf-8"?>
-<ds:datastoreItem xmlns:ds="http://schemas.openxmlformats.org/officeDocument/2006/customXml" ds:itemID="{DB5E681D-860B-4D22-80CF-C7472F8C312F}">
-  <ds:schemaRefs>
-    <ds:schemaRef ds:uri="http://schemas.microsoft.com/sharepoint/v3/contenttype/forms"/>
-  </ds:schemaRefs>
-</ds:datastoreItem>
 </file>
</xml_diff>

<commit_message>
changed workflow to basic merge and took rebase as additional
</commit_message>
<xml_diff>
--- a/cdc_git_ws1.pptx
+++ b/cdc_git_ws1.pptx
@@ -5,7 +5,7 @@
     <p:sldMasterId id="2147483648" r:id="rId4"/>
   </p:sldMasterIdLst>
   <p:notesMasterIdLst>
-    <p:notesMasterId r:id="rId19"/>
+    <p:notesMasterId r:id="rId21"/>
   </p:notesMasterIdLst>
   <p:sldIdLst>
     <p:sldId id="256" r:id="rId5"/>
@@ -18,10 +18,12 @@
     <p:sldId id="300" r:id="rId12"/>
     <p:sldId id="301" r:id="rId13"/>
     <p:sldId id="302" r:id="rId14"/>
-    <p:sldId id="303" r:id="rId15"/>
-    <p:sldId id="304" r:id="rId16"/>
-    <p:sldId id="307" r:id="rId17"/>
+    <p:sldId id="308" r:id="rId15"/>
+    <p:sldId id="307" r:id="rId16"/>
+    <p:sldId id="304" r:id="rId17"/>
     <p:sldId id="306" r:id="rId18"/>
+    <p:sldId id="309" r:id="rId19"/>
+    <p:sldId id="310" r:id="rId20"/>
   </p:sldIdLst>
   <p:sldSz cx="6858000" cy="5143500"/>
   <p:notesSz cx="6858000" cy="9144000"/>
@@ -240,7 +242,7 @@
           <a:p>
             <a:fld id="{88EB923B-AC8F-4B84-A8E4-8B1F68B80157}" type="datetimeFigureOut">
               <a:rPr lang="en-US" smtClean="0"/>
-              <a:t>10/20/2016</a:t>
+              <a:t>10/24/2016</a:t>
             </a:fld>
             <a:endParaRPr lang="en-US"/>
           </a:p>
@@ -704,6 +706,563 @@
 </p:notes>
 </file>
 
+<file path=ppt/notesSlides/notesSlide3.xml><?xml version="1.0" encoding="utf-8"?>
+<p:notes xmlns:a="http://schemas.openxmlformats.org/drawingml/2006/main" xmlns:r="http://schemas.openxmlformats.org/officeDocument/2006/relationships" xmlns:p="http://schemas.openxmlformats.org/presentationml/2006/main">
+  <p:cSld>
+    <p:spTree>
+      <p:nvGrpSpPr>
+        <p:cNvPr id="1" name=""/>
+        <p:cNvGrpSpPr/>
+        <p:nvPr/>
+      </p:nvGrpSpPr>
+      <p:grpSpPr>
+        <a:xfrm>
+          <a:off x="0" y="0"/>
+          <a:ext cx="0" cy="0"/>
+          <a:chOff x="0" y="0"/>
+          <a:chExt cx="0" cy="0"/>
+        </a:xfrm>
+      </p:grpSpPr>
+      <p:sp>
+        <p:nvSpPr>
+          <p:cNvPr id="2" name="Slide Image Placeholder 1"/>
+          <p:cNvSpPr>
+            <a:spLocks noGrp="1" noRot="1" noChangeAspect="1"/>
+          </p:cNvSpPr>
+          <p:nvPr>
+            <p:ph type="sldImg"/>
+          </p:nvPr>
+        </p:nvSpPr>
+        <p:spPr/>
+      </p:sp>
+      <p:sp>
+        <p:nvSpPr>
+          <p:cNvPr id="3" name="Notes Placeholder 2"/>
+          <p:cNvSpPr>
+            <a:spLocks noGrp="1"/>
+          </p:cNvSpPr>
+          <p:nvPr>
+            <p:ph type="body" idx="1"/>
+          </p:nvPr>
+        </p:nvSpPr>
+        <p:spPr/>
+        <p:txBody>
+          <a:bodyPr/>
+          <a:lstStyle/>
+          <a:p>
+            <a:endParaRPr lang="en-US" dirty="0"/>
+          </a:p>
+        </p:txBody>
+      </p:sp>
+      <p:sp>
+        <p:nvSpPr>
+          <p:cNvPr id="4" name="Slide Number Placeholder 3"/>
+          <p:cNvSpPr>
+            <a:spLocks noGrp="1"/>
+          </p:cNvSpPr>
+          <p:nvPr>
+            <p:ph type="sldNum" sz="quarter" idx="10"/>
+          </p:nvPr>
+        </p:nvSpPr>
+        <p:spPr/>
+        <p:txBody>
+          <a:bodyPr/>
+          <a:lstStyle/>
+          <a:p>
+            <a:fld id="{7959948B-77FA-4B75-B65F-C5051F11C89F}" type="slidenum">
+              <a:rPr lang="en-US" smtClean="0"/>
+              <a:t>8</a:t>
+            </a:fld>
+            <a:endParaRPr lang="en-US"/>
+          </a:p>
+        </p:txBody>
+      </p:sp>
+    </p:spTree>
+    <p:extLst>
+      <p:ext uri="{BB962C8B-B14F-4D97-AF65-F5344CB8AC3E}">
+        <p14:creationId xmlns:p14="http://schemas.microsoft.com/office/powerpoint/2010/main" val="1234506666"/>
+      </p:ext>
+    </p:extLst>
+  </p:cSld>
+  <p:clrMapOvr>
+    <a:masterClrMapping/>
+  </p:clrMapOvr>
+</p:notes>
+</file>
+
+<file path=ppt/notesSlides/notesSlide4.xml><?xml version="1.0" encoding="utf-8"?>
+<p:notes xmlns:a="http://schemas.openxmlformats.org/drawingml/2006/main" xmlns:r="http://schemas.openxmlformats.org/officeDocument/2006/relationships" xmlns:p="http://schemas.openxmlformats.org/presentationml/2006/main">
+  <p:cSld>
+    <p:spTree>
+      <p:nvGrpSpPr>
+        <p:cNvPr id="1" name=""/>
+        <p:cNvGrpSpPr/>
+        <p:nvPr/>
+      </p:nvGrpSpPr>
+      <p:grpSpPr>
+        <a:xfrm>
+          <a:off x="0" y="0"/>
+          <a:ext cx="0" cy="0"/>
+          <a:chOff x="0" y="0"/>
+          <a:chExt cx="0" cy="0"/>
+        </a:xfrm>
+      </p:grpSpPr>
+      <p:sp>
+        <p:nvSpPr>
+          <p:cNvPr id="2" name="Slide Image Placeholder 1"/>
+          <p:cNvSpPr>
+            <a:spLocks noGrp="1" noRot="1" noChangeAspect="1"/>
+          </p:cNvSpPr>
+          <p:nvPr>
+            <p:ph type="sldImg"/>
+          </p:nvPr>
+        </p:nvSpPr>
+        <p:spPr/>
+      </p:sp>
+      <p:sp>
+        <p:nvSpPr>
+          <p:cNvPr id="3" name="Notes Placeholder 2"/>
+          <p:cNvSpPr>
+            <a:spLocks noGrp="1"/>
+          </p:cNvSpPr>
+          <p:nvPr>
+            <p:ph type="body" idx="1"/>
+          </p:nvPr>
+        </p:nvSpPr>
+        <p:spPr/>
+        <p:txBody>
+          <a:bodyPr/>
+          <a:lstStyle/>
+          <a:p>
+            <a:r>
+              <a:rPr lang="en-ID" dirty="0" smtClean="0"/>
+              <a:t>Feature</a:t>
+            </a:r>
+            <a:r>
+              <a:rPr lang="en-ID" baseline="0" dirty="0" smtClean="0"/>
+              <a:t> branch is local!</a:t>
+            </a:r>
+            <a:endParaRPr lang="en-ID" dirty="0" smtClean="0"/>
+          </a:p>
+          <a:p>
+            <a:pPr marL="171450" indent="-171450">
+              <a:buFontTx/>
+              <a:buChar char="-"/>
+            </a:pPr>
+            <a:r>
+              <a:rPr lang="en-ID" dirty="0" smtClean="0"/>
+              <a:t>Focus on –no-</a:t>
+            </a:r>
+            <a:r>
+              <a:rPr lang="en-ID" dirty="0" err="1" smtClean="0"/>
+              <a:t>ff</a:t>
+            </a:r>
+            <a:r>
+              <a:rPr lang="en-ID" dirty="0" smtClean="0"/>
+              <a:t> </a:t>
+            </a:r>
+          </a:p>
+          <a:p>
+            <a:pPr marL="171450" indent="-171450">
+              <a:buFontTx/>
+              <a:buChar char="-"/>
+            </a:pPr>
+            <a:r>
+              <a:rPr lang="en-ID" dirty="0" smtClean="0"/>
+              <a:t>Don’t</a:t>
+            </a:r>
+            <a:r>
+              <a:rPr lang="en-ID" baseline="0" dirty="0" smtClean="0"/>
+              <a:t> forget to push back … </a:t>
+            </a:r>
+            <a:endParaRPr lang="en-US" dirty="0"/>
+          </a:p>
+        </p:txBody>
+      </p:sp>
+      <p:sp>
+        <p:nvSpPr>
+          <p:cNvPr id="4" name="Slide Number Placeholder 3"/>
+          <p:cNvSpPr>
+            <a:spLocks noGrp="1"/>
+          </p:cNvSpPr>
+          <p:nvPr>
+            <p:ph type="sldNum" sz="quarter" idx="10"/>
+          </p:nvPr>
+        </p:nvSpPr>
+        <p:spPr/>
+        <p:txBody>
+          <a:bodyPr/>
+          <a:lstStyle/>
+          <a:p>
+            <a:fld id="{7959948B-77FA-4B75-B65F-C5051F11C89F}" type="slidenum">
+              <a:rPr lang="en-US" smtClean="0"/>
+              <a:t>9</a:t>
+            </a:fld>
+            <a:endParaRPr lang="en-US"/>
+          </a:p>
+        </p:txBody>
+      </p:sp>
+    </p:spTree>
+    <p:extLst>
+      <p:ext uri="{BB962C8B-B14F-4D97-AF65-F5344CB8AC3E}">
+        <p14:creationId xmlns:p14="http://schemas.microsoft.com/office/powerpoint/2010/main" val="2087103439"/>
+      </p:ext>
+    </p:extLst>
+  </p:cSld>
+  <p:clrMapOvr>
+    <a:masterClrMapping/>
+  </p:clrMapOvr>
+</p:notes>
+</file>
+
+<file path=ppt/notesSlides/notesSlide5.xml><?xml version="1.0" encoding="utf-8"?>
+<p:notes xmlns:a="http://schemas.openxmlformats.org/drawingml/2006/main" xmlns:r="http://schemas.openxmlformats.org/officeDocument/2006/relationships" xmlns:p="http://schemas.openxmlformats.org/presentationml/2006/main">
+  <p:cSld>
+    <p:spTree>
+      <p:nvGrpSpPr>
+        <p:cNvPr id="1" name=""/>
+        <p:cNvGrpSpPr/>
+        <p:nvPr/>
+      </p:nvGrpSpPr>
+      <p:grpSpPr>
+        <a:xfrm>
+          <a:off x="0" y="0"/>
+          <a:ext cx="0" cy="0"/>
+          <a:chOff x="0" y="0"/>
+          <a:chExt cx="0" cy="0"/>
+        </a:xfrm>
+      </p:grpSpPr>
+      <p:sp>
+        <p:nvSpPr>
+          <p:cNvPr id="2" name="Slide Image Placeholder 1"/>
+          <p:cNvSpPr>
+            <a:spLocks noGrp="1" noRot="1" noChangeAspect="1"/>
+          </p:cNvSpPr>
+          <p:nvPr>
+            <p:ph type="sldImg"/>
+          </p:nvPr>
+        </p:nvSpPr>
+        <p:spPr/>
+      </p:sp>
+      <p:sp>
+        <p:nvSpPr>
+          <p:cNvPr id="3" name="Notes Placeholder 2"/>
+          <p:cNvSpPr>
+            <a:spLocks noGrp="1"/>
+          </p:cNvSpPr>
+          <p:nvPr>
+            <p:ph type="body" idx="1"/>
+          </p:nvPr>
+        </p:nvSpPr>
+        <p:spPr/>
+        <p:txBody>
+          <a:bodyPr/>
+          <a:lstStyle/>
+          <a:p>
+            <a:endParaRPr lang="en-US" dirty="0"/>
+          </a:p>
+        </p:txBody>
+      </p:sp>
+      <p:sp>
+        <p:nvSpPr>
+          <p:cNvPr id="4" name="Slide Number Placeholder 3"/>
+          <p:cNvSpPr>
+            <a:spLocks noGrp="1"/>
+          </p:cNvSpPr>
+          <p:nvPr>
+            <p:ph type="sldNum" sz="quarter" idx="10"/>
+          </p:nvPr>
+        </p:nvSpPr>
+        <p:spPr/>
+        <p:txBody>
+          <a:bodyPr/>
+          <a:lstStyle/>
+          <a:p>
+            <a:fld id="{7959948B-77FA-4B75-B65F-C5051F11C89F}" type="slidenum">
+              <a:rPr lang="en-US" smtClean="0"/>
+              <a:t>13</a:t>
+            </a:fld>
+            <a:endParaRPr lang="en-US"/>
+          </a:p>
+        </p:txBody>
+      </p:sp>
+    </p:spTree>
+    <p:extLst>
+      <p:ext uri="{BB962C8B-B14F-4D97-AF65-F5344CB8AC3E}">
+        <p14:creationId xmlns:p14="http://schemas.microsoft.com/office/powerpoint/2010/main" val="613651284"/>
+      </p:ext>
+    </p:extLst>
+  </p:cSld>
+  <p:clrMapOvr>
+    <a:masterClrMapping/>
+  </p:clrMapOvr>
+</p:notes>
+</file>
+
+<file path=ppt/notesSlides/notesSlide6.xml><?xml version="1.0" encoding="utf-8"?>
+<p:notes xmlns:a="http://schemas.openxmlformats.org/drawingml/2006/main" xmlns:r="http://schemas.openxmlformats.org/officeDocument/2006/relationships" xmlns:p="http://schemas.openxmlformats.org/presentationml/2006/main">
+  <p:cSld>
+    <p:spTree>
+      <p:nvGrpSpPr>
+        <p:cNvPr id="1" name=""/>
+        <p:cNvGrpSpPr/>
+        <p:nvPr/>
+      </p:nvGrpSpPr>
+      <p:grpSpPr>
+        <a:xfrm>
+          <a:off x="0" y="0"/>
+          <a:ext cx="0" cy="0"/>
+          <a:chOff x="0" y="0"/>
+          <a:chExt cx="0" cy="0"/>
+        </a:xfrm>
+      </p:grpSpPr>
+      <p:sp>
+        <p:nvSpPr>
+          <p:cNvPr id="2" name="Slide Image Placeholder 1"/>
+          <p:cNvSpPr>
+            <a:spLocks noGrp="1" noRot="1" noChangeAspect="1"/>
+          </p:cNvSpPr>
+          <p:nvPr>
+            <p:ph type="sldImg"/>
+          </p:nvPr>
+        </p:nvSpPr>
+        <p:spPr/>
+      </p:sp>
+      <p:sp>
+        <p:nvSpPr>
+          <p:cNvPr id="3" name="Notes Placeholder 2"/>
+          <p:cNvSpPr>
+            <a:spLocks noGrp="1"/>
+          </p:cNvSpPr>
+          <p:nvPr>
+            <p:ph type="body" idx="1"/>
+          </p:nvPr>
+        </p:nvSpPr>
+        <p:spPr/>
+        <p:txBody>
+          <a:bodyPr/>
+          <a:lstStyle/>
+          <a:p>
+            <a:r>
+              <a:rPr lang="en-US" b="1" dirty="0" smtClean="0"/>
+              <a:t>Rebasing Deletes Merge Commits!</a:t>
+            </a:r>
+            <a:endParaRPr lang="en-US" dirty="0"/>
+          </a:p>
+        </p:txBody>
+      </p:sp>
+      <p:sp>
+        <p:nvSpPr>
+          <p:cNvPr id="4" name="Slide Number Placeholder 3"/>
+          <p:cNvSpPr>
+            <a:spLocks noGrp="1"/>
+          </p:cNvSpPr>
+          <p:nvPr>
+            <p:ph type="sldNum" sz="quarter" idx="10"/>
+          </p:nvPr>
+        </p:nvSpPr>
+        <p:spPr/>
+        <p:txBody>
+          <a:bodyPr/>
+          <a:lstStyle/>
+          <a:p>
+            <a:fld id="{7959948B-77FA-4B75-B65F-C5051F11C89F}" type="slidenum">
+              <a:rPr lang="en-US" smtClean="0"/>
+              <a:t>14</a:t>
+            </a:fld>
+            <a:endParaRPr lang="en-US"/>
+          </a:p>
+        </p:txBody>
+      </p:sp>
+    </p:spTree>
+    <p:extLst>
+      <p:ext uri="{BB962C8B-B14F-4D97-AF65-F5344CB8AC3E}">
+        <p14:creationId xmlns:p14="http://schemas.microsoft.com/office/powerpoint/2010/main" val="2801166786"/>
+      </p:ext>
+    </p:extLst>
+  </p:cSld>
+  <p:clrMapOvr>
+    <a:masterClrMapping/>
+  </p:clrMapOvr>
+</p:notes>
+</file>
+
+<file path=ppt/notesSlides/notesSlide7.xml><?xml version="1.0" encoding="utf-8"?>
+<p:notes xmlns:a="http://schemas.openxmlformats.org/drawingml/2006/main" xmlns:r="http://schemas.openxmlformats.org/officeDocument/2006/relationships" xmlns:p="http://schemas.openxmlformats.org/presentationml/2006/main">
+  <p:cSld>
+    <p:spTree>
+      <p:nvGrpSpPr>
+        <p:cNvPr id="1" name=""/>
+        <p:cNvGrpSpPr/>
+        <p:nvPr/>
+      </p:nvGrpSpPr>
+      <p:grpSpPr>
+        <a:xfrm>
+          <a:off x="0" y="0"/>
+          <a:ext cx="0" cy="0"/>
+          <a:chOff x="0" y="0"/>
+          <a:chExt cx="0" cy="0"/>
+        </a:xfrm>
+      </p:grpSpPr>
+      <p:sp>
+        <p:nvSpPr>
+          <p:cNvPr id="2" name="Slide Image Placeholder 1"/>
+          <p:cNvSpPr>
+            <a:spLocks noGrp="1" noRot="1" noChangeAspect="1"/>
+          </p:cNvSpPr>
+          <p:nvPr>
+            <p:ph type="sldImg"/>
+          </p:nvPr>
+        </p:nvSpPr>
+        <p:spPr/>
+      </p:sp>
+      <p:sp>
+        <p:nvSpPr>
+          <p:cNvPr id="3" name="Notes Placeholder 2"/>
+          <p:cNvSpPr>
+            <a:spLocks noGrp="1"/>
+          </p:cNvSpPr>
+          <p:nvPr>
+            <p:ph type="body" idx="1"/>
+          </p:nvPr>
+        </p:nvSpPr>
+        <p:spPr/>
+        <p:txBody>
+          <a:bodyPr/>
+          <a:lstStyle/>
+          <a:p>
+            <a:r>
+              <a:rPr lang="en-US" b="1" dirty="0" smtClean="0"/>
+              <a:t>Rebasing Deletes Merge Commits!</a:t>
+            </a:r>
+            <a:endParaRPr lang="en-US" dirty="0"/>
+          </a:p>
+        </p:txBody>
+      </p:sp>
+      <p:sp>
+        <p:nvSpPr>
+          <p:cNvPr id="4" name="Slide Number Placeholder 3"/>
+          <p:cNvSpPr>
+            <a:spLocks noGrp="1"/>
+          </p:cNvSpPr>
+          <p:nvPr>
+            <p:ph type="sldNum" sz="quarter" idx="10"/>
+          </p:nvPr>
+        </p:nvSpPr>
+        <p:spPr/>
+        <p:txBody>
+          <a:bodyPr/>
+          <a:lstStyle/>
+          <a:p>
+            <a:fld id="{7959948B-77FA-4B75-B65F-C5051F11C89F}" type="slidenum">
+              <a:rPr lang="en-US" smtClean="0"/>
+              <a:t>15</a:t>
+            </a:fld>
+            <a:endParaRPr lang="en-US"/>
+          </a:p>
+        </p:txBody>
+      </p:sp>
+    </p:spTree>
+    <p:extLst>
+      <p:ext uri="{BB962C8B-B14F-4D97-AF65-F5344CB8AC3E}">
+        <p14:creationId xmlns:p14="http://schemas.microsoft.com/office/powerpoint/2010/main" val="647520961"/>
+      </p:ext>
+    </p:extLst>
+  </p:cSld>
+  <p:clrMapOvr>
+    <a:masterClrMapping/>
+  </p:clrMapOvr>
+</p:notes>
+</file>
+
+<file path=ppt/notesSlides/notesSlide8.xml><?xml version="1.0" encoding="utf-8"?>
+<p:notes xmlns:a="http://schemas.openxmlformats.org/drawingml/2006/main" xmlns:r="http://schemas.openxmlformats.org/officeDocument/2006/relationships" xmlns:p="http://schemas.openxmlformats.org/presentationml/2006/main">
+  <p:cSld>
+    <p:spTree>
+      <p:nvGrpSpPr>
+        <p:cNvPr id="1" name=""/>
+        <p:cNvGrpSpPr/>
+        <p:nvPr/>
+      </p:nvGrpSpPr>
+      <p:grpSpPr>
+        <a:xfrm>
+          <a:off x="0" y="0"/>
+          <a:ext cx="0" cy="0"/>
+          <a:chOff x="0" y="0"/>
+          <a:chExt cx="0" cy="0"/>
+        </a:xfrm>
+      </p:grpSpPr>
+      <p:sp>
+        <p:nvSpPr>
+          <p:cNvPr id="2" name="Slide Image Placeholder 1"/>
+          <p:cNvSpPr>
+            <a:spLocks noGrp="1" noRot="1" noChangeAspect="1"/>
+          </p:cNvSpPr>
+          <p:nvPr>
+            <p:ph type="sldImg"/>
+          </p:nvPr>
+        </p:nvSpPr>
+        <p:spPr/>
+      </p:sp>
+      <p:sp>
+        <p:nvSpPr>
+          <p:cNvPr id="3" name="Notes Placeholder 2"/>
+          <p:cNvSpPr>
+            <a:spLocks noGrp="1"/>
+          </p:cNvSpPr>
+          <p:nvPr>
+            <p:ph type="body" idx="1"/>
+          </p:nvPr>
+        </p:nvSpPr>
+        <p:spPr/>
+        <p:txBody>
+          <a:bodyPr/>
+          <a:lstStyle/>
+          <a:p>
+            <a:r>
+              <a:rPr lang="en-US" b="1" dirty="0" smtClean="0"/>
+              <a:t>Rebasing Deletes Merge Commits!</a:t>
+            </a:r>
+            <a:endParaRPr lang="en-US" dirty="0"/>
+          </a:p>
+        </p:txBody>
+      </p:sp>
+      <p:sp>
+        <p:nvSpPr>
+          <p:cNvPr id="4" name="Slide Number Placeholder 3"/>
+          <p:cNvSpPr>
+            <a:spLocks noGrp="1"/>
+          </p:cNvSpPr>
+          <p:nvPr>
+            <p:ph type="sldNum" sz="quarter" idx="10"/>
+          </p:nvPr>
+        </p:nvSpPr>
+        <p:spPr/>
+        <p:txBody>
+          <a:bodyPr/>
+          <a:lstStyle/>
+          <a:p>
+            <a:fld id="{7959948B-77FA-4B75-B65F-C5051F11C89F}" type="slidenum">
+              <a:rPr lang="en-US" smtClean="0"/>
+              <a:t>16</a:t>
+            </a:fld>
+            <a:endParaRPr lang="en-US"/>
+          </a:p>
+        </p:txBody>
+      </p:sp>
+    </p:spTree>
+    <p:extLst>
+      <p:ext uri="{BB962C8B-B14F-4D97-AF65-F5344CB8AC3E}">
+        <p14:creationId xmlns:p14="http://schemas.microsoft.com/office/powerpoint/2010/main" val="1837064347"/>
+      </p:ext>
+    </p:extLst>
+  </p:cSld>
+  <p:clrMapOvr>
+    <a:masterClrMapping/>
+  </p:clrMapOvr>
+</p:notes>
+</file>
+
 <file path=ppt/slideLayouts/slideLayout1.xml><?xml version="1.0" encoding="utf-8"?>
 <p:sldLayout xmlns:a="http://schemas.openxmlformats.org/drawingml/2006/main" xmlns:r="http://schemas.openxmlformats.org/officeDocument/2006/relationships" xmlns:p="http://schemas.openxmlformats.org/presentationml/2006/main" type="title" preserve="1">
   <p:cSld name="Title Slide">
@@ -926,7 +1485,7 @@
           <a:p>
             <a:fld id="{0C0B920D-9F26-4AE8-900D-2A69C73BB646}" type="datetimeFigureOut">
               <a:rPr lang="en-US" smtClean="0"/>
-              <a:t>10/20/2016</a:t>
+              <a:t>10/24/2016</a:t>
             </a:fld>
             <a:endParaRPr lang="en-US"/>
           </a:p>
@@ -1180,7 +1739,7 @@
           <a:p>
             <a:fld id="{0C0B920D-9F26-4AE8-900D-2A69C73BB646}" type="datetimeFigureOut">
               <a:rPr lang="en-US" smtClean="0"/>
-              <a:t>10/20/2016</a:t>
+              <a:t>10/24/2016</a:t>
             </a:fld>
             <a:endParaRPr lang="en-US"/>
           </a:p>
@@ -1418,7 +1977,7 @@
           <a:p>
             <a:fld id="{0C0B920D-9F26-4AE8-900D-2A69C73BB646}" type="datetimeFigureOut">
               <a:rPr lang="en-US" smtClean="0"/>
-              <a:t>10/20/2016</a:t>
+              <a:t>10/24/2016</a:t>
             </a:fld>
             <a:endParaRPr lang="en-US"/>
           </a:p>
@@ -1739,7 +2298,7 @@
           <a:p>
             <a:fld id="{0C0B920D-9F26-4AE8-900D-2A69C73BB646}" type="datetimeFigureOut">
               <a:rPr lang="en-US" smtClean="0"/>
-              <a:t>10/20/2016</a:t>
+              <a:t>10/24/2016</a:t>
             </a:fld>
             <a:endParaRPr lang="en-US"/>
           </a:p>
@@ -2005,7 +2564,7 @@
           <a:p>
             <a:fld id="{0C0B920D-9F26-4AE8-900D-2A69C73BB646}" type="datetimeFigureOut">
               <a:rPr lang="en-US" smtClean="0"/>
-              <a:t>10/20/2016</a:t>
+              <a:t>10/24/2016</a:t>
             </a:fld>
             <a:endParaRPr lang="en-US"/>
           </a:p>
@@ -2284,7 +2843,7 @@
           <a:p>
             <a:fld id="{0C0B920D-9F26-4AE8-900D-2A69C73BB646}" type="datetimeFigureOut">
               <a:rPr lang="en-US" smtClean="0"/>
-              <a:t>10/20/2016</a:t>
+              <a:t>10/24/2016</a:t>
             </a:fld>
             <a:endParaRPr lang="en-US"/>
           </a:p>
@@ -2891,7 +3450,7 @@
         <p:spPr>
           <a:xfrm>
             <a:off x="332656" y="195486"/>
-            <a:ext cx="5976664" cy="646331"/>
+            <a:ext cx="5976664" cy="369332"/>
           </a:xfrm>
           <a:prstGeom prst="rect">
             <a:avLst/>
@@ -2912,53 +3471,6 @@
                 <a:latin typeface="Bookman Old Style" panose="02050604050505020204" pitchFamily="18" charset="0"/>
               </a:rPr>
               <a:t>CDC – git merging / Part II – “Final Check!” </a:t>
-            </a:r>
-          </a:p>
-          <a:p>
-            <a:endParaRPr lang="en-US" b="1" dirty="0">
-              <a:solidFill>
-                <a:srgbClr val="392900"/>
-              </a:solidFill>
-              <a:latin typeface="Bookman Old Style" panose="02050604050505020204" pitchFamily="18" charset="0"/>
-            </a:endParaRPr>
-          </a:p>
-        </p:txBody>
-      </p:sp>
-      <p:sp>
-        <p:nvSpPr>
-          <p:cNvPr id="6" name="TextBox 5"/>
-          <p:cNvSpPr txBox="1"/>
-          <p:nvPr/>
-        </p:nvSpPr>
-        <p:spPr>
-          <a:xfrm>
-            <a:off x="4149080" y="4240875"/>
-            <a:ext cx="2808312" cy="369332"/>
-          </a:xfrm>
-          <a:prstGeom prst="rect">
-            <a:avLst/>
-          </a:prstGeom>
-          <a:noFill/>
-        </p:spPr>
-        <p:txBody>
-          <a:bodyPr wrap="square" rtlCol="0">
-            <a:spAutoFit/>
-          </a:bodyPr>
-          <a:lstStyle/>
-          <a:p>
-            <a:r>
-              <a:rPr lang="en-ID" dirty="0" smtClean="0">
-                <a:ln w="0"/>
-                <a:effectLst>
-                  <a:outerShdw blurRad="38100" dist="19050" dir="2700000" algn="tl" rotWithShape="0">
-                    <a:schemeClr val="dk1">
-                      <a:alpha val="40000"/>
-                    </a:schemeClr>
-                  </a:outerShdw>
-                </a:effectLst>
-                <a:latin typeface="Berlin Sans FB" panose="020E0602020502020306" pitchFamily="34" charset="0"/>
-              </a:rPr>
-              <a:t>“The shell is my friend!”</a:t>
             </a:r>
           </a:p>
         </p:txBody>
@@ -3054,7 +3566,7 @@
         </p:nvSpPr>
         <p:spPr>
           <a:xfrm>
-            <a:off x="336676" y="2474638"/>
+            <a:off x="336676" y="2682965"/>
             <a:ext cx="1200970" cy="369332"/>
           </a:xfrm>
           <a:prstGeom prst="rect">
@@ -3122,8 +3634,8 @@
         </p:nvSpPr>
         <p:spPr>
           <a:xfrm>
-            <a:off x="336676" y="2774571"/>
-            <a:ext cx="5243102" cy="1477328"/>
+            <a:off x="336676" y="3052297"/>
+            <a:ext cx="6332684" cy="923330"/>
           </a:xfrm>
           <a:prstGeom prst="rect">
             <a:avLst/>
@@ -3131,7 +3643,7 @@
           <a:noFill/>
         </p:spPr>
         <p:txBody>
-          <a:bodyPr wrap="none" rtlCol="0">
+          <a:bodyPr wrap="square" rtlCol="0">
             <a:spAutoFit/>
           </a:bodyPr>
           <a:lstStyle/>
@@ -3142,7 +3654,7 @@
             </a:pPr>
             <a:r>
               <a:rPr lang="en-ID" dirty="0" smtClean="0"/>
-              <a:t>I got a merge error while rebase, </a:t>
+              <a:t>I got a merge error, </a:t>
             </a:r>
             <a:r>
               <a:rPr lang="en-ID" dirty="0" err="1" smtClean="0"/>
@@ -3151,26 +3663,6 @@
             <a:r>
               <a:rPr lang="en-ID" dirty="0" smtClean="0"/>
               <a:t> HELP!!</a:t>
-            </a:r>
-          </a:p>
-          <a:p>
-            <a:pPr marL="742950" lvl="1" indent="-285750">
-              <a:buFont typeface="Arial" panose="020B0604020202020204" pitchFamily="34" charset="0"/>
-              <a:buChar char="•"/>
-            </a:pPr>
-            <a:r>
-              <a:rPr lang="en-ID" dirty="0" smtClean="0"/>
-              <a:t>1. Solve conflicts</a:t>
-            </a:r>
-          </a:p>
-          <a:p>
-            <a:pPr marL="742950" lvl="1" indent="-285750">
-              <a:buFont typeface="Arial" panose="020B0604020202020204" pitchFamily="34" charset="0"/>
-              <a:buChar char="•"/>
-            </a:pPr>
-            <a:r>
-              <a:rPr lang="en-ID" dirty="0" smtClean="0"/>
-              <a:t>2. Continue rebase</a:t>
             </a:r>
           </a:p>
           <a:p>
@@ -3180,7 +3672,11 @@
             </a:pPr>
             <a:r>
               <a:rPr lang="en-ID" dirty="0" smtClean="0"/>
-              <a:t>Holy, what is </a:t>
+              <a:t>Holy</a:t>
+            </a:r>
+            <a:r>
+              <a:rPr lang="en-ID" dirty="0" smtClean="0"/>
+              <a:t>, what is </a:t>
             </a:r>
             <a:r>
               <a:rPr lang="en-ID" i="1" dirty="0" smtClean="0"/>
@@ -3202,9 +3698,8 @@
             </a:pPr>
             <a:r>
               <a:rPr lang="en-ID" dirty="0" smtClean="0"/>
-              <a:t>Rebase first and then merge, why .. I don’t get it ??</a:t>
-            </a:r>
-            <a:endParaRPr lang="en-US" dirty="0"/>
+              <a:t>So what’s rebase and when to use?</a:t>
+            </a:r>
           </a:p>
         </p:txBody>
       </p:sp>
@@ -3275,6 +3770,106 @@
           </a:p>
         </p:txBody>
       </p:sp>
+      <p:sp>
+        <p:nvSpPr>
+          <p:cNvPr id="10" name="TextBox 9"/>
+          <p:cNvSpPr txBox="1"/>
+          <p:nvPr/>
+        </p:nvSpPr>
+        <p:spPr>
+          <a:xfrm>
+            <a:off x="919219" y="4154312"/>
+            <a:ext cx="2652136" cy="307777"/>
+          </a:xfrm>
+          <a:prstGeom prst="rect">
+            <a:avLst/>
+          </a:prstGeom>
+          <a:solidFill>
+            <a:srgbClr val="C00000"/>
+          </a:solidFill>
+        </p:spPr>
+        <p:txBody>
+          <a:bodyPr wrap="none" rtlCol="0">
+            <a:spAutoFit/>
+          </a:bodyPr>
+          <a:lstStyle/>
+          <a:p>
+            <a:r>
+              <a:rPr lang="en-ID" sz="1400" dirty="0" smtClean="0">
+                <a:solidFill>
+                  <a:srgbClr val="FFC000"/>
+                </a:solidFill>
+              </a:rPr>
+              <a:t>Lets jump for a second in theory…</a:t>
+            </a:r>
+            <a:endParaRPr lang="en-US" sz="1400" dirty="0">
+              <a:solidFill>
+                <a:srgbClr val="FFC000"/>
+              </a:solidFill>
+            </a:endParaRPr>
+          </a:p>
+        </p:txBody>
+      </p:sp>
+      <p:pic>
+        <p:nvPicPr>
+          <p:cNvPr id="15" name="Picture 14"/>
+          <p:cNvPicPr>
+            <a:picLocks noChangeAspect="1"/>
+          </p:cNvPicPr>
+          <p:nvPr/>
+        </p:nvPicPr>
+        <p:blipFill>
+          <a:blip r:embed="rId3" cstate="print">
+            <a:extLst>
+              <a:ext uri="{28A0092B-C50C-407E-A947-70E740481C1C}">
+                <a14:useLocalDpi xmlns:a14="http://schemas.microsoft.com/office/drawing/2010/main" val="0"/>
+              </a:ext>
+            </a:extLst>
+          </a:blip>
+          <a:stretch>
+            <a:fillRect/>
+          </a:stretch>
+        </p:blipFill>
+        <p:spPr>
+          <a:xfrm>
+            <a:off x="328932" y="4002201"/>
+            <a:ext cx="612000" cy="612000"/>
+          </a:xfrm>
+          <a:prstGeom prst="rect">
+            <a:avLst/>
+          </a:prstGeom>
+        </p:spPr>
+      </p:pic>
+      <p:pic>
+        <p:nvPicPr>
+          <p:cNvPr id="6" name="Picture 5"/>
+          <p:cNvPicPr>
+            <a:picLocks noChangeAspect="1"/>
+          </p:cNvPicPr>
+          <p:nvPr/>
+        </p:nvPicPr>
+        <p:blipFill>
+          <a:blip r:embed="rId4" cstate="print">
+            <a:extLst>
+              <a:ext uri="{28A0092B-C50C-407E-A947-70E740481C1C}">
+                <a14:useLocalDpi xmlns:a14="http://schemas.microsoft.com/office/drawing/2010/main" val="0"/>
+              </a:ext>
+            </a:extLst>
+          </a:blip>
+          <a:stretch>
+            <a:fillRect/>
+          </a:stretch>
+        </p:blipFill>
+        <p:spPr>
+          <a:xfrm>
+            <a:off x="421216" y="4092200"/>
+            <a:ext cx="432000" cy="432000"/>
+          </a:xfrm>
+          <a:prstGeom prst="rect">
+            <a:avLst/>
+          </a:prstGeom>
+        </p:spPr>
+      </p:pic>
     </p:spTree>
     <p:extLst>
       <p:ext uri="{BB962C8B-B14F-4D97-AF65-F5344CB8AC3E}">
@@ -3321,7 +3916,7 @@
         <p:spPr>
           <a:xfrm>
             <a:off x="332656" y="195486"/>
-            <a:ext cx="5976664" cy="646331"/>
+            <a:ext cx="5976664" cy="369332"/>
           </a:xfrm>
           <a:prstGeom prst="rect">
             <a:avLst/>
@@ -3343,14 +3938,6 @@
               </a:rPr>
               <a:t>CDC – git merging / Part III – “Merge conflicts” </a:t>
             </a:r>
-          </a:p>
-          <a:p>
-            <a:endParaRPr lang="en-US" b="1" dirty="0">
-              <a:solidFill>
-                <a:srgbClr val="392900"/>
-              </a:solidFill>
-              <a:latin typeface="Bookman Old Style" panose="02050604050505020204" pitchFamily="18" charset="0"/>
-            </a:endParaRPr>
           </a:p>
         </p:txBody>
       </p:sp>
@@ -3415,7 +4002,7 @@
         </p:blipFill>
         <p:spPr>
           <a:xfrm>
-            <a:off x="1556792" y="987574"/>
+            <a:off x="1406463" y="1059582"/>
             <a:ext cx="3829050" cy="1190625"/>
           </a:xfrm>
           <a:prstGeom prst="rect">
@@ -3425,14 +4012,56 @@
       </p:pic>
       <p:sp>
         <p:nvSpPr>
-          <p:cNvPr id="12" name="TextBox 11"/>
+          <p:cNvPr id="7" name="TextBox 6"/>
           <p:cNvSpPr txBox="1"/>
           <p:nvPr/>
         </p:nvSpPr>
         <p:spPr>
           <a:xfrm>
-            <a:off x="332656" y="3456042"/>
-            <a:ext cx="6192688" cy="276999"/>
+            <a:off x="332656" y="2688391"/>
+            <a:ext cx="4399025" cy="646331"/>
+          </a:xfrm>
+          <a:prstGeom prst="rect">
+            <a:avLst/>
+          </a:prstGeom>
+          <a:noFill/>
+        </p:spPr>
+        <p:txBody>
+          <a:bodyPr wrap="none" rtlCol="0">
+            <a:spAutoFit/>
+          </a:bodyPr>
+          <a:lstStyle/>
+          <a:p>
+            <a:pPr marL="342900" indent="-342900">
+              <a:buAutoNum type="arabicPeriod"/>
+            </a:pPr>
+            <a:r>
+              <a:rPr lang="en-ID" dirty="0" smtClean="0"/>
+              <a:t>Solve conflict(s) manually with IDE/Editor</a:t>
+            </a:r>
+          </a:p>
+          <a:p>
+            <a:pPr marL="342900" indent="-342900">
+              <a:buAutoNum type="arabicPeriod"/>
+            </a:pPr>
+            <a:r>
+              <a:rPr lang="en-ID" dirty="0" smtClean="0"/>
+              <a:t>Declare as solved</a:t>
+            </a:r>
+            <a:endParaRPr lang="en-US" dirty="0"/>
+          </a:p>
+        </p:txBody>
+      </p:sp>
+      <p:sp>
+        <p:nvSpPr>
+          <p:cNvPr id="8" name="TextBox 7"/>
+          <p:cNvSpPr txBox="1"/>
+          <p:nvPr/>
+        </p:nvSpPr>
+        <p:spPr>
+          <a:xfrm>
+            <a:off x="332656" y="3435846"/>
+            <a:ext cx="5976664" cy="276999"/>
           </a:xfrm>
           <a:prstGeom prst="rect">
             <a:avLst/>
@@ -3470,58 +4099,16 @@
                 <a:latin typeface="Courier New" panose="02070309020205020404" pitchFamily="49" charset="0"/>
                 <a:cs typeface="Courier New" panose="02070309020205020404" pitchFamily="49" charset="0"/>
               </a:rPr>
-              <a:t>rebase --continue</a:t>
+              <a:t>commit -a</a:t>
             </a:r>
             <a:endParaRPr lang="en-US" sz="1200" dirty="0"/>
-          </a:p>
-        </p:txBody>
-      </p:sp>
-      <p:sp>
-        <p:nvSpPr>
-          <p:cNvPr id="7" name="TextBox 6"/>
-          <p:cNvSpPr txBox="1"/>
-          <p:nvPr/>
-        </p:nvSpPr>
-        <p:spPr>
-          <a:xfrm>
-            <a:off x="332656" y="2686033"/>
-            <a:ext cx="4399025" cy="646331"/>
-          </a:xfrm>
-          <a:prstGeom prst="rect">
-            <a:avLst/>
-          </a:prstGeom>
-          <a:noFill/>
-        </p:spPr>
-        <p:txBody>
-          <a:bodyPr wrap="none" rtlCol="0">
-            <a:spAutoFit/>
-          </a:bodyPr>
-          <a:lstStyle/>
-          <a:p>
-            <a:pPr marL="342900" indent="-342900">
-              <a:buAutoNum type="arabicPeriod"/>
-            </a:pPr>
-            <a:r>
-              <a:rPr lang="en-ID" dirty="0" smtClean="0"/>
-              <a:t>Solve conflict(s) manually with IDE/Editor</a:t>
-            </a:r>
-          </a:p>
-          <a:p>
-            <a:pPr marL="342900" indent="-342900">
-              <a:buAutoNum type="arabicPeriod"/>
-            </a:pPr>
-            <a:r>
-              <a:rPr lang="en-ID" dirty="0" smtClean="0"/>
-              <a:t>Continue rebase process</a:t>
-            </a:r>
-            <a:endParaRPr lang="en-US" dirty="0"/>
           </a:p>
         </p:txBody>
       </p:sp>
     </p:spTree>
     <p:extLst>
       <p:ext uri="{BB962C8B-B14F-4D97-AF65-F5344CB8AC3E}">
-        <p14:creationId xmlns:p14="http://schemas.microsoft.com/office/powerpoint/2010/main" val="1736240454"/>
+        <p14:creationId xmlns:p14="http://schemas.microsoft.com/office/powerpoint/2010/main" val="1415878458"/>
       </p:ext>
     </p:extLst>
   </p:cSld>
@@ -3564,7 +4151,7 @@
         <p:spPr>
           <a:xfrm>
             <a:off x="332656" y="195486"/>
-            <a:ext cx="5976664" cy="646331"/>
+            <a:ext cx="5976664" cy="369332"/>
           </a:xfrm>
           <a:prstGeom prst="rect">
             <a:avLst/>
@@ -3586,14 +4173,6 @@
               </a:rPr>
               <a:t>CDC – git merging / Part III – “Merge Theory” </a:t>
             </a:r>
-          </a:p>
-          <a:p>
-            <a:endParaRPr lang="en-US" b="1" dirty="0">
-              <a:solidFill>
-                <a:srgbClr val="392900"/>
-              </a:solidFill>
-              <a:latin typeface="Bookman Old Style" panose="02050604050505020204" pitchFamily="18" charset="0"/>
-            </a:endParaRPr>
           </a:p>
         </p:txBody>
       </p:sp>
@@ -3644,8 +4223,8 @@
         </p:nvSpPr>
         <p:spPr>
           <a:xfrm>
-            <a:off x="2564904" y="718586"/>
-            <a:ext cx="1751698" cy="369332"/>
+            <a:off x="3606152" y="954902"/>
+            <a:ext cx="2089033" cy="646331"/>
           </a:xfrm>
           <a:prstGeom prst="rect">
             <a:avLst/>
@@ -3660,8 +4239,11 @@
           <a:p>
             <a:r>
               <a:rPr lang="en-ID" b="1" dirty="0" smtClean="0"/>
-              <a:t>Recursive merge</a:t>
-            </a:r>
+              <a:t>Fast-Forward merge</a:t>
+            </a:r>
+          </a:p>
+          <a:p>
+            <a:endParaRPr lang="en-ID" b="1" dirty="0" smtClean="0"/>
           </a:p>
         </p:txBody>
       </p:sp>
@@ -3673,7 +4255,7 @@
         </p:nvSpPr>
         <p:spPr>
           <a:xfrm>
-            <a:off x="2564904" y="1280379"/>
+            <a:off x="3645024" y="1324234"/>
             <a:ext cx="3168352" cy="276999"/>
           </a:xfrm>
           <a:prstGeom prst="rect">
@@ -3712,21 +4294,7 @@
                 <a:latin typeface="Courier New" panose="02070309020205020404" pitchFamily="49" charset="0"/>
                 <a:cs typeface="Courier New" panose="02070309020205020404" pitchFamily="49" charset="0"/>
               </a:rPr>
-              <a:t>merge --no-</a:t>
-            </a:r>
-            <a:r>
-              <a:rPr lang="en-ID" sz="1200" dirty="0" err="1" smtClean="0">
-                <a:latin typeface="Courier New" panose="02070309020205020404" pitchFamily="49" charset="0"/>
-                <a:cs typeface="Courier New" panose="02070309020205020404" pitchFamily="49" charset="0"/>
-              </a:rPr>
-              <a:t>ff</a:t>
-            </a:r>
-            <a:r>
-              <a:rPr lang="en-ID" sz="1200" dirty="0" smtClean="0">
-                <a:latin typeface="Courier New" panose="02070309020205020404" pitchFamily="49" charset="0"/>
-                <a:cs typeface="Courier New" panose="02070309020205020404" pitchFamily="49" charset="0"/>
-              </a:rPr>
-              <a:t> &lt;branch-name&gt;</a:t>
+              <a:t>merge &lt;branch-name&gt;</a:t>
             </a:r>
             <a:endParaRPr lang="en-US" sz="1200" dirty="0"/>
           </a:p>
@@ -3734,14 +4302,14 @@
       </p:sp>
       <p:sp>
         <p:nvSpPr>
-          <p:cNvPr id="9" name="TextBox 8"/>
+          <p:cNvPr id="15" name="TextBox 14"/>
           <p:cNvSpPr txBox="1"/>
           <p:nvPr/>
         </p:nvSpPr>
         <p:spPr>
           <a:xfrm>
-            <a:off x="2561735" y="1876879"/>
-            <a:ext cx="1620252" cy="369332"/>
+            <a:off x="3645024" y="2108938"/>
+            <a:ext cx="2472921" cy="615553"/>
           </a:xfrm>
           <a:prstGeom prst="rect">
             <a:avLst/>
@@ -3755,52 +4323,72 @@
           <a:lstStyle/>
           <a:p>
             <a:r>
+              <a:rPr lang="en-ID" dirty="0"/>
+              <a:t>Conditions </a:t>
+            </a:r>
+            <a:r>
               <a:rPr lang="en-ID" dirty="0" smtClean="0"/>
-              <a:t>Why recursive?</a:t>
-            </a:r>
-            <a:endParaRPr lang="en-US" dirty="0"/>
-          </a:p>
-        </p:txBody>
-      </p:sp>
-      <p:sp>
-        <p:nvSpPr>
-          <p:cNvPr id="11" name="TextBox 10"/>
-          <p:cNvSpPr txBox="1"/>
-          <p:nvPr/>
-        </p:nvSpPr>
-        <p:spPr>
-          <a:xfrm>
-            <a:off x="2561735" y="2306550"/>
-            <a:ext cx="3592843" cy="646331"/>
-          </a:xfrm>
-          <a:prstGeom prst="rect">
-            <a:avLst/>
-          </a:prstGeom>
-          <a:noFill/>
-        </p:spPr>
-        <p:txBody>
-          <a:bodyPr wrap="none" rtlCol="0">
-            <a:spAutoFit/>
-          </a:bodyPr>
-          <a:lstStyle/>
+              <a:t>for </a:t>
+            </a:r>
+            <a:r>
+              <a:rPr lang="en-ID" dirty="0" err="1" smtClean="0"/>
+              <a:t>ff</a:t>
+            </a:r>
+            <a:r>
+              <a:rPr lang="en-ID" dirty="0" smtClean="0"/>
+              <a:t>-merge</a:t>
+            </a:r>
+            <a:r>
+              <a:rPr lang="en-ID" dirty="0" smtClean="0"/>
+              <a:t>:</a:t>
+            </a:r>
+          </a:p>
           <a:p>
             <a:pPr marL="285750" indent="-285750">
               <a:buFont typeface="Arial" panose="020B0604020202020204" pitchFamily="34" charset="0"/>
               <a:buChar char="•"/>
             </a:pPr>
             <a:r>
-              <a:rPr lang="en-ID" dirty="0" smtClean="0"/>
-              <a:t>Clear what was done on a branch</a:t>
-            </a:r>
-          </a:p>
+              <a:rPr lang="en-ID" sz="1600" dirty="0" smtClean="0"/>
+              <a:t>Nothing new on parent!</a:t>
+            </a:r>
+            <a:endParaRPr lang="en-US" sz="1600" dirty="0"/>
+          </a:p>
+        </p:txBody>
+      </p:sp>
+      <p:sp>
+        <p:nvSpPr>
+          <p:cNvPr id="12" name="TextBox 11"/>
+          <p:cNvSpPr txBox="1"/>
+          <p:nvPr/>
+        </p:nvSpPr>
+        <p:spPr>
+          <a:xfrm>
+            <a:off x="3645024" y="3435846"/>
+            <a:ext cx="1724831" cy="369332"/>
+          </a:xfrm>
+          <a:prstGeom prst="rect">
+            <a:avLst/>
+          </a:prstGeom>
+          <a:noFill/>
+        </p:spPr>
+        <p:txBody>
+          <a:bodyPr wrap="none" rtlCol="0">
+            <a:spAutoFit/>
+          </a:bodyPr>
+          <a:lstStyle/>
           <a:p>
             <a:pPr marL="285750" indent="-285750">
               <a:buFont typeface="Arial" panose="020B0604020202020204" pitchFamily="34" charset="0"/>
               <a:buChar char="•"/>
             </a:pPr>
             <a:r>
+              <a:rPr lang="en-ID" sz="1600" dirty="0" smtClean="0"/>
+              <a:t>Less</a:t>
+            </a:r>
+            <a:r>
               <a:rPr lang="en-ID" dirty="0" smtClean="0"/>
-              <a:t>Single commit to revert</a:t>
+              <a:t> commits</a:t>
             </a:r>
             <a:endParaRPr lang="en-US" dirty="0"/>
           </a:p>
@@ -3808,7 +4396,7 @@
       </p:sp>
       <p:pic>
         <p:nvPicPr>
-          <p:cNvPr id="14" name="Picture 13"/>
+          <p:cNvPr id="3" name="Picture 2"/>
           <p:cNvPicPr>
             <a:picLocks noChangeAspect="1"/>
           </p:cNvPicPr>
@@ -3828,48 +4416,18 @@
         </p:blipFill>
         <p:spPr>
           <a:xfrm>
-            <a:off x="1124744" y="1111324"/>
-            <a:ext cx="688853" cy="3012446"/>
+            <a:off x="188640" y="699542"/>
+            <a:ext cx="3156994" cy="3737324"/>
           </a:xfrm>
           <a:prstGeom prst="rect">
             <a:avLst/>
           </a:prstGeom>
         </p:spPr>
       </p:pic>
-      <p:sp>
-        <p:nvSpPr>
-          <p:cNvPr id="15" name="TextBox 14"/>
-          <p:cNvSpPr txBox="1"/>
-          <p:nvPr/>
-        </p:nvSpPr>
-        <p:spPr>
-          <a:xfrm>
-            <a:off x="2561735" y="3042880"/>
-            <a:ext cx="513282" cy="369332"/>
-          </a:xfrm>
-          <a:prstGeom prst="rect">
-            <a:avLst/>
-          </a:prstGeom>
-          <a:noFill/>
-        </p:spPr>
-        <p:txBody>
-          <a:bodyPr wrap="none" rtlCol="0">
-            <a:spAutoFit/>
-          </a:bodyPr>
-          <a:lstStyle/>
-          <a:p>
-            <a:r>
-              <a:rPr lang="en-ID" dirty="0" smtClean="0"/>
-              <a:t>Log</a:t>
-            </a:r>
-            <a:endParaRPr lang="en-US" dirty="0"/>
-          </a:p>
-        </p:txBody>
-      </p:sp>
     </p:spTree>
     <p:extLst>
       <p:ext uri="{BB962C8B-B14F-4D97-AF65-F5344CB8AC3E}">
-        <p14:creationId xmlns:p14="http://schemas.microsoft.com/office/powerpoint/2010/main" val="3227811868"/>
+        <p14:creationId xmlns:p14="http://schemas.microsoft.com/office/powerpoint/2010/main" val="291700855"/>
       </p:ext>
     </p:extLst>
   </p:cSld>
@@ -3912,7 +4470,7 @@
         <p:spPr>
           <a:xfrm>
             <a:off x="332656" y="195486"/>
-            <a:ext cx="5976664" cy="646331"/>
+            <a:ext cx="5976664" cy="369332"/>
           </a:xfrm>
           <a:prstGeom prst="rect">
             <a:avLst/>
@@ -3935,53 +4493,6 @@
               <a:t>CDC – git merging / Part III – “Merge Theory” </a:t>
             </a:r>
           </a:p>
-          <a:p>
-            <a:endParaRPr lang="en-US" b="1" dirty="0">
-              <a:solidFill>
-                <a:srgbClr val="392900"/>
-              </a:solidFill>
-              <a:latin typeface="Bookman Old Style" panose="02050604050505020204" pitchFamily="18" charset="0"/>
-            </a:endParaRPr>
-          </a:p>
-        </p:txBody>
-      </p:sp>
-      <p:sp>
-        <p:nvSpPr>
-          <p:cNvPr id="6" name="TextBox 5"/>
-          <p:cNvSpPr txBox="1"/>
-          <p:nvPr/>
-        </p:nvSpPr>
-        <p:spPr>
-          <a:xfrm>
-            <a:off x="4149080" y="4240875"/>
-            <a:ext cx="2808312" cy="369332"/>
-          </a:xfrm>
-          <a:prstGeom prst="rect">
-            <a:avLst/>
-          </a:prstGeom>
-          <a:noFill/>
-        </p:spPr>
-        <p:txBody>
-          <a:bodyPr wrap="square" rtlCol="0">
-            <a:spAutoFit/>
-          </a:bodyPr>
-          <a:lstStyle/>
-          <a:p>
-            <a:r>
-              <a:rPr lang="en-ID" dirty="0" smtClean="0">
-                <a:ln w="0"/>
-                <a:effectLst>
-                  <a:outerShdw blurRad="38100" dist="19050" dir="2700000" algn="tl" rotWithShape="0">
-                    <a:schemeClr val="dk1">
-                      <a:alpha val="40000"/>
-                    </a:schemeClr>
-                  </a:outerShdw>
-                </a:effectLst>
-                <a:latin typeface="Berlin Sans FB" panose="020E0602020502020306" pitchFamily="34" charset="0"/>
-              </a:rPr>
-              <a:t>“The shell is my friend!”</a:t>
-            </a:r>
-          </a:p>
         </p:txBody>
       </p:sp>
       <p:sp>
@@ -3992,8 +4503,8 @@
         </p:nvSpPr>
         <p:spPr>
           <a:xfrm>
-            <a:off x="2564904" y="727695"/>
-            <a:ext cx="2089033" cy="369332"/>
+            <a:off x="3350837" y="1029493"/>
+            <a:ext cx="1751698" cy="369332"/>
           </a:xfrm>
           <a:prstGeom prst="rect">
             <a:avLst/>
@@ -4008,7 +4519,7 @@
           <a:p>
             <a:r>
               <a:rPr lang="en-ID" b="1" dirty="0" smtClean="0"/>
-              <a:t>Fast-Forward merge</a:t>
+              <a:t>Recursive merge</a:t>
             </a:r>
           </a:p>
         </p:txBody>
@@ -4021,7 +4532,7 @@
         </p:nvSpPr>
         <p:spPr>
           <a:xfrm>
-            <a:off x="2564904" y="1280379"/>
+            <a:off x="3354006" y="1433160"/>
             <a:ext cx="3168352" cy="276999"/>
           </a:xfrm>
           <a:prstGeom prst="rect">
@@ -4060,7 +4571,21 @@
                 <a:latin typeface="Courier New" panose="02070309020205020404" pitchFamily="49" charset="0"/>
                 <a:cs typeface="Courier New" panose="02070309020205020404" pitchFamily="49" charset="0"/>
               </a:rPr>
-              <a:t>merge &lt;branch-name&gt;</a:t>
+              <a:t>merge --no-</a:t>
+            </a:r>
+            <a:r>
+              <a:rPr lang="en-ID" sz="1200" dirty="0" err="1" smtClean="0">
+                <a:latin typeface="Courier New" panose="02070309020205020404" pitchFamily="49" charset="0"/>
+                <a:cs typeface="Courier New" panose="02070309020205020404" pitchFamily="49" charset="0"/>
+              </a:rPr>
+              <a:t>ff</a:t>
+            </a:r>
+            <a:r>
+              <a:rPr lang="en-ID" sz="1200" dirty="0" smtClean="0">
+                <a:latin typeface="Courier New" panose="02070309020205020404" pitchFamily="49" charset="0"/>
+                <a:cs typeface="Courier New" panose="02070309020205020404" pitchFamily="49" charset="0"/>
+              </a:rPr>
+              <a:t> &lt;branch-name&gt;</a:t>
             </a:r>
             <a:endParaRPr lang="en-US" sz="1200" dirty="0"/>
           </a:p>
@@ -4068,14 +4593,14 @@
       </p:sp>
       <p:sp>
         <p:nvSpPr>
-          <p:cNvPr id="15" name="TextBox 14"/>
+          <p:cNvPr id="11" name="TextBox 10"/>
           <p:cNvSpPr txBox="1"/>
           <p:nvPr/>
         </p:nvSpPr>
         <p:spPr>
           <a:xfrm>
-            <a:off x="2564904" y="2541346"/>
-            <a:ext cx="513282" cy="369332"/>
+            <a:off x="3319213" y="2031450"/>
+            <a:ext cx="3237938" cy="830997"/>
           </a:xfrm>
           <a:prstGeom prst="rect">
             <a:avLst/>
@@ -4089,23 +4614,52 @@
           <a:lstStyle/>
           <a:p>
             <a:r>
-              <a:rPr lang="en-ID" dirty="0" smtClean="0"/>
-              <a:t>Log</a:t>
-            </a:r>
-            <a:endParaRPr lang="en-US" dirty="0"/>
+              <a:rPr lang="en-ID" sz="1600" dirty="0"/>
+              <a:t>Why recursive</a:t>
+            </a:r>
+            <a:r>
+              <a:rPr lang="en-ID" sz="1600" dirty="0" smtClean="0"/>
+              <a:t>?</a:t>
+            </a:r>
+            <a:endParaRPr lang="en-ID" sz="1600" dirty="0" smtClean="0"/>
+          </a:p>
+          <a:p>
+            <a:pPr marL="285750" indent="-285750">
+              <a:buFont typeface="Arial" panose="020B0604020202020204" pitchFamily="34" charset="0"/>
+              <a:buChar char="•"/>
+            </a:pPr>
+            <a:r>
+              <a:rPr lang="en-ID" sz="1600" dirty="0" smtClean="0"/>
+              <a:t>Clear </a:t>
+            </a:r>
+            <a:r>
+              <a:rPr lang="en-ID" sz="1600" dirty="0" smtClean="0"/>
+              <a:t>what was done on a branch</a:t>
+            </a:r>
+          </a:p>
+          <a:p>
+            <a:pPr marL="285750" indent="-285750">
+              <a:buFont typeface="Arial" panose="020B0604020202020204" pitchFamily="34" charset="0"/>
+              <a:buChar char="•"/>
+            </a:pPr>
+            <a:r>
+              <a:rPr lang="en-ID" sz="1600" dirty="0" smtClean="0"/>
+              <a:t>Single commit to revert</a:t>
+            </a:r>
+            <a:endParaRPr lang="en-US" sz="1600" dirty="0"/>
           </a:p>
         </p:txBody>
       </p:sp>
       <p:pic>
         <p:nvPicPr>
-          <p:cNvPr id="2" name="Picture 1"/>
+          <p:cNvPr id="3" name="Picture 2"/>
           <p:cNvPicPr>
             <a:picLocks noChangeAspect="1"/>
           </p:cNvPicPr>
           <p:nvPr/>
         </p:nvPicPr>
         <p:blipFill>
-          <a:blip r:embed="rId2">
+          <a:blip r:embed="rId3">
             <a:extLst>
               <a:ext uri="{28A0092B-C50C-407E-A947-70E740481C1C}">
                 <a14:useLocalDpi xmlns:a14="http://schemas.microsoft.com/office/drawing/2010/main" val="0"/>
@@ -4118,8 +4672,8 @@
         </p:blipFill>
         <p:spPr>
           <a:xfrm>
-            <a:off x="1157911" y="965502"/>
-            <a:ext cx="236645" cy="3151688"/>
+            <a:off x="476672" y="871367"/>
+            <a:ext cx="2511756" cy="3412597"/>
           </a:xfrm>
           <a:prstGeom prst="rect">
             <a:avLst/>
@@ -4128,42 +4682,65 @@
       </p:pic>
       <p:sp>
         <p:nvSpPr>
-          <p:cNvPr id="12" name="TextBox 11"/>
-          <p:cNvSpPr txBox="1"/>
+          <p:cNvPr id="12" name="Rectangle 11"/>
+          <p:cNvSpPr/>
           <p:nvPr/>
         </p:nvSpPr>
         <p:spPr>
           <a:xfrm>
-            <a:off x="2564904" y="1740730"/>
-            <a:ext cx="1724831" cy="369332"/>
-          </a:xfrm>
-          <a:prstGeom prst="rect">
-            <a:avLst/>
-          </a:prstGeom>
-          <a:noFill/>
-        </p:spPr>
-        <p:txBody>
-          <a:bodyPr wrap="none" rtlCol="0">
+            <a:off x="3350837" y="2987240"/>
+            <a:ext cx="3104666" cy="1015663"/>
+          </a:xfrm>
+          <a:prstGeom prst="rect">
+            <a:avLst/>
+          </a:prstGeom>
+        </p:spPr>
+        <p:txBody>
+          <a:bodyPr wrap="square">
             <a:spAutoFit/>
           </a:bodyPr>
           <a:lstStyle/>
           <a:p>
-            <a:pPr marL="285750" indent="-285750">
-              <a:buFont typeface="Arial" panose="020B0604020202020204" pitchFamily="34" charset="0"/>
-              <a:buChar char="•"/>
-            </a:pPr>
-            <a:r>
-              <a:rPr lang="en-ID" dirty="0" smtClean="0"/>
-              <a:t>Less commits</a:t>
-            </a:r>
-            <a:endParaRPr lang="en-US" dirty="0"/>
+            <a:r>
+              <a:rPr lang="en-ID" sz="1200" dirty="0" smtClean="0"/>
+              <a:t>“A </a:t>
+            </a:r>
+            <a:r>
+              <a:rPr lang="en-ID" sz="1200" dirty="0"/>
+              <a:t>merge </a:t>
+            </a:r>
+            <a:r>
+              <a:rPr lang="en-ID" sz="1200" dirty="0" smtClean="0"/>
+              <a:t>commit: </a:t>
+            </a:r>
+            <a:r>
+              <a:rPr lang="en-ID" sz="1200" dirty="0"/>
+              <a:t>instead of being created by a developer, it gets created </a:t>
+            </a:r>
+            <a:r>
+              <a:rPr lang="en-ID" sz="1200" i="1" dirty="0"/>
+              <a:t>automatically</a:t>
+            </a:r>
+            <a:r>
+              <a:rPr lang="en-ID" sz="1200" dirty="0"/>
+              <a:t> by Git. And instead of wrapping a set of related changes, its purpose is to connect two branches, just like a </a:t>
+            </a:r>
+            <a:r>
+              <a:rPr lang="en-ID" sz="1200" dirty="0" smtClean="0"/>
+              <a:t>knot</a:t>
+            </a:r>
+            <a:r>
+              <a:rPr lang="en-ID" sz="1200" dirty="0" smtClean="0"/>
+              <a:t>.”</a:t>
+            </a:r>
+            <a:endParaRPr lang="en-US" sz="1200" dirty="0"/>
           </a:p>
         </p:txBody>
       </p:sp>
     </p:spTree>
     <p:extLst>
       <p:ext uri="{BB962C8B-B14F-4D97-AF65-F5344CB8AC3E}">
-        <p14:creationId xmlns:p14="http://schemas.microsoft.com/office/powerpoint/2010/main" val="291700855"/>
+        <p14:creationId xmlns:p14="http://schemas.microsoft.com/office/powerpoint/2010/main" val="3227811868"/>
       </p:ext>
     </p:extLst>
   </p:cSld>
@@ -4206,7 +4783,7 @@
         <p:spPr>
           <a:xfrm>
             <a:off x="332656" y="195486"/>
-            <a:ext cx="5976664" cy="646331"/>
+            <a:ext cx="5976664" cy="369332"/>
           </a:xfrm>
           <a:prstGeom prst="rect">
             <a:avLst/>
@@ -4226,11 +4803,36 @@
                 </a:solidFill>
                 <a:latin typeface="Bookman Old Style" panose="02050604050505020204" pitchFamily="18" charset="0"/>
               </a:rPr>
-              <a:t>CDC – git merging / Part III – “Rebase – Why?” </a:t>
-            </a:r>
-          </a:p>
-          <a:p>
-            <a:endParaRPr lang="en-US" b="1" dirty="0">
+              <a:t>CDC – git merging / Part </a:t>
+            </a:r>
+            <a:r>
+              <a:rPr lang="en-ID" b="1" dirty="0" smtClean="0">
+                <a:solidFill>
+                  <a:srgbClr val="392900"/>
+                </a:solidFill>
+                <a:latin typeface="Bookman Old Style" panose="02050604050505020204" pitchFamily="18" charset="0"/>
+              </a:rPr>
+              <a:t>IV </a:t>
+            </a:r>
+            <a:r>
+              <a:rPr lang="en-ID" b="1" dirty="0" smtClean="0">
+                <a:solidFill>
+                  <a:srgbClr val="392900"/>
+                </a:solidFill>
+                <a:latin typeface="Bookman Old Style" panose="02050604050505020204" pitchFamily="18" charset="0"/>
+              </a:rPr>
+              <a:t>– “</a:t>
+            </a:r>
+            <a:r>
+              <a:rPr lang="en-ID" b="1" dirty="0" smtClean="0">
+                <a:solidFill>
+                  <a:srgbClr val="392900"/>
+                </a:solidFill>
+                <a:latin typeface="Bookman Old Style" panose="02050604050505020204" pitchFamily="18" charset="0"/>
+              </a:rPr>
+              <a:t>Rebase” </a:t>
+            </a:r>
+            <a:endParaRPr lang="en-ID" b="1" dirty="0" smtClean="0">
               <a:solidFill>
                 <a:srgbClr val="392900"/>
               </a:solidFill>
@@ -4278,10 +4880,950 @@
           </a:p>
         </p:txBody>
       </p:sp>
+      <p:sp>
+        <p:nvSpPr>
+          <p:cNvPr id="4" name="TextBox 3"/>
+          <p:cNvSpPr txBox="1"/>
+          <p:nvPr/>
+        </p:nvSpPr>
+        <p:spPr>
+          <a:xfrm>
+            <a:off x="332656" y="1898117"/>
+            <a:ext cx="6192688" cy="1200329"/>
+          </a:xfrm>
+          <a:prstGeom prst="rect">
+            <a:avLst/>
+          </a:prstGeom>
+        </p:spPr>
+        <p:style>
+          <a:lnRef idx="0">
+            <a:schemeClr val="dk1"/>
+          </a:lnRef>
+          <a:fillRef idx="3">
+            <a:schemeClr val="dk1"/>
+          </a:fillRef>
+          <a:effectRef idx="3">
+            <a:schemeClr val="dk1"/>
+          </a:effectRef>
+          <a:fontRef idx="minor">
+            <a:schemeClr val="lt1"/>
+          </a:fontRef>
+        </p:style>
+        <p:txBody>
+          <a:bodyPr wrap="square" rtlCol="0">
+            <a:spAutoFit/>
+          </a:bodyPr>
+          <a:lstStyle/>
+          <a:p>
+            <a:r>
+              <a:rPr lang="en-ID" sz="1200" dirty="0" smtClean="0">
+                <a:latin typeface="Courier New" panose="02070309020205020404" pitchFamily="49" charset="0"/>
+                <a:cs typeface="Courier New" panose="02070309020205020404" pitchFamily="49" charset="0"/>
+              </a:rPr>
+              <a:t>$git checkout develop</a:t>
+            </a:r>
+          </a:p>
+          <a:p>
+            <a:r>
+              <a:rPr lang="en-ID" sz="1200" dirty="0" smtClean="0">
+                <a:latin typeface="Courier New" panose="02070309020205020404" pitchFamily="49" charset="0"/>
+                <a:cs typeface="Courier New" panose="02070309020205020404" pitchFamily="49" charset="0"/>
+              </a:rPr>
+              <a:t>$git </a:t>
+            </a:r>
+            <a:r>
+              <a:rPr lang="en-ID" sz="1200" dirty="0" smtClean="0">
+                <a:latin typeface="Courier New" panose="02070309020205020404" pitchFamily="49" charset="0"/>
+                <a:cs typeface="Courier New" panose="02070309020205020404" pitchFamily="49" charset="0"/>
+              </a:rPr>
+              <a:t>fetch origin</a:t>
+            </a:r>
+            <a:endParaRPr lang="en-ID" sz="1200" dirty="0">
+              <a:latin typeface="Courier New" panose="02070309020205020404" pitchFamily="49" charset="0"/>
+              <a:cs typeface="Courier New" panose="02070309020205020404" pitchFamily="49" charset="0"/>
+            </a:endParaRPr>
+          </a:p>
+          <a:p>
+            <a:r>
+              <a:rPr lang="en-ID" sz="1200" dirty="0" smtClean="0">
+                <a:latin typeface="Courier New" panose="02070309020205020404" pitchFamily="49" charset="0"/>
+                <a:cs typeface="Courier New" panose="02070309020205020404" pitchFamily="49" charset="0"/>
+              </a:rPr>
+              <a:t>$git </a:t>
+            </a:r>
+            <a:r>
+              <a:rPr lang="en-ID" sz="1200" dirty="0">
+                <a:latin typeface="Courier New" panose="02070309020205020404" pitchFamily="49" charset="0"/>
+                <a:cs typeface="Courier New" panose="02070309020205020404" pitchFamily="49" charset="0"/>
+              </a:rPr>
+              <a:t>checkout </a:t>
+            </a:r>
+            <a:r>
+              <a:rPr lang="en-ID" sz="1200" dirty="0" smtClean="0">
+                <a:latin typeface="Courier New" panose="02070309020205020404" pitchFamily="49" charset="0"/>
+                <a:cs typeface="Courier New" panose="02070309020205020404" pitchFamily="49" charset="0"/>
+              </a:rPr>
+              <a:t>&lt;unique-name&gt;</a:t>
+            </a:r>
+            <a:endParaRPr lang="en-ID" sz="1200" dirty="0">
+              <a:latin typeface="Courier New" panose="02070309020205020404" pitchFamily="49" charset="0"/>
+              <a:cs typeface="Courier New" panose="02070309020205020404" pitchFamily="49" charset="0"/>
+            </a:endParaRPr>
+          </a:p>
+          <a:p>
+            <a:r>
+              <a:rPr lang="en-ID" sz="1200" dirty="0" smtClean="0">
+                <a:latin typeface="Courier New" panose="02070309020205020404" pitchFamily="49" charset="0"/>
+                <a:cs typeface="Courier New" panose="02070309020205020404" pitchFamily="49" charset="0"/>
+              </a:rPr>
+              <a:t>$git </a:t>
+            </a:r>
+            <a:r>
+              <a:rPr lang="en-ID" sz="1200" dirty="0">
+                <a:latin typeface="Courier New" panose="02070309020205020404" pitchFamily="49" charset="0"/>
+                <a:cs typeface="Courier New" panose="02070309020205020404" pitchFamily="49" charset="0"/>
+              </a:rPr>
+              <a:t>rebase </a:t>
+            </a:r>
+            <a:r>
+              <a:rPr lang="en-ID" sz="1200" dirty="0" smtClean="0">
+                <a:latin typeface="Courier New" panose="02070309020205020404" pitchFamily="49" charset="0"/>
+                <a:cs typeface="Courier New" panose="02070309020205020404" pitchFamily="49" charset="0"/>
+              </a:rPr>
+              <a:t>–p origin/develop</a:t>
+            </a:r>
+            <a:endParaRPr lang="en-ID" sz="1200" dirty="0">
+              <a:latin typeface="Courier New" panose="02070309020205020404" pitchFamily="49" charset="0"/>
+              <a:cs typeface="Courier New" panose="02070309020205020404" pitchFamily="49" charset="0"/>
+            </a:endParaRPr>
+          </a:p>
+          <a:p>
+            <a:r>
+              <a:rPr lang="en-ID" sz="1200" dirty="0" smtClean="0">
+                <a:latin typeface="Courier New" panose="02070309020205020404" pitchFamily="49" charset="0"/>
+                <a:cs typeface="Courier New" panose="02070309020205020404" pitchFamily="49" charset="0"/>
+              </a:rPr>
+              <a:t>$git </a:t>
+            </a:r>
+            <a:r>
+              <a:rPr lang="en-ID" sz="1200" dirty="0">
+                <a:latin typeface="Courier New" panose="02070309020205020404" pitchFamily="49" charset="0"/>
+                <a:cs typeface="Courier New" panose="02070309020205020404" pitchFamily="49" charset="0"/>
+              </a:rPr>
+              <a:t>checkout </a:t>
+            </a:r>
+            <a:r>
+              <a:rPr lang="en-ID" sz="1200" dirty="0" smtClean="0">
+                <a:latin typeface="Courier New" panose="02070309020205020404" pitchFamily="49" charset="0"/>
+                <a:cs typeface="Courier New" panose="02070309020205020404" pitchFamily="49" charset="0"/>
+              </a:rPr>
+              <a:t>develop</a:t>
+            </a:r>
+            <a:endParaRPr lang="en-ID" sz="1200" dirty="0">
+              <a:latin typeface="Courier New" panose="02070309020205020404" pitchFamily="49" charset="0"/>
+              <a:cs typeface="Courier New" panose="02070309020205020404" pitchFamily="49" charset="0"/>
+            </a:endParaRPr>
+          </a:p>
+          <a:p>
+            <a:r>
+              <a:rPr lang="en-ID" sz="1200" dirty="0" smtClean="0">
+                <a:latin typeface="Courier New" panose="02070309020205020404" pitchFamily="49" charset="0"/>
+                <a:cs typeface="Courier New" panose="02070309020205020404" pitchFamily="49" charset="0"/>
+              </a:rPr>
+              <a:t>$git </a:t>
+            </a:r>
+            <a:r>
+              <a:rPr lang="en-ID" sz="1200" dirty="0">
+                <a:latin typeface="Courier New" panose="02070309020205020404" pitchFamily="49" charset="0"/>
+                <a:cs typeface="Courier New" panose="02070309020205020404" pitchFamily="49" charset="0"/>
+              </a:rPr>
+              <a:t>merge </a:t>
+            </a:r>
+            <a:r>
+              <a:rPr lang="en-ID" sz="1200" dirty="0" smtClean="0">
+                <a:latin typeface="Courier New" panose="02070309020205020404" pitchFamily="49" charset="0"/>
+                <a:cs typeface="Courier New" panose="02070309020205020404" pitchFamily="49" charset="0"/>
+              </a:rPr>
+              <a:t>&lt;</a:t>
+            </a:r>
+            <a:r>
+              <a:rPr lang="en-ID" sz="1200" dirty="0" smtClean="0">
+                <a:latin typeface="Courier New" panose="02070309020205020404" pitchFamily="49" charset="0"/>
+                <a:cs typeface="Courier New" panose="02070309020205020404" pitchFamily="49" charset="0"/>
+              </a:rPr>
+              <a:t>unique-name&gt;</a:t>
+            </a:r>
+            <a:endParaRPr lang="en-ID" sz="1200" dirty="0">
+              <a:latin typeface="Courier New" panose="02070309020205020404" pitchFamily="49" charset="0"/>
+              <a:cs typeface="Courier New" panose="02070309020205020404" pitchFamily="49" charset="0"/>
+            </a:endParaRPr>
+          </a:p>
+        </p:txBody>
+      </p:sp>
+      <p:sp>
+        <p:nvSpPr>
+          <p:cNvPr id="7" name="TextBox 6"/>
+          <p:cNvSpPr txBox="1"/>
+          <p:nvPr/>
+        </p:nvSpPr>
+        <p:spPr>
+          <a:xfrm>
+            <a:off x="332656" y="4006724"/>
+            <a:ext cx="6192688" cy="276999"/>
+          </a:xfrm>
+          <a:prstGeom prst="rect">
+            <a:avLst/>
+          </a:prstGeom>
+        </p:spPr>
+        <p:style>
+          <a:lnRef idx="0">
+            <a:schemeClr val="dk1"/>
+          </a:lnRef>
+          <a:fillRef idx="3">
+            <a:schemeClr val="dk1"/>
+          </a:fillRef>
+          <a:effectRef idx="3">
+            <a:schemeClr val="dk1"/>
+          </a:effectRef>
+          <a:fontRef idx="minor">
+            <a:schemeClr val="lt1"/>
+          </a:fontRef>
+        </p:style>
+        <p:txBody>
+          <a:bodyPr wrap="square" rtlCol="0">
+            <a:spAutoFit/>
+          </a:bodyPr>
+          <a:lstStyle/>
+          <a:p>
+            <a:r>
+              <a:rPr lang="en-ID" sz="1200" dirty="0">
+                <a:latin typeface="Courier New" panose="02070309020205020404" pitchFamily="49" charset="0"/>
+                <a:cs typeface="Courier New" panose="02070309020205020404" pitchFamily="49" charset="0"/>
+              </a:rPr>
+              <a:t>$git </a:t>
+            </a:r>
+            <a:r>
+              <a:rPr lang="en-ID" sz="1200" dirty="0" smtClean="0">
+                <a:latin typeface="Courier New" panose="02070309020205020404" pitchFamily="49" charset="0"/>
+                <a:cs typeface="Courier New" panose="02070309020205020404" pitchFamily="49" charset="0"/>
+              </a:rPr>
+              <a:t>rebase --continue</a:t>
+            </a:r>
+            <a:endParaRPr lang="en-US" sz="1200" dirty="0"/>
+          </a:p>
+        </p:txBody>
+      </p:sp>
+      <p:sp>
+        <p:nvSpPr>
+          <p:cNvPr id="8" name="TextBox 7"/>
+          <p:cNvSpPr txBox="1"/>
+          <p:nvPr/>
+        </p:nvSpPr>
+        <p:spPr>
+          <a:xfrm>
+            <a:off x="332656" y="1320440"/>
+            <a:ext cx="6378797" cy="584775"/>
+          </a:xfrm>
+          <a:prstGeom prst="rect">
+            <a:avLst/>
+          </a:prstGeom>
+          <a:noFill/>
+        </p:spPr>
+        <p:txBody>
+          <a:bodyPr wrap="none" rtlCol="0">
+            <a:spAutoFit/>
+          </a:bodyPr>
+          <a:lstStyle/>
+          <a:p>
+            <a:r>
+              <a:rPr lang="en-ID" sz="3200" dirty="0" smtClean="0"/>
+              <a:t>!</a:t>
+            </a:r>
+            <a:r>
+              <a:rPr lang="en-ID" dirty="0" smtClean="0"/>
+              <a:t>Rebase is a team-decision because it change the team workflow</a:t>
+            </a:r>
+            <a:endParaRPr lang="en-US" dirty="0"/>
+          </a:p>
+        </p:txBody>
+      </p:sp>
+      <p:sp>
+        <p:nvSpPr>
+          <p:cNvPr id="2" name="Rectangle 1"/>
+          <p:cNvSpPr/>
+          <p:nvPr/>
+        </p:nvSpPr>
+        <p:spPr>
+          <a:xfrm>
+            <a:off x="332656" y="814981"/>
+            <a:ext cx="3312368" cy="461665"/>
+          </a:xfrm>
+          <a:prstGeom prst="rect">
+            <a:avLst/>
+          </a:prstGeom>
+        </p:spPr>
+        <p:txBody>
+          <a:bodyPr wrap="square">
+            <a:spAutoFit/>
+          </a:bodyPr>
+          <a:lstStyle/>
+          <a:p>
+            <a:r>
+              <a:rPr lang="en-ID" sz="1200" dirty="0" smtClean="0"/>
+              <a:t>“Keeping </a:t>
+            </a:r>
+            <a:r>
+              <a:rPr lang="en-ID" sz="1200" dirty="0"/>
+              <a:t>a clean history in git comes down to knowing when to use merge vs. rebase</a:t>
+            </a:r>
+            <a:r>
+              <a:rPr lang="en-ID" sz="1200" dirty="0" smtClean="0"/>
+              <a:t>.”</a:t>
+            </a:r>
+            <a:endParaRPr lang="en-US" sz="1200" dirty="0"/>
+          </a:p>
+        </p:txBody>
+      </p:sp>
+      <p:sp>
+        <p:nvSpPr>
+          <p:cNvPr id="9" name="TextBox 8"/>
+          <p:cNvSpPr txBox="1"/>
+          <p:nvPr/>
+        </p:nvSpPr>
+        <p:spPr>
+          <a:xfrm>
+            <a:off x="332656" y="3144950"/>
+            <a:ext cx="3964227" cy="861774"/>
+          </a:xfrm>
+          <a:prstGeom prst="rect">
+            <a:avLst/>
+          </a:prstGeom>
+          <a:noFill/>
+        </p:spPr>
+        <p:txBody>
+          <a:bodyPr wrap="none" rtlCol="0">
+            <a:spAutoFit/>
+          </a:bodyPr>
+          <a:lstStyle/>
+          <a:p>
+            <a:r>
+              <a:rPr lang="en-ID" dirty="0" smtClean="0"/>
+              <a:t>Merge conflicts:</a:t>
+            </a:r>
+          </a:p>
+          <a:p>
+            <a:pPr marL="342900" indent="-342900">
+              <a:buAutoNum type="arabicPeriod"/>
+            </a:pPr>
+            <a:r>
+              <a:rPr lang="en-ID" sz="1600" dirty="0" smtClean="0"/>
+              <a:t>Solve </a:t>
+            </a:r>
+            <a:r>
+              <a:rPr lang="en-ID" sz="1600" dirty="0" smtClean="0"/>
+              <a:t>conflict(s) manually with IDE/Editor</a:t>
+            </a:r>
+          </a:p>
+          <a:p>
+            <a:pPr marL="342900" indent="-342900">
+              <a:buAutoNum type="arabicPeriod"/>
+            </a:pPr>
+            <a:r>
+              <a:rPr lang="en-ID" sz="1600" dirty="0" smtClean="0"/>
+              <a:t>Continue rebase process</a:t>
+            </a:r>
+            <a:endParaRPr lang="en-US" sz="1600" dirty="0"/>
+          </a:p>
+        </p:txBody>
+      </p:sp>
     </p:spTree>
     <p:extLst>
       <p:ext uri="{BB962C8B-B14F-4D97-AF65-F5344CB8AC3E}">
         <p14:creationId xmlns:p14="http://schemas.microsoft.com/office/powerpoint/2010/main" val="2834454420"/>
+      </p:ext>
+    </p:extLst>
+  </p:cSld>
+  <p:clrMapOvr>
+    <a:masterClrMapping/>
+  </p:clrMapOvr>
+  <p:timing>
+    <p:tnLst>
+      <p:par>
+        <p:cTn id="1" dur="indefinite" restart="never" nodeType="tmRoot"/>
+      </p:par>
+    </p:tnLst>
+  </p:timing>
+</p:sld>
+</file>
+
+<file path=ppt/slides/slide15.xml><?xml version="1.0" encoding="utf-8"?>
+<p:sld xmlns:a="http://schemas.openxmlformats.org/drawingml/2006/main" xmlns:r="http://schemas.openxmlformats.org/officeDocument/2006/relationships" xmlns:p="http://schemas.openxmlformats.org/presentationml/2006/main">
+  <p:cSld>
+    <p:spTree>
+      <p:nvGrpSpPr>
+        <p:cNvPr id="1" name=""/>
+        <p:cNvGrpSpPr/>
+        <p:nvPr/>
+      </p:nvGrpSpPr>
+      <p:grpSpPr>
+        <a:xfrm>
+          <a:off x="0" y="0"/>
+          <a:ext cx="0" cy="0"/>
+          <a:chOff x="0" y="0"/>
+          <a:chExt cx="0" cy="0"/>
+        </a:xfrm>
+      </p:grpSpPr>
+      <p:sp>
+        <p:nvSpPr>
+          <p:cNvPr id="5" name="TextBox 4"/>
+          <p:cNvSpPr txBox="1"/>
+          <p:nvPr/>
+        </p:nvSpPr>
+        <p:spPr>
+          <a:xfrm>
+            <a:off x="332656" y="195486"/>
+            <a:ext cx="5976664" cy="369332"/>
+          </a:xfrm>
+          <a:prstGeom prst="rect">
+            <a:avLst/>
+          </a:prstGeom>
+          <a:noFill/>
+        </p:spPr>
+        <p:txBody>
+          <a:bodyPr wrap="square" rtlCol="0">
+            <a:spAutoFit/>
+          </a:bodyPr>
+          <a:lstStyle/>
+          <a:p>
+            <a:r>
+              <a:rPr lang="en-ID" b="1" dirty="0" smtClean="0">
+                <a:solidFill>
+                  <a:srgbClr val="392900"/>
+                </a:solidFill>
+                <a:latin typeface="Bookman Old Style" panose="02050604050505020204" pitchFamily="18" charset="0"/>
+              </a:rPr>
+              <a:t>CDC – git merging / Part </a:t>
+            </a:r>
+            <a:r>
+              <a:rPr lang="en-ID" b="1" dirty="0" smtClean="0">
+                <a:solidFill>
+                  <a:srgbClr val="392900"/>
+                </a:solidFill>
+                <a:latin typeface="Bookman Old Style" panose="02050604050505020204" pitchFamily="18" charset="0"/>
+              </a:rPr>
+              <a:t>V </a:t>
+            </a:r>
+            <a:r>
+              <a:rPr lang="en-ID" b="1" dirty="0" smtClean="0">
+                <a:solidFill>
+                  <a:srgbClr val="392900"/>
+                </a:solidFill>
+                <a:latin typeface="Bookman Old Style" panose="02050604050505020204" pitchFamily="18" charset="0"/>
+              </a:rPr>
+              <a:t>– </a:t>
+            </a:r>
+            <a:r>
+              <a:rPr lang="en-ID" b="1" dirty="0" smtClean="0">
+                <a:solidFill>
+                  <a:srgbClr val="392900"/>
+                </a:solidFill>
+                <a:latin typeface="Bookman Old Style" panose="02050604050505020204" pitchFamily="18" charset="0"/>
+              </a:rPr>
+              <a:t>“Practice” </a:t>
+            </a:r>
+            <a:endParaRPr lang="en-ID" b="1" dirty="0" smtClean="0">
+              <a:solidFill>
+                <a:srgbClr val="392900"/>
+              </a:solidFill>
+              <a:latin typeface="Bookman Old Style" panose="02050604050505020204" pitchFamily="18" charset="0"/>
+            </a:endParaRPr>
+          </a:p>
+        </p:txBody>
+      </p:sp>
+      <p:sp>
+        <p:nvSpPr>
+          <p:cNvPr id="6" name="TextBox 5"/>
+          <p:cNvSpPr txBox="1"/>
+          <p:nvPr/>
+        </p:nvSpPr>
+        <p:spPr>
+          <a:xfrm>
+            <a:off x="4149080" y="4240875"/>
+            <a:ext cx="2808312" cy="369332"/>
+          </a:xfrm>
+          <a:prstGeom prst="rect">
+            <a:avLst/>
+          </a:prstGeom>
+          <a:noFill/>
+        </p:spPr>
+        <p:txBody>
+          <a:bodyPr wrap="square" rtlCol="0">
+            <a:spAutoFit/>
+          </a:bodyPr>
+          <a:lstStyle/>
+          <a:p>
+            <a:r>
+              <a:rPr lang="en-ID" dirty="0" smtClean="0">
+                <a:ln w="0"/>
+                <a:effectLst>
+                  <a:outerShdw blurRad="38100" dist="19050" dir="2700000" algn="tl" rotWithShape="0">
+                    <a:schemeClr val="dk1">
+                      <a:alpha val="40000"/>
+                    </a:schemeClr>
+                  </a:outerShdw>
+                </a:effectLst>
+                <a:latin typeface="Berlin Sans FB" panose="020E0602020502020306" pitchFamily="34" charset="0"/>
+              </a:rPr>
+              <a:t>“The shell is my friend!”</a:t>
+            </a:r>
+          </a:p>
+        </p:txBody>
+      </p:sp>
+      <p:sp>
+        <p:nvSpPr>
+          <p:cNvPr id="10" name="TextBox 9"/>
+          <p:cNvSpPr txBox="1"/>
+          <p:nvPr/>
+        </p:nvSpPr>
+        <p:spPr>
+          <a:xfrm>
+            <a:off x="485056" y="2794325"/>
+            <a:ext cx="5904656" cy="1815882"/>
+          </a:xfrm>
+          <a:prstGeom prst="rect">
+            <a:avLst/>
+          </a:prstGeom>
+          <a:noFill/>
+        </p:spPr>
+        <p:txBody>
+          <a:bodyPr wrap="square" rtlCol="0">
+            <a:spAutoFit/>
+          </a:bodyPr>
+          <a:lstStyle/>
+          <a:p>
+            <a:r>
+              <a:rPr lang="en-ID" sz="1600" dirty="0" smtClean="0"/>
+              <a:t>Exercise 2 – Merge Strategy - FF.</a:t>
+            </a:r>
+          </a:p>
+          <a:p>
+            <a:pPr marL="285750" indent="-285750">
+              <a:buFont typeface="Arial" panose="020B0604020202020204" pitchFamily="34" charset="0"/>
+              <a:buChar char="•"/>
+            </a:pPr>
+            <a:r>
+              <a:rPr lang="en-ID" sz="1600" dirty="0" smtClean="0"/>
+              <a:t>Clone repository with branch develop</a:t>
+            </a:r>
+            <a:endParaRPr lang="en-ID" sz="1600" dirty="0" smtClean="0"/>
+          </a:p>
+          <a:p>
+            <a:pPr marL="285750" indent="-285750">
+              <a:buFont typeface="Arial" panose="020B0604020202020204" pitchFamily="34" charset="0"/>
+              <a:buChar char="•"/>
+            </a:pPr>
+            <a:r>
+              <a:rPr lang="en-ID" sz="1600" dirty="0" smtClean="0"/>
+              <a:t>Create local feature-branch</a:t>
+            </a:r>
+          </a:p>
+          <a:p>
+            <a:pPr marL="285750" indent="-285750">
+              <a:buFont typeface="Arial" panose="020B0604020202020204" pitchFamily="34" charset="0"/>
+              <a:buChar char="•"/>
+            </a:pPr>
+            <a:r>
+              <a:rPr lang="en-ID" sz="1600" dirty="0" smtClean="0"/>
+              <a:t>Change/Edit/Add and commit </a:t>
+            </a:r>
+          </a:p>
+          <a:p>
+            <a:pPr marL="285750" indent="-285750">
+              <a:buFont typeface="Arial" panose="020B0604020202020204" pitchFamily="34" charset="0"/>
+              <a:buChar char="•"/>
+            </a:pPr>
+            <a:r>
+              <a:rPr lang="en-ID" sz="1600" dirty="0" smtClean="0"/>
+              <a:t>Merge back to develop with fast-forward (check history)</a:t>
+            </a:r>
+          </a:p>
+          <a:p>
+            <a:pPr marL="285750" indent="-285750">
+              <a:buFont typeface="Arial" panose="020B0604020202020204" pitchFamily="34" charset="0"/>
+              <a:buChar char="•"/>
+            </a:pPr>
+            <a:r>
+              <a:rPr lang="en-ID" sz="1600" dirty="0" smtClean="0"/>
+              <a:t>Publish to remote</a:t>
+            </a:r>
+          </a:p>
+          <a:p>
+            <a:pPr marL="285750" indent="-285750">
+              <a:buFont typeface="Arial" panose="020B0604020202020204" pitchFamily="34" charset="0"/>
+              <a:buChar char="•"/>
+            </a:pPr>
+            <a:r>
+              <a:rPr lang="en-ID" sz="1600" dirty="0" smtClean="0"/>
+              <a:t>Delete feature-branch</a:t>
+            </a:r>
+          </a:p>
+        </p:txBody>
+      </p:sp>
+      <p:sp>
+        <p:nvSpPr>
+          <p:cNvPr id="11" name="TextBox 10"/>
+          <p:cNvSpPr txBox="1"/>
+          <p:nvPr/>
+        </p:nvSpPr>
+        <p:spPr>
+          <a:xfrm>
+            <a:off x="485056" y="923950"/>
+            <a:ext cx="5904656" cy="1815882"/>
+          </a:xfrm>
+          <a:prstGeom prst="rect">
+            <a:avLst/>
+          </a:prstGeom>
+          <a:noFill/>
+        </p:spPr>
+        <p:txBody>
+          <a:bodyPr wrap="square" rtlCol="0">
+            <a:spAutoFit/>
+          </a:bodyPr>
+          <a:lstStyle/>
+          <a:p>
+            <a:r>
+              <a:rPr lang="en-ID" sz="1600" dirty="0" smtClean="0"/>
+              <a:t>Exercise 1 – Merge strategy - recursive.</a:t>
+            </a:r>
+          </a:p>
+          <a:p>
+            <a:pPr marL="285750" indent="-285750">
+              <a:buFont typeface="Arial" panose="020B0604020202020204" pitchFamily="34" charset="0"/>
+              <a:buChar char="•"/>
+            </a:pPr>
+            <a:r>
+              <a:rPr lang="en-ID" sz="1600" dirty="0" smtClean="0"/>
+              <a:t>Clone repository with branch develop</a:t>
+            </a:r>
+            <a:endParaRPr lang="en-ID" sz="1600" dirty="0" smtClean="0"/>
+          </a:p>
+          <a:p>
+            <a:pPr marL="285750" indent="-285750">
+              <a:buFont typeface="Arial" panose="020B0604020202020204" pitchFamily="34" charset="0"/>
+              <a:buChar char="•"/>
+            </a:pPr>
+            <a:r>
+              <a:rPr lang="en-ID" sz="1600" dirty="0" smtClean="0"/>
+              <a:t>Create local feature-branch</a:t>
+            </a:r>
+          </a:p>
+          <a:p>
+            <a:pPr marL="285750" indent="-285750">
+              <a:buFont typeface="Arial" panose="020B0604020202020204" pitchFamily="34" charset="0"/>
+              <a:buChar char="•"/>
+            </a:pPr>
+            <a:r>
+              <a:rPr lang="en-ID" sz="1600" dirty="0" smtClean="0"/>
+              <a:t>Change/Edit/Add and commit </a:t>
+            </a:r>
+          </a:p>
+          <a:p>
+            <a:pPr marL="285750" indent="-285750">
+              <a:buFont typeface="Arial" panose="020B0604020202020204" pitchFamily="34" charset="0"/>
+              <a:buChar char="•"/>
+            </a:pPr>
+            <a:r>
+              <a:rPr lang="en-ID" sz="1600" dirty="0" smtClean="0"/>
+              <a:t>Merge back to develop with recursive- strategy (check history)</a:t>
+            </a:r>
+          </a:p>
+          <a:p>
+            <a:pPr marL="285750" indent="-285750">
+              <a:buFont typeface="Arial" panose="020B0604020202020204" pitchFamily="34" charset="0"/>
+              <a:buChar char="•"/>
+            </a:pPr>
+            <a:r>
+              <a:rPr lang="en-ID" sz="1600" dirty="0" smtClean="0"/>
+              <a:t>Publish</a:t>
+            </a:r>
+            <a:r>
+              <a:rPr lang="en-US" sz="1600" dirty="0" smtClean="0"/>
+              <a:t> to remote</a:t>
+            </a:r>
+            <a:endParaRPr lang="en-ID" sz="1600" dirty="0" smtClean="0"/>
+          </a:p>
+          <a:p>
+            <a:pPr marL="285750" indent="-285750">
+              <a:buFont typeface="Arial" panose="020B0604020202020204" pitchFamily="34" charset="0"/>
+              <a:buChar char="•"/>
+            </a:pPr>
+            <a:r>
+              <a:rPr lang="en-ID" sz="1600" dirty="0" smtClean="0"/>
+              <a:t>Delete feature-branch</a:t>
+            </a:r>
+          </a:p>
+        </p:txBody>
+      </p:sp>
+    </p:spTree>
+    <p:extLst>
+      <p:ext uri="{BB962C8B-B14F-4D97-AF65-F5344CB8AC3E}">
+        <p14:creationId xmlns:p14="http://schemas.microsoft.com/office/powerpoint/2010/main" val="3693267280"/>
+      </p:ext>
+    </p:extLst>
+  </p:cSld>
+  <p:clrMapOvr>
+    <a:masterClrMapping/>
+  </p:clrMapOvr>
+  <p:timing>
+    <p:tnLst>
+      <p:par>
+        <p:cTn id="1" dur="indefinite" restart="never" nodeType="tmRoot"/>
+      </p:par>
+    </p:tnLst>
+  </p:timing>
+</p:sld>
+</file>
+
+<file path=ppt/slides/slide16.xml><?xml version="1.0" encoding="utf-8"?>
+<p:sld xmlns:a="http://schemas.openxmlformats.org/drawingml/2006/main" xmlns:r="http://schemas.openxmlformats.org/officeDocument/2006/relationships" xmlns:p="http://schemas.openxmlformats.org/presentationml/2006/main">
+  <p:cSld>
+    <p:spTree>
+      <p:nvGrpSpPr>
+        <p:cNvPr id="1" name=""/>
+        <p:cNvGrpSpPr/>
+        <p:nvPr/>
+      </p:nvGrpSpPr>
+      <p:grpSpPr>
+        <a:xfrm>
+          <a:off x="0" y="0"/>
+          <a:ext cx="0" cy="0"/>
+          <a:chOff x="0" y="0"/>
+          <a:chExt cx="0" cy="0"/>
+        </a:xfrm>
+      </p:grpSpPr>
+      <p:sp>
+        <p:nvSpPr>
+          <p:cNvPr id="5" name="TextBox 4"/>
+          <p:cNvSpPr txBox="1"/>
+          <p:nvPr/>
+        </p:nvSpPr>
+        <p:spPr>
+          <a:xfrm>
+            <a:off x="332656" y="195486"/>
+            <a:ext cx="5976664" cy="369332"/>
+          </a:xfrm>
+          <a:prstGeom prst="rect">
+            <a:avLst/>
+          </a:prstGeom>
+          <a:noFill/>
+        </p:spPr>
+        <p:txBody>
+          <a:bodyPr wrap="square" rtlCol="0">
+            <a:spAutoFit/>
+          </a:bodyPr>
+          <a:lstStyle/>
+          <a:p>
+            <a:r>
+              <a:rPr lang="en-ID" b="1" dirty="0" smtClean="0">
+                <a:solidFill>
+                  <a:srgbClr val="392900"/>
+                </a:solidFill>
+                <a:latin typeface="Bookman Old Style" panose="02050604050505020204" pitchFamily="18" charset="0"/>
+              </a:rPr>
+              <a:t>CDC – git merging / Part </a:t>
+            </a:r>
+            <a:r>
+              <a:rPr lang="en-ID" b="1" dirty="0" smtClean="0">
+                <a:solidFill>
+                  <a:srgbClr val="392900"/>
+                </a:solidFill>
+                <a:latin typeface="Bookman Old Style" panose="02050604050505020204" pitchFamily="18" charset="0"/>
+              </a:rPr>
+              <a:t>V </a:t>
+            </a:r>
+            <a:r>
+              <a:rPr lang="en-ID" b="1" dirty="0" smtClean="0">
+                <a:solidFill>
+                  <a:srgbClr val="392900"/>
+                </a:solidFill>
+                <a:latin typeface="Bookman Old Style" panose="02050604050505020204" pitchFamily="18" charset="0"/>
+              </a:rPr>
+              <a:t>– </a:t>
+            </a:r>
+            <a:r>
+              <a:rPr lang="en-ID" b="1" dirty="0" smtClean="0">
+                <a:solidFill>
+                  <a:srgbClr val="392900"/>
+                </a:solidFill>
+                <a:latin typeface="Bookman Old Style" panose="02050604050505020204" pitchFamily="18" charset="0"/>
+              </a:rPr>
+              <a:t>“Practice” </a:t>
+            </a:r>
+            <a:endParaRPr lang="en-ID" b="1" dirty="0" smtClean="0">
+              <a:solidFill>
+                <a:srgbClr val="392900"/>
+              </a:solidFill>
+              <a:latin typeface="Bookman Old Style" panose="02050604050505020204" pitchFamily="18" charset="0"/>
+            </a:endParaRPr>
+          </a:p>
+        </p:txBody>
+      </p:sp>
+      <p:sp>
+        <p:nvSpPr>
+          <p:cNvPr id="6" name="TextBox 5"/>
+          <p:cNvSpPr txBox="1"/>
+          <p:nvPr/>
+        </p:nvSpPr>
+        <p:spPr>
+          <a:xfrm>
+            <a:off x="4149080" y="4240875"/>
+            <a:ext cx="2808312" cy="369332"/>
+          </a:xfrm>
+          <a:prstGeom prst="rect">
+            <a:avLst/>
+          </a:prstGeom>
+          <a:noFill/>
+        </p:spPr>
+        <p:txBody>
+          <a:bodyPr wrap="square" rtlCol="0">
+            <a:spAutoFit/>
+          </a:bodyPr>
+          <a:lstStyle/>
+          <a:p>
+            <a:r>
+              <a:rPr lang="en-ID" dirty="0" smtClean="0">
+                <a:ln w="0"/>
+                <a:effectLst>
+                  <a:outerShdw blurRad="38100" dist="19050" dir="2700000" algn="tl" rotWithShape="0">
+                    <a:schemeClr val="dk1">
+                      <a:alpha val="40000"/>
+                    </a:schemeClr>
+                  </a:outerShdw>
+                </a:effectLst>
+                <a:latin typeface="Berlin Sans FB" panose="020E0602020502020306" pitchFamily="34" charset="0"/>
+              </a:rPr>
+              <a:t>“The shell is my friend!”</a:t>
+            </a:r>
+          </a:p>
+        </p:txBody>
+      </p:sp>
+      <p:sp>
+        <p:nvSpPr>
+          <p:cNvPr id="11" name="TextBox 10"/>
+          <p:cNvSpPr txBox="1"/>
+          <p:nvPr/>
+        </p:nvSpPr>
+        <p:spPr>
+          <a:xfrm>
+            <a:off x="485056" y="923950"/>
+            <a:ext cx="5904656" cy="2062103"/>
+          </a:xfrm>
+          <a:prstGeom prst="rect">
+            <a:avLst/>
+          </a:prstGeom>
+          <a:noFill/>
+        </p:spPr>
+        <p:txBody>
+          <a:bodyPr wrap="square" rtlCol="0">
+            <a:spAutoFit/>
+          </a:bodyPr>
+          <a:lstStyle/>
+          <a:p>
+            <a:r>
+              <a:rPr lang="en-ID" sz="1600" dirty="0" smtClean="0"/>
+              <a:t>Exercise 3 – Working with remote feature branch:</a:t>
+            </a:r>
+          </a:p>
+          <a:p>
+            <a:pPr marL="285750" indent="-285750">
+              <a:buFont typeface="Arial" panose="020B0604020202020204" pitchFamily="34" charset="0"/>
+              <a:buChar char="•"/>
+            </a:pPr>
+            <a:r>
+              <a:rPr lang="en-ID" sz="1600" dirty="0" smtClean="0"/>
+              <a:t>Clone repository with branch develop</a:t>
+            </a:r>
+            <a:endParaRPr lang="en-ID" sz="1600" dirty="0" smtClean="0"/>
+          </a:p>
+          <a:p>
+            <a:pPr marL="285750" indent="-285750">
+              <a:buFont typeface="Arial" panose="020B0604020202020204" pitchFamily="34" charset="0"/>
+              <a:buChar char="•"/>
+            </a:pPr>
+            <a:r>
+              <a:rPr lang="en-ID" sz="1600" dirty="0" smtClean="0"/>
+              <a:t>Create local feature-branch</a:t>
+            </a:r>
+          </a:p>
+          <a:p>
+            <a:pPr marL="285750" indent="-285750">
+              <a:buFont typeface="Arial" panose="020B0604020202020204" pitchFamily="34" charset="0"/>
+              <a:buChar char="•"/>
+            </a:pPr>
+            <a:r>
+              <a:rPr lang="en-ID" sz="1600" dirty="0" smtClean="0"/>
+              <a:t>Change/Edit/Add and commit </a:t>
+            </a:r>
+          </a:p>
+          <a:p>
+            <a:pPr marL="285750" indent="-285750">
+              <a:buFont typeface="Arial" panose="020B0604020202020204" pitchFamily="34" charset="0"/>
+              <a:buChar char="•"/>
+            </a:pPr>
+            <a:r>
+              <a:rPr lang="en-ID" sz="1600" dirty="0" smtClean="0"/>
+              <a:t>Publish feature-branch to remote (check on </a:t>
+            </a:r>
+            <a:r>
+              <a:rPr lang="en-ID" sz="1600" dirty="0" err="1" smtClean="0"/>
+              <a:t>github</a:t>
+            </a:r>
+            <a:r>
+              <a:rPr lang="en-ID" sz="1600" dirty="0" smtClean="0"/>
+              <a:t>)</a:t>
+            </a:r>
+            <a:endParaRPr lang="en-ID" sz="1600" dirty="0" smtClean="0"/>
+          </a:p>
+          <a:p>
+            <a:pPr marL="285750" indent="-285750">
+              <a:buFont typeface="Arial" panose="020B0604020202020204" pitchFamily="34" charset="0"/>
+              <a:buChar char="•"/>
+            </a:pPr>
+            <a:r>
+              <a:rPr lang="en-ID" sz="1600" dirty="0" smtClean="0"/>
+              <a:t>Merge back to develop with recursive- strategy</a:t>
+            </a:r>
+          </a:p>
+          <a:p>
+            <a:pPr marL="285750" indent="-285750">
+              <a:buFont typeface="Arial" panose="020B0604020202020204" pitchFamily="34" charset="0"/>
+              <a:buChar char="•"/>
+            </a:pPr>
+            <a:r>
+              <a:rPr lang="en-ID" sz="1600" dirty="0"/>
+              <a:t>Publish </a:t>
+            </a:r>
+            <a:r>
+              <a:rPr lang="en-ID" sz="1600" dirty="0" smtClean="0"/>
+              <a:t>to remote</a:t>
+            </a:r>
+          </a:p>
+          <a:p>
+            <a:pPr marL="285750" indent="-285750">
+              <a:buFont typeface="Arial" panose="020B0604020202020204" pitchFamily="34" charset="0"/>
+              <a:buChar char="•"/>
+            </a:pPr>
+            <a:r>
+              <a:rPr lang="en-ID" sz="1600" dirty="0" smtClean="0"/>
+              <a:t>Delete remote- feature-branch</a:t>
+            </a:r>
+          </a:p>
+        </p:txBody>
+      </p:sp>
+    </p:spTree>
+    <p:extLst>
+      <p:ext uri="{BB962C8B-B14F-4D97-AF65-F5344CB8AC3E}">
+        <p14:creationId xmlns:p14="http://schemas.microsoft.com/office/powerpoint/2010/main" val="555219424"/>
       </p:ext>
     </p:extLst>
   </p:cSld>
@@ -4354,7 +5896,7 @@
         <p:spPr>
           <a:xfrm>
             <a:off x="332656" y="195486"/>
-            <a:ext cx="4797152" cy="646331"/>
+            <a:ext cx="6192688" cy="369332"/>
           </a:xfrm>
           <a:prstGeom prst="rect">
             <a:avLst/>
@@ -4374,10 +5916,8 @@
                 </a:solidFill>
                 <a:latin typeface="Bookman Old Style" panose="02050604050505020204" pitchFamily="18" charset="0"/>
               </a:rPr>
-              <a:t>CDC – git merging / Theory </a:t>
-            </a:r>
-          </a:p>
-          <a:p>
+              <a:t>CDC – git merging / </a:t>
+            </a:r>
             <a:r>
               <a:rPr lang="en-ID" b="1" dirty="0" smtClean="0">
                 <a:solidFill>
@@ -4385,7 +5925,16 @@
                 </a:solidFill>
                 <a:latin typeface="Bookman Old Style" panose="02050604050505020204" pitchFamily="18" charset="0"/>
               </a:rPr>
-              <a:t>Workflow!</a:t>
+              <a:t>Introduction</a:t>
+            </a:r>
+            <a:r>
+              <a:rPr lang="en-ID" b="1" dirty="0" smtClean="0">
+                <a:solidFill>
+                  <a:srgbClr val="392900"/>
+                </a:solidFill>
+                <a:latin typeface="Bookman Old Style" panose="02050604050505020204" pitchFamily="18" charset="0"/>
+              </a:rPr>
+              <a:t> – “Workflow”</a:t>
             </a:r>
             <a:endParaRPr lang="en-US" b="1" dirty="0">
               <a:solidFill>
@@ -4442,7 +5991,7 @@
         <p:spPr>
           <a:xfrm>
             <a:off x="332656" y="195486"/>
-            <a:ext cx="4797152" cy="646331"/>
+            <a:ext cx="6336704" cy="369332"/>
           </a:xfrm>
           <a:prstGeom prst="rect">
             <a:avLst/>
@@ -4462,10 +6011,8 @@
                 </a:solidFill>
                 <a:latin typeface="Bookman Old Style" panose="02050604050505020204" pitchFamily="18" charset="0"/>
               </a:rPr>
-              <a:t>CDC – git merging / Theory </a:t>
-            </a:r>
-          </a:p>
-          <a:p>
+              <a:t>CDC – git merging / </a:t>
+            </a:r>
             <a:r>
               <a:rPr lang="en-ID" b="1" dirty="0" smtClean="0">
                 <a:solidFill>
@@ -4473,7 +6020,7 @@
                 </a:solidFill>
                 <a:latin typeface="Bookman Old Style" panose="02050604050505020204" pitchFamily="18" charset="0"/>
               </a:rPr>
-              <a:t>Workflow!</a:t>
+              <a:t>Introduction – “Workflow”</a:t>
             </a:r>
             <a:endParaRPr lang="en-US" b="1" dirty="0">
               <a:solidFill>
@@ -4506,7 +6053,7 @@
         </p:blipFill>
         <p:spPr>
           <a:xfrm>
-            <a:off x="2521932" y="987575"/>
+            <a:off x="2492896" y="915566"/>
             <a:ext cx="1814136" cy="3168350"/>
           </a:xfrm>
           <a:prstGeom prst="rect">
@@ -4772,7 +6319,7 @@
         <p:spPr>
           <a:xfrm>
             <a:off x="332656" y="195486"/>
-            <a:ext cx="4797152" cy="646331"/>
+            <a:ext cx="6408712" cy="369332"/>
           </a:xfrm>
           <a:prstGeom prst="rect">
             <a:avLst/>
@@ -4792,10 +6339,8 @@
                 </a:solidFill>
                 <a:latin typeface="Bookman Old Style" panose="02050604050505020204" pitchFamily="18" charset="0"/>
               </a:rPr>
-              <a:t>CDC – git merging / Theory </a:t>
-            </a:r>
-          </a:p>
-          <a:p>
+              <a:t>CDC – git merging / </a:t>
+            </a:r>
             <a:r>
               <a:rPr lang="en-ID" b="1" dirty="0" smtClean="0">
                 <a:solidFill>
@@ -4803,7 +6348,7 @@
                 </a:solidFill>
                 <a:latin typeface="Bookman Old Style" panose="02050604050505020204" pitchFamily="18" charset="0"/>
               </a:rPr>
-              <a:t>Conventions!</a:t>
+              <a:t>Introduction – “Conventions”</a:t>
             </a:r>
             <a:endParaRPr lang="en-US" b="1" dirty="0">
               <a:solidFill>
@@ -4888,8 +6433,23 @@
                 </a:solidFill>
                 <a:latin typeface="Bookman Old Style" panose="02050604050505020204" pitchFamily="18" charset="0"/>
               </a:rPr>
-              <a:t>CDC – git merging / Part I - Setup</a:t>
-            </a:r>
+              <a:t>CDC – git merging / Part I </a:t>
+            </a:r>
+            <a:r>
+              <a:rPr lang="en-ID" b="1" dirty="0" smtClean="0">
+                <a:solidFill>
+                  <a:srgbClr val="392900"/>
+                </a:solidFill>
+                <a:latin typeface="Bookman Old Style" panose="02050604050505020204" pitchFamily="18" charset="0"/>
+              </a:rPr>
+              <a:t>– “Setup”</a:t>
+            </a:r>
+            <a:endParaRPr lang="en-ID" b="1" dirty="0" smtClean="0">
+              <a:solidFill>
+                <a:srgbClr val="392900"/>
+              </a:solidFill>
+              <a:latin typeface="Bookman Old Style" panose="02050604050505020204" pitchFamily="18" charset="0"/>
+            </a:endParaRPr>
           </a:p>
           <a:p>
             <a:r>
@@ -4921,7 +6481,7 @@
         <p:spPr>
           <a:xfrm>
             <a:off x="332656" y="1347614"/>
-            <a:ext cx="6192688" cy="2862322"/>
+            <a:ext cx="6192688" cy="3139321"/>
           </a:xfrm>
           <a:prstGeom prst="rect">
             <a:avLst/>
@@ -4983,12 +6543,12 @@
               <a:buChar char="•"/>
             </a:pPr>
             <a:r>
-              <a:rPr lang="en-ID" dirty="0" err="1" smtClean="0"/>
-              <a:t>Github</a:t>
-            </a:r>
-            <a:r>
               <a:rPr lang="en-ID" dirty="0" smtClean="0"/>
-              <a:t> URL to a repository</a:t>
+              <a:t>Project </a:t>
+            </a:r>
+            <a:r>
+              <a:rPr lang="en-ID" dirty="0" smtClean="0"/>
+              <a:t>URL to a repository</a:t>
             </a:r>
           </a:p>
           <a:p>
@@ -5011,13 +6571,40 @@
               <a:t>Working with “</a:t>
             </a:r>
             <a:r>
-              <a:rPr lang="en-ID" dirty="0" err="1" smtClean="0"/>
-              <a:t>Gitflow</a:t>
-            </a:r>
-            <a:r>
               <a:rPr lang="en-ID" dirty="0" smtClean="0"/>
-              <a:t>”, branch from develop, create a local feature branch, implement your task, push it </a:t>
-            </a:r>
+              <a:t>Gitflow”</a:t>
+            </a:r>
+          </a:p>
+          <a:p>
+            <a:pPr marL="1657350" lvl="3" indent="-285750">
+              <a:buFont typeface="Arial" panose="020B0604020202020204" pitchFamily="34" charset="0"/>
+              <a:buChar char="•"/>
+            </a:pPr>
+            <a:r>
+              <a:rPr lang="en-ID" dirty="0" smtClean="0"/>
+              <a:t>Branch </a:t>
+            </a:r>
+            <a:r>
+              <a:rPr lang="en-ID" dirty="0" smtClean="0"/>
+              <a:t>from develop, create a local feature branch, implement your task, </a:t>
+            </a:r>
+            <a:r>
+              <a:rPr lang="en-ID" dirty="0" smtClean="0"/>
+              <a:t>merge it back and push </a:t>
+            </a:r>
+            <a:r>
+              <a:rPr lang="en-ID" dirty="0" smtClean="0"/>
+              <a:t>it </a:t>
+            </a:r>
+            <a:r>
+              <a:rPr lang="en-ID" dirty="0" smtClean="0"/>
+              <a:t>to develop! </a:t>
+            </a:r>
+            <a:r>
+              <a:rPr lang="en-ID" dirty="0" smtClean="0"/>
+              <a:t>ASAP</a:t>
+            </a:r>
+            <a:endParaRPr lang="en-ID" dirty="0" smtClean="0"/>
           </a:p>
           <a:p>
             <a:endParaRPr lang="en-US" dirty="0"/>
@@ -5196,8 +6783,23 @@
                 </a:solidFill>
                 <a:latin typeface="Bookman Old Style" panose="02050604050505020204" pitchFamily="18" charset="0"/>
               </a:rPr>
-              <a:t>CDC – git merging / Part I - Setup</a:t>
-            </a:r>
+              <a:t>CDC – git merging / Part I </a:t>
+            </a:r>
+            <a:r>
+              <a:rPr lang="en-ID" b="1" dirty="0" smtClean="0">
+                <a:solidFill>
+                  <a:srgbClr val="392900"/>
+                </a:solidFill>
+                <a:latin typeface="Bookman Old Style" panose="02050604050505020204" pitchFamily="18" charset="0"/>
+              </a:rPr>
+              <a:t>– “Setup”</a:t>
+            </a:r>
+            <a:endParaRPr lang="en-ID" b="1" dirty="0" smtClean="0">
+              <a:solidFill>
+                <a:srgbClr val="392900"/>
+              </a:solidFill>
+              <a:latin typeface="Bookman Old Style" panose="02050604050505020204" pitchFamily="18" charset="0"/>
+            </a:endParaRPr>
           </a:p>
           <a:p>
             <a:r>
@@ -5397,8 +6999,23 @@
                 </a:solidFill>
                 <a:latin typeface="Bookman Old Style" panose="02050604050505020204" pitchFamily="18" charset="0"/>
               </a:rPr>
-              <a:t>CDC – git merging / Part I - Setup</a:t>
-            </a:r>
+              <a:t>CDC – git merging / Part I </a:t>
+            </a:r>
+            <a:r>
+              <a:rPr lang="en-ID" b="1" dirty="0" smtClean="0">
+                <a:solidFill>
+                  <a:srgbClr val="392900"/>
+                </a:solidFill>
+                <a:latin typeface="Bookman Old Style" panose="02050604050505020204" pitchFamily="18" charset="0"/>
+              </a:rPr>
+              <a:t>– “Setup”</a:t>
+            </a:r>
+            <a:endParaRPr lang="en-ID" b="1" dirty="0" smtClean="0">
+              <a:solidFill>
+                <a:srgbClr val="392900"/>
+              </a:solidFill>
+              <a:latin typeface="Bookman Old Style" panose="02050604050505020204" pitchFamily="18" charset="0"/>
+            </a:endParaRPr>
           </a:p>
           <a:p>
             <a:r>
@@ -5680,11 +7297,18 @@
               <a:t>$git </a:t>
             </a:r>
             <a:r>
+              <a:rPr lang="en-ID" sz="1200" dirty="0" err="1">
+                <a:latin typeface="Courier New" panose="02070309020205020404" pitchFamily="49" charset="0"/>
+                <a:cs typeface="Courier New" panose="02070309020205020404" pitchFamily="49" charset="0"/>
+              </a:rPr>
+              <a:t>config</a:t>
+            </a:r>
+            <a:r>
               <a:rPr lang="en-ID" sz="1200" dirty="0">
                 <a:latin typeface="Courier New" panose="02070309020205020404" pitchFamily="49" charset="0"/>
                 <a:cs typeface="Courier New" panose="02070309020205020404" pitchFamily="49" charset="0"/>
               </a:rPr>
-              <a:t>config </a:t>
+              <a:t> </a:t>
             </a:r>
             <a:r>
               <a:rPr lang="en-ID" sz="1200" dirty="0" smtClean="0">
@@ -5698,14 +7322,21 @@
                 <a:latin typeface="Courier New" panose="02070309020205020404" pitchFamily="49" charset="0"/>
                 <a:cs typeface="Courier New" panose="02070309020205020404" pitchFamily="49" charset="0"/>
               </a:rPr>
-              <a:t>user.name </a:t>
+              <a:t>user.name “Thomas </a:t>
+            </a:r>
+            <a:r>
+              <a:rPr lang="en-ID" sz="1200" dirty="0" err="1">
+                <a:latin typeface="Courier New" panose="02070309020205020404" pitchFamily="49" charset="0"/>
+                <a:cs typeface="Courier New" panose="02070309020205020404" pitchFamily="49" charset="0"/>
+              </a:rPr>
+              <a:t>Rothe</a:t>
             </a:r>
             <a:r>
               <a:rPr lang="en-ID" sz="1200" dirty="0" smtClean="0">
                 <a:latin typeface="Courier New" panose="02070309020205020404" pitchFamily="49" charset="0"/>
                 <a:cs typeface="Courier New" panose="02070309020205020404" pitchFamily="49" charset="0"/>
               </a:rPr>
-              <a:t>“Ben Kenobi”</a:t>
+              <a:t>”</a:t>
             </a:r>
             <a:endParaRPr lang="en-ID" sz="1200" dirty="0">
               <a:latin typeface="Courier New" panose="02070309020205020404" pitchFamily="49" charset="0"/>
@@ -5721,11 +7352,18 @@
               <a:t>$git </a:t>
             </a:r>
             <a:r>
+              <a:rPr lang="en-ID" sz="1200" dirty="0" err="1">
+                <a:latin typeface="Courier New" panose="02070309020205020404" pitchFamily="49" charset="0"/>
+                <a:cs typeface="Courier New" panose="02070309020205020404" pitchFamily="49" charset="0"/>
+              </a:rPr>
+              <a:t>config</a:t>
+            </a:r>
+            <a:r>
               <a:rPr lang="en-ID" sz="1200" dirty="0">
                 <a:latin typeface="Courier New" panose="02070309020205020404" pitchFamily="49" charset="0"/>
                 <a:cs typeface="Courier New" panose="02070309020205020404" pitchFamily="49" charset="0"/>
               </a:rPr>
-              <a:t>config --global </a:t>
+              <a:t> --global </a:t>
             </a:r>
             <a:r>
               <a:rPr lang="en-ID" sz="1200" dirty="0" err="1">
@@ -5746,28 +7384,7 @@
                 <a:latin typeface="Courier New" panose="02070309020205020404" pitchFamily="49" charset="0"/>
                 <a:cs typeface="Courier New" panose="02070309020205020404" pitchFamily="49" charset="0"/>
               </a:rPr>
-              <a:t>“</a:t>
-            </a:r>
-            <a:r>
-              <a:rPr lang="en-ID" sz="1200" dirty="0" smtClean="0">
-                <a:latin typeface="Courier New" panose="02070309020205020404" pitchFamily="49" charset="0"/>
-                <a:cs typeface="Courier New" panose="02070309020205020404" pitchFamily="49" charset="0"/>
-              </a:rPr>
-              <a:t>ben</a:t>
-            </a:r>
-            <a:r>
-              <a:rPr lang="en-ID" sz="1200" dirty="0" smtClean="0">
-                <a:latin typeface="Courier New" panose="02070309020205020404" pitchFamily="49" charset="0"/>
-                <a:cs typeface="Courier New" panose="02070309020205020404" pitchFamily="49" charset="0"/>
-              </a:rPr>
-              <a:t>.kenobi@jedi.com</a:t>
-            </a:r>
-            <a:r>
-              <a:rPr lang="en-ID" sz="1200" dirty="0" smtClean="0">
-                <a:latin typeface="Courier New" panose="02070309020205020404" pitchFamily="49" charset="0"/>
-                <a:cs typeface="Courier New" panose="02070309020205020404" pitchFamily="49" charset="0"/>
-              </a:rPr>
-              <a:t>"</a:t>
+              <a:t>"thomas.rothe@mitrais.com"</a:t>
             </a:r>
           </a:p>
           <a:p>
@@ -6050,7 +7667,7 @@
         <p:spPr>
           <a:xfrm>
             <a:off x="332656" y="195486"/>
-            <a:ext cx="5976664" cy="646331"/>
+            <a:ext cx="5976664" cy="369332"/>
           </a:xfrm>
           <a:prstGeom prst="rect">
             <a:avLst/>
@@ -6072,14 +7689,6 @@
               </a:rPr>
               <a:t>CDC – git merging / Part II – “The Daily Work” </a:t>
             </a:r>
-          </a:p>
-          <a:p>
-            <a:endParaRPr lang="en-US" b="1" dirty="0">
-              <a:solidFill>
-                <a:srgbClr val="392900"/>
-              </a:solidFill>
-              <a:latin typeface="Bookman Old Style" panose="02050604050505020204" pitchFamily="18" charset="0"/>
-            </a:endParaRPr>
           </a:p>
         </p:txBody>
       </p:sp>
@@ -6375,13 +7984,15 @@
         </p:nvSpPr>
         <p:spPr>
           <a:xfrm>
-            <a:off x="328932" y="4240875"/>
-            <a:ext cx="2746073" cy="369332"/>
-          </a:xfrm>
-          <a:prstGeom prst="rect">
-            <a:avLst/>
-          </a:prstGeom>
-          <a:noFill/>
+            <a:off x="927557" y="4193323"/>
+            <a:ext cx="1406732" cy="307777"/>
+          </a:xfrm>
+          <a:prstGeom prst="rect">
+            <a:avLst/>
+          </a:prstGeom>
+          <a:solidFill>
+            <a:srgbClr val="C00000"/>
+          </a:solidFill>
         </p:spPr>
         <p:txBody>
           <a:bodyPr wrap="none" rtlCol="0">
@@ -6390,10 +8001,26 @@
           <a:lstStyle/>
           <a:p>
             <a:r>
-              <a:rPr lang="en-ID" dirty="0" smtClean="0"/>
-              <a:t>Edit some files … go ahead!</a:t>
-            </a:r>
-            <a:endParaRPr lang="en-US" dirty="0"/>
+              <a:rPr lang="en-ID" sz="1400" dirty="0" smtClean="0">
+                <a:solidFill>
+                  <a:srgbClr val="FFC000"/>
+                </a:solidFill>
+              </a:rPr>
+              <a:t>Edit some </a:t>
+            </a:r>
+            <a:r>
+              <a:rPr lang="en-ID" sz="1400" dirty="0" smtClean="0">
+                <a:solidFill>
+                  <a:srgbClr val="FFC000"/>
+                </a:solidFill>
+              </a:rPr>
+              <a:t>files…</a:t>
+            </a:r>
+            <a:endParaRPr lang="en-US" sz="1400" dirty="0">
+              <a:solidFill>
+                <a:srgbClr val="FFC000"/>
+              </a:solidFill>
+            </a:endParaRPr>
           </a:p>
         </p:txBody>
       </p:sp>
@@ -6406,7 +8033,7 @@
           <p:nvPr/>
         </p:nvPicPr>
         <p:blipFill>
-          <a:blip r:embed="rId2" cstate="print">
+          <a:blip r:embed="rId3" cstate="print">
             <a:extLst>
               <a:ext uri="{28A0092B-C50C-407E-A947-70E740481C1C}">
                 <a14:useLocalDpi xmlns:a14="http://schemas.microsoft.com/office/drawing/2010/main" val="0"/>
@@ -6421,6 +8048,36 @@
           <a:xfrm>
             <a:off x="5612655" y="735609"/>
             <a:ext cx="912689" cy="820265"/>
+          </a:xfrm>
+          <a:prstGeom prst="rect">
+            <a:avLst/>
+          </a:prstGeom>
+        </p:spPr>
+      </p:pic>
+      <p:pic>
+        <p:nvPicPr>
+          <p:cNvPr id="4" name="Picture 3"/>
+          <p:cNvPicPr>
+            <a:picLocks noChangeAspect="1"/>
+          </p:cNvPicPr>
+          <p:nvPr/>
+        </p:nvPicPr>
+        <p:blipFill>
+          <a:blip r:embed="rId4" cstate="print">
+            <a:extLst>
+              <a:ext uri="{28A0092B-C50C-407E-A947-70E740481C1C}">
+                <a14:useLocalDpi xmlns:a14="http://schemas.microsoft.com/office/drawing/2010/main" val="0"/>
+              </a:ext>
+            </a:extLst>
+          </a:blip>
+          <a:stretch>
+            <a:fillRect/>
+          </a:stretch>
+        </p:blipFill>
+        <p:spPr>
+          <a:xfrm>
+            <a:off x="328932" y="4041624"/>
+            <a:ext cx="611177" cy="611177"/>
           </a:xfrm>
           <a:prstGeom prst="rect">
             <a:avLst/>
@@ -6473,7 +8130,7 @@
         <p:spPr>
           <a:xfrm>
             <a:off x="332656" y="195486"/>
-            <a:ext cx="5976664" cy="646331"/>
+            <a:ext cx="5976664" cy="369332"/>
           </a:xfrm>
           <a:prstGeom prst="rect">
             <a:avLst/>
@@ -6495,14 +8152,6 @@
               </a:rPr>
               <a:t>CDC – git merging / Part II – “Work Done!” </a:t>
             </a:r>
-          </a:p>
-          <a:p>
-            <a:endParaRPr lang="en-US" b="1" dirty="0">
-              <a:solidFill>
-                <a:srgbClr val="392900"/>
-              </a:solidFill>
-              <a:latin typeface="Bookman Old Style" panose="02050604050505020204" pitchFamily="18" charset="0"/>
-            </a:endParaRPr>
           </a:p>
         </p:txBody>
       </p:sp>
@@ -6553,8 +8202,8 @@
         </p:nvSpPr>
         <p:spPr>
           <a:xfrm>
-            <a:off x="328932" y="2763547"/>
-            <a:ext cx="6192688" cy="1200329"/>
+            <a:off x="328932" y="3126820"/>
+            <a:ext cx="6196412" cy="830997"/>
           </a:xfrm>
           <a:prstGeom prst="rect">
             <a:avLst/>
@@ -6594,7 +8243,14 @@
                 <a:latin typeface="Courier New" panose="02070309020205020404" pitchFamily="49" charset="0"/>
                 <a:cs typeface="Courier New" panose="02070309020205020404" pitchFamily="49" charset="0"/>
               </a:rPr>
-              <a:t>$git fetch</a:t>
+              <a:t>$git </a:t>
+            </a:r>
+            <a:r>
+              <a:rPr lang="en-ID" sz="1200" dirty="0" smtClean="0">
+                <a:latin typeface="Courier New" panose="02070309020205020404" pitchFamily="49" charset="0"/>
+                <a:cs typeface="Courier New" panose="02070309020205020404" pitchFamily="49" charset="0"/>
+              </a:rPr>
+              <a:t>pull </a:t>
             </a:r>
             <a:endParaRPr lang="en-ID" sz="1200" dirty="0">
               <a:latin typeface="Courier New" panose="02070309020205020404" pitchFamily="49" charset="0"/>
@@ -6607,122 +8263,64 @@
                 <a:latin typeface="Courier New" panose="02070309020205020404" pitchFamily="49" charset="0"/>
                 <a:cs typeface="Courier New" panose="02070309020205020404" pitchFamily="49" charset="0"/>
               </a:rPr>
-              <a:t>$git </a:t>
+              <a:t>$</a:t>
+            </a:r>
+            <a:r>
+              <a:rPr lang="en-ID" sz="1200" dirty="0" smtClean="0">
+                <a:latin typeface="Courier New" panose="02070309020205020404" pitchFamily="49" charset="0"/>
+                <a:cs typeface="Courier New" panose="02070309020205020404" pitchFamily="49" charset="0"/>
+              </a:rPr>
+              <a:t>git </a:t>
             </a:r>
             <a:r>
               <a:rPr lang="en-ID" sz="1200" dirty="0">
                 <a:latin typeface="Courier New" panose="02070309020205020404" pitchFamily="49" charset="0"/>
                 <a:cs typeface="Courier New" panose="02070309020205020404" pitchFamily="49" charset="0"/>
               </a:rPr>
-              <a:t>checkout </a:t>
+              <a:t>merge </a:t>
             </a:r>
             <a:r>
               <a:rPr lang="en-ID" sz="1200" dirty="0" smtClean="0">
                 <a:latin typeface="Courier New" panose="02070309020205020404" pitchFamily="49" charset="0"/>
                 <a:cs typeface="Courier New" panose="02070309020205020404" pitchFamily="49" charset="0"/>
               </a:rPr>
-              <a:t>&lt;unique-name&gt;</a:t>
+              <a:t>--no-</a:t>
+            </a:r>
+            <a:r>
+              <a:rPr lang="en-ID" sz="1200" dirty="0" err="1" smtClean="0">
+                <a:latin typeface="Courier New" panose="02070309020205020404" pitchFamily="49" charset="0"/>
+                <a:cs typeface="Courier New" panose="02070309020205020404" pitchFamily="49" charset="0"/>
+              </a:rPr>
+              <a:t>ff</a:t>
+            </a:r>
+            <a:r>
+              <a:rPr lang="en-ID" sz="1200" dirty="0" smtClean="0">
+                <a:latin typeface="Courier New" panose="02070309020205020404" pitchFamily="49" charset="0"/>
+                <a:cs typeface="Courier New" panose="02070309020205020404" pitchFamily="49" charset="0"/>
+              </a:rPr>
+              <a:t> &lt;unique-name</a:t>
+            </a:r>
+            <a:r>
+              <a:rPr lang="en-ID" sz="1200" dirty="0" smtClean="0">
+                <a:latin typeface="Courier New" panose="02070309020205020404" pitchFamily="49" charset="0"/>
+                <a:cs typeface="Courier New" panose="02070309020205020404" pitchFamily="49" charset="0"/>
+              </a:rPr>
+              <a:t>&gt;</a:t>
+            </a:r>
+          </a:p>
+          <a:p>
+            <a:r>
+              <a:rPr lang="en-ID" sz="1200" dirty="0" smtClean="0">
+                <a:latin typeface="Courier New" panose="02070309020205020404" pitchFamily="49" charset="0"/>
+                <a:cs typeface="Courier New" panose="02070309020205020404" pitchFamily="49" charset="0"/>
+              </a:rPr>
+              <a:t>$git delete –d &lt;unique-name&gt;</a:t>
             </a:r>
             <a:endParaRPr lang="en-ID" sz="1200" dirty="0">
               <a:latin typeface="Courier New" panose="02070309020205020404" pitchFamily="49" charset="0"/>
               <a:cs typeface="Courier New" panose="02070309020205020404" pitchFamily="49" charset="0"/>
             </a:endParaRPr>
           </a:p>
-          <a:p>
-            <a:r>
-              <a:rPr lang="en-ID" sz="1200" dirty="0" smtClean="0">
-                <a:latin typeface="Courier New" panose="02070309020205020404" pitchFamily="49" charset="0"/>
-                <a:cs typeface="Courier New" panose="02070309020205020404" pitchFamily="49" charset="0"/>
-              </a:rPr>
-              <a:t>$git </a:t>
-            </a:r>
-            <a:r>
-              <a:rPr lang="en-ID" sz="1200" dirty="0">
-                <a:latin typeface="Courier New" panose="02070309020205020404" pitchFamily="49" charset="0"/>
-                <a:cs typeface="Courier New" panose="02070309020205020404" pitchFamily="49" charset="0"/>
-              </a:rPr>
-              <a:t>rebase </a:t>
-            </a:r>
-            <a:r>
-              <a:rPr lang="en-ID" sz="1200" dirty="0" smtClean="0">
-                <a:latin typeface="Courier New" panose="02070309020205020404" pitchFamily="49" charset="0"/>
-                <a:cs typeface="Courier New" panose="02070309020205020404" pitchFamily="49" charset="0"/>
-              </a:rPr>
-              <a:t>develop</a:t>
-            </a:r>
-            <a:endParaRPr lang="en-ID" sz="1200" dirty="0">
-              <a:latin typeface="Courier New" panose="02070309020205020404" pitchFamily="49" charset="0"/>
-              <a:cs typeface="Courier New" panose="02070309020205020404" pitchFamily="49" charset="0"/>
-            </a:endParaRPr>
-          </a:p>
-          <a:p>
-            <a:r>
-              <a:rPr lang="en-ID" sz="1200" dirty="0" smtClean="0">
-                <a:latin typeface="Courier New" panose="02070309020205020404" pitchFamily="49" charset="0"/>
-                <a:cs typeface="Courier New" panose="02070309020205020404" pitchFamily="49" charset="0"/>
-              </a:rPr>
-              <a:t>$git </a:t>
-            </a:r>
-            <a:r>
-              <a:rPr lang="en-ID" sz="1200" dirty="0">
-                <a:latin typeface="Courier New" panose="02070309020205020404" pitchFamily="49" charset="0"/>
-                <a:cs typeface="Courier New" panose="02070309020205020404" pitchFamily="49" charset="0"/>
-              </a:rPr>
-              <a:t>checkout </a:t>
-            </a:r>
-            <a:r>
-              <a:rPr lang="en-ID" sz="1200" dirty="0" smtClean="0">
-                <a:latin typeface="Courier New" panose="02070309020205020404" pitchFamily="49" charset="0"/>
-                <a:cs typeface="Courier New" panose="02070309020205020404" pitchFamily="49" charset="0"/>
-              </a:rPr>
-              <a:t>develop</a:t>
-            </a:r>
-            <a:endParaRPr lang="en-ID" sz="1200" dirty="0">
-              <a:latin typeface="Courier New" panose="02070309020205020404" pitchFamily="49" charset="0"/>
-              <a:cs typeface="Courier New" panose="02070309020205020404" pitchFamily="49" charset="0"/>
-            </a:endParaRPr>
-          </a:p>
-          <a:p>
-            <a:r>
-              <a:rPr lang="en-ID" sz="1200" dirty="0" smtClean="0">
-                <a:latin typeface="Courier New" panose="02070309020205020404" pitchFamily="49" charset="0"/>
-                <a:cs typeface="Courier New" panose="02070309020205020404" pitchFamily="49" charset="0"/>
-              </a:rPr>
-              <a:t>$git </a:t>
-            </a:r>
-            <a:r>
-              <a:rPr lang="en-ID" sz="1200" dirty="0">
-                <a:latin typeface="Courier New" panose="02070309020205020404" pitchFamily="49" charset="0"/>
-                <a:cs typeface="Courier New" panose="02070309020205020404" pitchFamily="49" charset="0"/>
-              </a:rPr>
-              <a:t>merge </a:t>
-            </a:r>
-            <a:r>
-              <a:rPr lang="en-ID" sz="1200" dirty="0" smtClean="0">
-                <a:latin typeface="Courier New" panose="02070309020205020404" pitchFamily="49" charset="0"/>
-                <a:cs typeface="Courier New" panose="02070309020205020404" pitchFamily="49" charset="0"/>
-              </a:rPr>
-              <a:t>--no-</a:t>
-            </a:r>
-            <a:r>
-              <a:rPr lang="en-ID" sz="1200" dirty="0" err="1" smtClean="0">
-                <a:latin typeface="Courier New" panose="02070309020205020404" pitchFamily="49" charset="0"/>
-                <a:cs typeface="Courier New" panose="02070309020205020404" pitchFamily="49" charset="0"/>
-              </a:rPr>
-              <a:t>ff</a:t>
-            </a:r>
-            <a:r>
-              <a:rPr lang="en-ID" sz="1200" dirty="0" smtClean="0">
-                <a:latin typeface="Courier New" panose="02070309020205020404" pitchFamily="49" charset="0"/>
-                <a:cs typeface="Courier New" panose="02070309020205020404" pitchFamily="49" charset="0"/>
-              </a:rPr>
-              <a:t> &lt;unique-name</a:t>
-            </a:r>
-            <a:endParaRPr lang="en-ID" sz="1200" dirty="0">
-              <a:latin typeface="Courier New" panose="02070309020205020404" pitchFamily="49" charset="0"/>
-              <a:cs typeface="Courier New" panose="02070309020205020404" pitchFamily="49" charset="0"/>
-            </a:endParaRPr>
-          </a:p>
         </p:txBody>
       </p:sp>
       <p:sp>
@@ -6733,8 +8331,8 @@
         </p:nvSpPr>
         <p:spPr>
           <a:xfrm>
-            <a:off x="332656" y="2028448"/>
-            <a:ext cx="6192688" cy="276999"/>
+            <a:off x="332656" y="1319557"/>
+            <a:ext cx="3168352" cy="276999"/>
           </a:xfrm>
           <a:prstGeom prst="rect">
             <a:avLst/>
@@ -6761,11 +8359,18 @@
           <a:lstStyle/>
           <a:p>
             <a:r>
+              <a:rPr lang="en-ID" sz="1200" dirty="0" smtClean="0">
+                <a:latin typeface="Courier New" panose="02070309020205020404" pitchFamily="49" charset="0"/>
+                <a:cs typeface="Courier New" panose="02070309020205020404" pitchFamily="49" charset="0"/>
+              </a:rPr>
+              <a:t>$</a:t>
+            </a:r>
+            <a:r>
               <a:rPr lang="en-ID" sz="1200" dirty="0">
                 <a:latin typeface="Courier New" panose="02070309020205020404" pitchFamily="49" charset="0"/>
                 <a:cs typeface="Courier New" panose="02070309020205020404" pitchFamily="49" charset="0"/>
               </a:rPr>
-              <a:t>$git </a:t>
+              <a:t>git </a:t>
             </a:r>
             <a:r>
               <a:rPr lang="en-ID" sz="1200" dirty="0" smtClean="0">
@@ -6786,8 +8391,8 @@
         </p:nvSpPr>
         <p:spPr>
           <a:xfrm>
-            <a:off x="328932" y="1659116"/>
-            <a:ext cx="1984326" cy="369332"/>
+            <a:off x="328932" y="905841"/>
+            <a:ext cx="2462534" cy="369332"/>
           </a:xfrm>
           <a:prstGeom prst="rect">
             <a:avLst/>
@@ -6802,7 +8407,11 @@
           <a:p>
             <a:r>
               <a:rPr lang="en-ID" dirty="0" smtClean="0"/>
-              <a:t>Commit done work</a:t>
+              <a:t>Commit your done </a:t>
+            </a:r>
+            <a:r>
+              <a:rPr lang="en-ID" dirty="0" smtClean="0"/>
+              <a:t>work</a:t>
             </a:r>
             <a:endParaRPr lang="en-US" dirty="0"/>
           </a:p>
@@ -6817,7 +8426,7 @@
           <p:nvPr/>
         </p:nvPicPr>
         <p:blipFill>
-          <a:blip r:embed="rId2" cstate="print">
+          <a:blip r:embed="rId3" cstate="print">
             <a:extLst>
               <a:ext uri="{28A0092B-C50C-407E-A947-70E740481C1C}">
                 <a14:useLocalDpi xmlns:a14="http://schemas.microsoft.com/office/drawing/2010/main" val="0"/>
@@ -6830,7 +8439,7 @@
         </p:blipFill>
         <p:spPr>
           <a:xfrm>
-            <a:off x="5525034" y="734194"/>
+            <a:off x="5528426" y="555418"/>
             <a:ext cx="1000310" cy="953700"/>
           </a:xfrm>
           <a:prstGeom prst="rect">
@@ -6846,8 +8455,8 @@
         </p:nvSpPr>
         <p:spPr>
           <a:xfrm>
-            <a:off x="328932" y="2349831"/>
-            <a:ext cx="3470630" cy="369332"/>
+            <a:off x="328932" y="2733050"/>
+            <a:ext cx="2553712" cy="369332"/>
           </a:xfrm>
           <a:prstGeom prst="rect">
             <a:avLst/>
@@ -6861,18 +8470,306 @@
           <a:lstStyle/>
           <a:p>
             <a:r>
-              <a:rPr lang="en-ID" dirty="0" smtClean="0"/>
-              <a:t>Our </a:t>
-            </a:r>
-            <a:r>
-              <a:rPr lang="en-ID" b="1" dirty="0" smtClean="0"/>
-              <a:t>main workflow to merge </a:t>
-            </a:r>
-            <a:r>
-              <a:rPr lang="en-ID" dirty="0" smtClean="0"/>
-              <a:t>as SE</a:t>
+              <a:rPr lang="en-ID" b="1" u="sng" dirty="0"/>
+              <a:t>M</a:t>
+            </a:r>
+            <a:r>
+              <a:rPr lang="en-ID" b="1" u="sng" dirty="0" smtClean="0"/>
+              <a:t>ain </a:t>
+            </a:r>
+            <a:r>
+              <a:rPr lang="en-ID" b="1" u="sng" dirty="0" smtClean="0"/>
+              <a:t>workflow to </a:t>
+            </a:r>
+            <a:r>
+              <a:rPr lang="en-ID" b="1" u="sng" dirty="0" smtClean="0"/>
+              <a:t>merge</a:t>
             </a:r>
             <a:endParaRPr lang="en-US" dirty="0"/>
+          </a:p>
+        </p:txBody>
+      </p:sp>
+      <p:cxnSp>
+        <p:nvCxnSpPr>
+          <p:cNvPr id="4" name="Straight Arrow Connector 3"/>
+          <p:cNvCxnSpPr/>
+          <p:nvPr/>
+        </p:nvCxnSpPr>
+        <p:spPr>
+          <a:xfrm flipH="1" flipV="1">
+            <a:off x="2465512" y="3425773"/>
+            <a:ext cx="1035496" cy="13306"/>
+          </a:xfrm>
+          <a:prstGeom prst="straightConnector1">
+            <a:avLst/>
+          </a:prstGeom>
+          <a:ln>
+            <a:solidFill>
+              <a:srgbClr val="FFC000"/>
+            </a:solidFill>
+            <a:tailEnd type="triangle"/>
+          </a:ln>
+        </p:spPr>
+        <p:style>
+          <a:lnRef idx="1">
+            <a:schemeClr val="dk1"/>
+          </a:lnRef>
+          <a:fillRef idx="0">
+            <a:schemeClr val="dk1"/>
+          </a:fillRef>
+          <a:effectRef idx="0">
+            <a:schemeClr val="dk1"/>
+          </a:effectRef>
+          <a:fontRef idx="minor">
+            <a:schemeClr val="tx1"/>
+          </a:fontRef>
+        </p:style>
+      </p:cxnSp>
+      <p:sp>
+        <p:nvSpPr>
+          <p:cNvPr id="7" name="TextBox 6"/>
+          <p:cNvSpPr txBox="1"/>
+          <p:nvPr/>
+        </p:nvSpPr>
+        <p:spPr>
+          <a:xfrm>
+            <a:off x="3617640" y="3241107"/>
+            <a:ext cx="3240360" cy="369332"/>
+          </a:xfrm>
+          <a:prstGeom prst="rect">
+            <a:avLst/>
+          </a:prstGeom>
+          <a:noFill/>
+        </p:spPr>
+        <p:txBody>
+          <a:bodyPr wrap="square" rtlCol="0">
+            <a:spAutoFit/>
+          </a:bodyPr>
+          <a:lstStyle/>
+          <a:p>
+            <a:r>
+              <a:rPr lang="en-ID" dirty="0" smtClean="0">
+                <a:ln w="0"/>
+                <a:solidFill>
+                  <a:srgbClr val="FFC000"/>
+                </a:solidFill>
+                <a:effectLst>
+                  <a:outerShdw blurRad="38100" dist="19050" dir="2700000" algn="tl" rotWithShape="0">
+                    <a:schemeClr val="dk1">
+                      <a:alpha val="40000"/>
+                    </a:schemeClr>
+                  </a:outerShdw>
+                </a:effectLst>
+              </a:rPr>
+              <a:t>Merge conflict could occur! </a:t>
+            </a:r>
+            <a:endParaRPr lang="en-US" dirty="0">
+              <a:ln w="0"/>
+              <a:solidFill>
+                <a:srgbClr val="FFC000"/>
+              </a:solidFill>
+              <a:effectLst>
+                <a:outerShdw blurRad="38100" dist="19050" dir="2700000" algn="tl" rotWithShape="0">
+                  <a:schemeClr val="dk1">
+                    <a:alpha val="40000"/>
+                  </a:schemeClr>
+                </a:outerShdw>
+              </a:effectLst>
+            </a:endParaRPr>
+          </a:p>
+        </p:txBody>
+      </p:sp>
+      <p:sp>
+        <p:nvSpPr>
+          <p:cNvPr id="15" name="TextBox 14"/>
+          <p:cNvSpPr txBox="1"/>
+          <p:nvPr/>
+        </p:nvSpPr>
+        <p:spPr>
+          <a:xfrm>
+            <a:off x="919219" y="4154312"/>
+            <a:ext cx="2469009" cy="307777"/>
+          </a:xfrm>
+          <a:prstGeom prst="rect">
+            <a:avLst/>
+          </a:prstGeom>
+          <a:solidFill>
+            <a:srgbClr val="C00000"/>
+          </a:solidFill>
+        </p:spPr>
+        <p:txBody>
+          <a:bodyPr wrap="none" rtlCol="0">
+            <a:spAutoFit/>
+          </a:bodyPr>
+          <a:lstStyle/>
+          <a:p>
+            <a:r>
+              <a:rPr lang="en-ID" sz="1400" dirty="0" smtClean="0">
+                <a:solidFill>
+                  <a:srgbClr val="FFC000"/>
+                </a:solidFill>
+              </a:rPr>
+              <a:t>Merge your local branch back…</a:t>
+            </a:r>
+            <a:endParaRPr lang="en-US" sz="1400" dirty="0">
+              <a:solidFill>
+                <a:srgbClr val="FFC000"/>
+              </a:solidFill>
+            </a:endParaRPr>
+          </a:p>
+        </p:txBody>
+      </p:sp>
+      <p:pic>
+        <p:nvPicPr>
+          <p:cNvPr id="16" name="Picture 15"/>
+          <p:cNvPicPr>
+            <a:picLocks noChangeAspect="1"/>
+          </p:cNvPicPr>
+          <p:nvPr/>
+        </p:nvPicPr>
+        <p:blipFill>
+          <a:blip r:embed="rId4" cstate="print">
+            <a:extLst>
+              <a:ext uri="{28A0092B-C50C-407E-A947-70E740481C1C}">
+                <a14:useLocalDpi xmlns:a14="http://schemas.microsoft.com/office/drawing/2010/main" val="0"/>
+              </a:ext>
+            </a:extLst>
+          </a:blip>
+          <a:stretch>
+            <a:fillRect/>
+          </a:stretch>
+        </p:blipFill>
+        <p:spPr>
+          <a:xfrm>
+            <a:off x="328932" y="4002201"/>
+            <a:ext cx="612000" cy="612000"/>
+          </a:xfrm>
+          <a:prstGeom prst="rect">
+            <a:avLst/>
+          </a:prstGeom>
+        </p:spPr>
+      </p:pic>
+      <p:sp>
+        <p:nvSpPr>
+          <p:cNvPr id="17" name="TextBox 16"/>
+          <p:cNvSpPr txBox="1"/>
+          <p:nvPr/>
+        </p:nvSpPr>
+        <p:spPr>
+          <a:xfrm>
+            <a:off x="919219" y="1793051"/>
+            <a:ext cx="1970539" cy="307777"/>
+          </a:xfrm>
+          <a:prstGeom prst="rect">
+            <a:avLst/>
+          </a:prstGeom>
+          <a:solidFill>
+            <a:srgbClr val="C00000"/>
+          </a:solidFill>
+        </p:spPr>
+        <p:txBody>
+          <a:bodyPr wrap="none" rtlCol="0">
+            <a:spAutoFit/>
+          </a:bodyPr>
+          <a:lstStyle/>
+          <a:p>
+            <a:r>
+              <a:rPr lang="en-ID" sz="1400" dirty="0" smtClean="0">
+                <a:solidFill>
+                  <a:srgbClr val="FFC000"/>
+                </a:solidFill>
+              </a:rPr>
+              <a:t>Commit some changes…</a:t>
+            </a:r>
+            <a:endParaRPr lang="en-US" sz="1400" dirty="0">
+              <a:solidFill>
+                <a:srgbClr val="FFC000"/>
+              </a:solidFill>
+            </a:endParaRPr>
+          </a:p>
+        </p:txBody>
+      </p:sp>
+      <p:pic>
+        <p:nvPicPr>
+          <p:cNvPr id="18" name="Picture 17"/>
+          <p:cNvPicPr>
+            <a:picLocks noChangeAspect="1"/>
+          </p:cNvPicPr>
+          <p:nvPr/>
+        </p:nvPicPr>
+        <p:blipFill>
+          <a:blip r:embed="rId4" cstate="print">
+            <a:extLst>
+              <a:ext uri="{28A0092B-C50C-407E-A947-70E740481C1C}">
+                <a14:useLocalDpi xmlns:a14="http://schemas.microsoft.com/office/drawing/2010/main" val="0"/>
+              </a:ext>
+            </a:extLst>
+          </a:blip>
+          <a:stretch>
+            <a:fillRect/>
+          </a:stretch>
+        </p:blipFill>
+        <p:spPr>
+          <a:xfrm>
+            <a:off x="328932" y="1640940"/>
+            <a:ext cx="612000" cy="612000"/>
+          </a:xfrm>
+          <a:prstGeom prst="rect">
+            <a:avLst/>
+          </a:prstGeom>
+        </p:spPr>
+      </p:pic>
+      <p:sp>
+        <p:nvSpPr>
+          <p:cNvPr id="19" name="TextBox 18"/>
+          <p:cNvSpPr txBox="1"/>
+          <p:nvPr/>
+        </p:nvSpPr>
+        <p:spPr>
+          <a:xfrm>
+            <a:off x="3647344" y="1837441"/>
+            <a:ext cx="2920920" cy="830997"/>
+          </a:xfrm>
+          <a:prstGeom prst="rect">
+            <a:avLst/>
+          </a:prstGeom>
+          <a:noFill/>
+        </p:spPr>
+        <p:txBody>
+          <a:bodyPr wrap="square" rtlCol="0">
+            <a:spAutoFit/>
+          </a:bodyPr>
+          <a:lstStyle/>
+          <a:p>
+            <a:r>
+              <a:rPr lang="en-ID" sz="1200" dirty="0" smtClean="0"/>
+              <a:t>“A commit </a:t>
+            </a:r>
+            <a:r>
+              <a:rPr lang="en-ID" sz="1200" dirty="0"/>
+              <a:t>is carefully created by a human being. </a:t>
+            </a:r>
+            <a:r>
+              <a:rPr lang="en-ID" sz="1200" dirty="0" smtClean="0"/>
+              <a:t>It's </a:t>
+            </a:r>
+            <a:r>
+              <a:rPr lang="en-ID" sz="1200" dirty="0"/>
+              <a:t>a meaningful unit that wraps only related </a:t>
+            </a:r>
+            <a:r>
+              <a:rPr lang="en-ID" sz="1200" dirty="0" smtClean="0"/>
+              <a:t>changes, and </a:t>
+            </a:r>
+            <a:r>
+              <a:rPr lang="en-ID" sz="1200" dirty="0"/>
+              <a:t>annotates them with a comment</a:t>
+            </a:r>
+            <a:r>
+              <a:rPr lang="en-ID" sz="1200" dirty="0" smtClean="0"/>
+              <a:t>.”</a:t>
+            </a:r>
+            <a:endParaRPr lang="en-US" sz="1200" dirty="0"/>
           </a:p>
         </p:txBody>
       </p:sp>
@@ -7429,6 +9326,15 @@
 </file>
 
 <file path=customXml/item1.xml><?xml version="1.0" encoding="utf-8"?>
+<?mso-contentType ?>
+<FormTemplates xmlns="http://schemas.microsoft.com/sharepoint/v3/contenttype/forms">
+  <Display>DocumentLibraryForm</Display>
+  <Edit>DocumentLibraryForm</Edit>
+  <New>DocumentLibraryForm</New>
+</FormTemplates>
+</file>
+
+<file path=customXml/item2.xml><?xml version="1.0" encoding="utf-8"?>
 <ct:contentTypeSchema xmlns:ct="http://schemas.microsoft.com/office/2006/metadata/contentType" xmlns:ma="http://schemas.microsoft.com/office/2006/metadata/properties/metaAttributes" ct:_="" ma:_="" ma:contentTypeName="Document" ma:contentTypeID="0x0101003684E481DE84C9499EF0F81972D7EF96" ma:contentTypeVersion="0" ma:contentTypeDescription="Create a new document." ma:contentTypeScope="" ma:versionID="1082b6f87e9a9efb3f4dd16ca55e9303">
   <xsd:schema xmlns:xsd="http://www.w3.org/2001/XMLSchema" xmlns:xs="http://www.w3.org/2001/XMLSchema" xmlns:p="http://schemas.microsoft.com/office/2006/metadata/properties" targetNamespace="http://schemas.microsoft.com/office/2006/metadata/properties" ma:root="true" ma:fieldsID="1b05d82d297216baf5b26c55225140df">
     <xsd:element name="properties">
@@ -7542,15 +9448,6 @@
 </ct:contentTypeSchema>
 </file>
 
-<file path=customXml/item2.xml><?xml version="1.0" encoding="utf-8"?>
-<?mso-contentType ?>
-<FormTemplates xmlns="http://schemas.microsoft.com/sharepoint/v3/contenttype/forms">
-  <Display>DocumentLibraryForm</Display>
-  <Edit>DocumentLibraryForm</Edit>
-  <New>DocumentLibraryForm</New>
-</FormTemplates>
-</file>
-
 <file path=customXml/item3.xml><?xml version="1.0" encoding="utf-8"?>
 <p:properties xmlns:p="http://schemas.microsoft.com/office/2006/metadata/properties" xmlns:xsi="http://www.w3.org/2001/XMLSchema-instance" xmlns:pc="http://schemas.microsoft.com/office/infopath/2007/PartnerControls">
   <documentManagement/>
@@ -7558,6 +9455,14 @@
 </file>
 
 <file path=customXml/itemProps1.xml><?xml version="1.0" encoding="utf-8"?>
+<ds:datastoreItem xmlns:ds="http://schemas.openxmlformats.org/officeDocument/2006/customXml" ds:itemID="{DB5E681D-860B-4D22-80CF-C7472F8C312F}">
+  <ds:schemaRefs>
+    <ds:schemaRef ds:uri="http://schemas.microsoft.com/sharepoint/v3/contenttype/forms"/>
+  </ds:schemaRefs>
+</ds:datastoreItem>
+</file>
+
+<file path=customXml/itemProps2.xml><?xml version="1.0" encoding="utf-8"?>
 <ds:datastoreItem xmlns:ds="http://schemas.openxmlformats.org/officeDocument/2006/customXml" ds:itemID="{6B82694F-752F-4827-A348-4AA5A968F420}">
   <ds:schemaRefs>
     <ds:schemaRef ds:uri="http://schemas.microsoft.com/office/2006/metadata/contentType"/>
@@ -7569,14 +9474,6 @@
     <ds:schemaRef ds:uri="http://purl.org/dc/terms/"/>
     <ds:schemaRef ds:uri="http://schemas.microsoft.com/internal/obd"/>
     <ds:schemaRef ds:uri="http://schemas.microsoft.com/office/infopath/2007/PartnerControls"/>
-  </ds:schemaRefs>
-</ds:datastoreItem>
-</file>
-
-<file path=customXml/itemProps2.xml><?xml version="1.0" encoding="utf-8"?>
-<ds:datastoreItem xmlns:ds="http://schemas.openxmlformats.org/officeDocument/2006/customXml" ds:itemID="{DB5E681D-860B-4D22-80CF-C7472F8C312F}">
-  <ds:schemaRefs>
-    <ds:schemaRef ds:uri="http://schemas.microsoft.com/sharepoint/v3/contenttype/forms"/>
   </ds:schemaRefs>
 </ds:datastoreItem>
 </file>

</xml_diff>

<commit_message>
finish rebase overview slide
</commit_message>
<xml_diff>
--- a/cdc_git_ws1.pptx
+++ b/cdc_git_ws1.pptx
@@ -1131,10 +1131,6 @@
           <a:bodyPr/>
           <a:lstStyle/>
           <a:p>
-            <a:r>
-              <a:rPr lang="en-US" b="1" dirty="0" smtClean="0"/>
-              <a:t>Rebasing Deletes Merge Commits!</a:t>
-            </a:r>
             <a:endParaRPr lang="en-US" dirty="0"/>
           </a:p>
         </p:txBody>
@@ -1220,8 +1216,39 @@
           <a:lstStyle/>
           <a:p>
             <a:r>
-              <a:rPr lang="en-US" b="1" dirty="0" smtClean="0"/>
-              <a:t>Rebasing Deletes Merge Commits!</a:t>
+              <a:rPr lang="en-ID" dirty="0" smtClean="0"/>
+              <a:t>$git push -u origin feature-branch</a:t>
+            </a:r>
+          </a:p>
+          <a:p>
+            <a:r>
+              <a:rPr lang="en-US" dirty="0" smtClean="0"/>
+              <a:t>$git push origin feature-branch</a:t>
+            </a:r>
+          </a:p>
+          <a:p>
+            <a:endParaRPr lang="en-ID" dirty="0" smtClean="0"/>
+          </a:p>
+          <a:p>
+            <a:r>
+              <a:rPr lang="en-ID" dirty="0" smtClean="0"/>
+              <a:t>To check if branch is deleted on</a:t>
+            </a:r>
+            <a:r>
+              <a:rPr lang="en-ID" baseline="0" dirty="0" smtClean="0"/>
+              <a:t> remote and sync on local:</a:t>
+            </a:r>
+          </a:p>
+          <a:p>
+            <a:r>
+              <a:rPr lang="en-ID" baseline="0" dirty="0" smtClean="0"/>
+              <a:t>$git fetch –f</a:t>
+            </a:r>
+          </a:p>
+          <a:p>
+            <a:r>
+              <a:rPr lang="en-ID" baseline="0" dirty="0" smtClean="0"/>
+              <a:t>$git branch –a/-r</a:t>
             </a:r>
             <a:endParaRPr lang="en-US" dirty="0"/>
           </a:p>
@@ -3522,7 +3549,28 @@
                 <a:latin typeface="Courier New" panose="02070309020205020404" pitchFamily="49" charset="0"/>
                 <a:cs typeface="Courier New" panose="02070309020205020404" pitchFamily="49" charset="0"/>
               </a:rPr>
-              <a:t>git log --online --decorate –graph --all</a:t>
+              <a:t>git log --</a:t>
+            </a:r>
+            <a:r>
+              <a:rPr lang="en-ID" sz="1200" dirty="0" err="1" smtClean="0">
+                <a:latin typeface="Courier New" panose="02070309020205020404" pitchFamily="49" charset="0"/>
+                <a:cs typeface="Courier New" panose="02070309020205020404" pitchFamily="49" charset="0"/>
+              </a:rPr>
+              <a:t>oneline</a:t>
+            </a:r>
+            <a:r>
+              <a:rPr lang="en-ID" sz="1200" dirty="0" smtClean="0">
+                <a:latin typeface="Courier New" panose="02070309020205020404" pitchFamily="49" charset="0"/>
+                <a:cs typeface="Courier New" panose="02070309020205020404" pitchFamily="49" charset="0"/>
+              </a:rPr>
+              <a:t> </a:t>
+            </a:r>
+            <a:r>
+              <a:rPr lang="en-ID" sz="1200" dirty="0" smtClean="0">
+                <a:latin typeface="Courier New" panose="02070309020205020404" pitchFamily="49" charset="0"/>
+                <a:cs typeface="Courier New" panose="02070309020205020404" pitchFamily="49" charset="0"/>
+              </a:rPr>
+              <a:t>--decorate –graph --all</a:t>
             </a:r>
             <a:endParaRPr lang="en-US" sz="1200" dirty="0"/>
           </a:p>
@@ -3672,11 +3720,7 @@
             </a:pPr>
             <a:r>
               <a:rPr lang="en-ID" dirty="0" smtClean="0"/>
-              <a:t>Holy</a:t>
-            </a:r>
-            <a:r>
-              <a:rPr lang="en-ID" dirty="0" smtClean="0"/>
-              <a:t>, what is </a:t>
+              <a:t>Holy, what is </a:t>
             </a:r>
             <a:r>
               <a:rPr lang="en-ID" i="1" dirty="0" smtClean="0"/>
@@ -4309,7 +4353,7 @@
         <p:spPr>
           <a:xfrm>
             <a:off x="3645024" y="2108938"/>
-            <a:ext cx="2472921" cy="615553"/>
+            <a:ext cx="2472921" cy="584775"/>
           </a:xfrm>
           <a:prstGeom prst="rect">
             <a:avLst/>
@@ -4323,24 +4367,20 @@
           <a:lstStyle/>
           <a:p>
             <a:r>
-              <a:rPr lang="en-ID" dirty="0"/>
+              <a:rPr lang="en-ID" sz="1600" dirty="0"/>
               <a:t>Conditions </a:t>
             </a:r>
             <a:r>
-              <a:rPr lang="en-ID" dirty="0" smtClean="0"/>
+              <a:rPr lang="en-ID" sz="1600" dirty="0" smtClean="0"/>
               <a:t>for </a:t>
             </a:r>
             <a:r>
-              <a:rPr lang="en-ID" dirty="0" err="1" smtClean="0"/>
+              <a:rPr lang="en-ID" sz="1600" dirty="0" err="1" smtClean="0"/>
               <a:t>ff</a:t>
             </a:r>
             <a:r>
-              <a:rPr lang="en-ID" dirty="0" smtClean="0"/>
-              <a:t>-merge</a:t>
-            </a:r>
-            <a:r>
-              <a:rPr lang="en-ID" dirty="0" smtClean="0"/>
-              <a:t>:</a:t>
+              <a:rPr lang="en-ID" sz="1600" dirty="0" smtClean="0"/>
+              <a:t>-merge:</a:t>
             </a:r>
           </a:p>
           <a:p>
@@ -4621,7 +4661,6 @@
               <a:rPr lang="en-ID" sz="1600" dirty="0" smtClean="0"/>
               <a:t>?</a:t>
             </a:r>
-            <a:endParaRPr lang="en-ID" sz="1600" dirty="0" smtClean="0"/>
           </a:p>
           <a:p>
             <a:pPr marL="285750" indent="-285750">
@@ -4630,11 +4669,7 @@
             </a:pPr>
             <a:r>
               <a:rPr lang="en-ID" sz="1600" dirty="0" smtClean="0"/>
-              <a:t>Clear </a:t>
-            </a:r>
-            <a:r>
-              <a:rPr lang="en-ID" sz="1600" dirty="0" smtClean="0"/>
-              <a:t>what was done on a branch</a:t>
+              <a:t>Clear what was done on a branch</a:t>
             </a:r>
           </a:p>
           <a:p>
@@ -4727,11 +4762,7 @@
             </a:r>
             <a:r>
               <a:rPr lang="en-ID" sz="1200" dirty="0" smtClean="0"/>
-              <a:t>knot</a:t>
-            </a:r>
-            <a:r>
-              <a:rPr lang="en-ID" sz="1200" dirty="0" smtClean="0"/>
-              <a:t>.”</a:t>
+              <a:t>knot.”</a:t>
             </a:r>
             <a:endParaRPr lang="en-US" sz="1200" dirty="0"/>
           </a:p>
@@ -4803,79 +4834,7 @@
                 </a:solidFill>
                 <a:latin typeface="Bookman Old Style" panose="02050604050505020204" pitchFamily="18" charset="0"/>
               </a:rPr>
-              <a:t>CDC – git merging / Part </a:t>
-            </a:r>
-            <a:r>
-              <a:rPr lang="en-ID" b="1" dirty="0" smtClean="0">
-                <a:solidFill>
-                  <a:srgbClr val="392900"/>
-                </a:solidFill>
-                <a:latin typeface="Bookman Old Style" panose="02050604050505020204" pitchFamily="18" charset="0"/>
-              </a:rPr>
-              <a:t>IV </a:t>
-            </a:r>
-            <a:r>
-              <a:rPr lang="en-ID" b="1" dirty="0" smtClean="0">
-                <a:solidFill>
-                  <a:srgbClr val="392900"/>
-                </a:solidFill>
-                <a:latin typeface="Bookman Old Style" panose="02050604050505020204" pitchFamily="18" charset="0"/>
-              </a:rPr>
-              <a:t>– “</a:t>
-            </a:r>
-            <a:r>
-              <a:rPr lang="en-ID" b="1" dirty="0" smtClean="0">
-                <a:solidFill>
-                  <a:srgbClr val="392900"/>
-                </a:solidFill>
-                <a:latin typeface="Bookman Old Style" panose="02050604050505020204" pitchFamily="18" charset="0"/>
-              </a:rPr>
-              <a:t>Rebase” </a:t>
-            </a:r>
-            <a:endParaRPr lang="en-ID" b="1" dirty="0" smtClean="0">
-              <a:solidFill>
-                <a:srgbClr val="392900"/>
-              </a:solidFill>
-              <a:latin typeface="Bookman Old Style" panose="02050604050505020204" pitchFamily="18" charset="0"/>
-            </a:endParaRPr>
-          </a:p>
-        </p:txBody>
-      </p:sp>
-      <p:sp>
-        <p:nvSpPr>
-          <p:cNvPr id="6" name="TextBox 5"/>
-          <p:cNvSpPr txBox="1"/>
-          <p:nvPr/>
-        </p:nvSpPr>
-        <p:spPr>
-          <a:xfrm>
-            <a:off x="4149080" y="4240875"/>
-            <a:ext cx="2808312" cy="369332"/>
-          </a:xfrm>
-          <a:prstGeom prst="rect">
-            <a:avLst/>
-          </a:prstGeom>
-          <a:noFill/>
-        </p:spPr>
-        <p:txBody>
-          <a:bodyPr wrap="square" rtlCol="0">
-            <a:spAutoFit/>
-          </a:bodyPr>
-          <a:lstStyle/>
-          <a:p>
-            <a:r>
-              <a:rPr lang="en-ID" dirty="0" smtClean="0">
-                <a:ln w="0"/>
-                <a:effectLst>
-                  <a:outerShdw blurRad="38100" dist="19050" dir="2700000" algn="tl" rotWithShape="0">
-                    <a:schemeClr val="dk1">
-                      <a:alpha val="40000"/>
-                    </a:schemeClr>
-                  </a:outerShdw>
-                </a:effectLst>
-                <a:latin typeface="Berlin Sans FB" panose="020E0602020502020306" pitchFamily="34" charset="0"/>
-              </a:rPr>
-              <a:t>“The shell is my friend!”</a:t>
+              <a:t>CDC – git merging / Part IV – “Rebase” </a:t>
             </a:r>
           </a:p>
         </p:txBody>
@@ -4888,8 +4847,8 @@
         </p:nvSpPr>
         <p:spPr>
           <a:xfrm>
-            <a:off x="332656" y="1898117"/>
-            <a:ext cx="6192688" cy="1200329"/>
+            <a:off x="330384" y="1567766"/>
+            <a:ext cx="2932645" cy="1200329"/>
           </a:xfrm>
           <a:prstGeom prst="rect">
             <a:avLst/>
@@ -4929,14 +4888,7 @@
                 <a:latin typeface="Courier New" panose="02070309020205020404" pitchFamily="49" charset="0"/>
                 <a:cs typeface="Courier New" panose="02070309020205020404" pitchFamily="49" charset="0"/>
               </a:rPr>
-              <a:t>$git </a:t>
-            </a:r>
-            <a:r>
-              <a:rPr lang="en-ID" sz="1200" dirty="0" smtClean="0">
-                <a:latin typeface="Courier New" panose="02070309020205020404" pitchFamily="49" charset="0"/>
-                <a:cs typeface="Courier New" panose="02070309020205020404" pitchFamily="49" charset="0"/>
-              </a:rPr>
-              <a:t>fetch origin</a:t>
+              <a:t>$git fetch origin</a:t>
             </a:r>
             <a:endParaRPr lang="en-ID" sz="1200" dirty="0">
               <a:latin typeface="Courier New" panose="02070309020205020404" pitchFamily="49" charset="0"/>
@@ -5044,14 +4996,7 @@
                 <a:latin typeface="Courier New" panose="02070309020205020404" pitchFamily="49" charset="0"/>
                 <a:cs typeface="Courier New" panose="02070309020205020404" pitchFamily="49" charset="0"/>
               </a:rPr>
-              <a:t>&lt;</a:t>
-            </a:r>
-            <a:r>
-              <a:rPr lang="en-ID" sz="1200" dirty="0" smtClean="0">
-                <a:latin typeface="Courier New" panose="02070309020205020404" pitchFamily="49" charset="0"/>
-                <a:cs typeface="Courier New" panose="02070309020205020404" pitchFamily="49" charset="0"/>
-              </a:rPr>
-              <a:t>unique-name&gt;</a:t>
+              <a:t>&lt;unique-name&gt;</a:t>
             </a:r>
             <a:endParaRPr lang="en-ID" sz="1200" dirty="0">
               <a:latin typeface="Courier New" panose="02070309020205020404" pitchFamily="49" charset="0"/>
@@ -5069,7 +5014,7 @@
         <p:spPr>
           <a:xfrm>
             <a:off x="332656" y="4006724"/>
-            <a:ext cx="6192688" cy="276999"/>
+            <a:ext cx="2932645" cy="276999"/>
           </a:xfrm>
           <a:prstGeom prst="rect">
             <a:avLst/>
@@ -5121,7 +5066,7 @@
         </p:nvSpPr>
         <p:spPr>
           <a:xfrm>
-            <a:off x="332656" y="1320440"/>
+            <a:off x="332656" y="823859"/>
             <a:ext cx="6378797" cy="584775"/>
           </a:xfrm>
           <a:prstGeom prst="rect">
@@ -5136,7 +5081,11 @@
           <a:lstStyle/>
           <a:p>
             <a:r>
-              <a:rPr lang="en-ID" sz="3200" dirty="0" smtClean="0"/>
+              <a:rPr lang="en-ID" sz="3200" dirty="0" smtClean="0">
+                <a:solidFill>
+                  <a:srgbClr val="FF0000"/>
+                </a:solidFill>
+              </a:rPr>
               <a:t>!</a:t>
             </a:r>
             <a:r>
@@ -5155,8 +5104,8 @@
         </p:nvSpPr>
         <p:spPr>
           <a:xfrm>
-            <a:off x="332656" y="814981"/>
-            <a:ext cx="3312368" cy="461665"/>
+            <a:off x="332656" y="570336"/>
+            <a:ext cx="5976664" cy="276999"/>
           </a:xfrm>
           <a:prstGeom prst="rect">
             <a:avLst/>
@@ -5192,8 +5141,8 @@
         </p:nvSpPr>
         <p:spPr>
           <a:xfrm>
-            <a:off x="332656" y="3144950"/>
-            <a:ext cx="3964227" cy="861774"/>
+            <a:off x="330384" y="3144950"/>
+            <a:ext cx="2574807" cy="861774"/>
           </a:xfrm>
           <a:prstGeom prst="rect">
             <a:avLst/>
@@ -5207,9 +5156,14 @@
           <a:lstStyle/>
           <a:p>
             <a:r>
-              <a:rPr lang="en-ID" dirty="0" smtClean="0"/>
-              <a:t>Merge conflicts:</a:t>
-            </a:r>
+              <a:rPr lang="en-ID" sz="1600" dirty="0" smtClean="0"/>
+              <a:t>Merge </a:t>
+            </a:r>
+            <a:r>
+              <a:rPr lang="en-ID" sz="1600" dirty="0" smtClean="0"/>
+              <a:t>conflicts</a:t>
+            </a:r>
+            <a:endParaRPr lang="en-ID" sz="1600" dirty="0" smtClean="0"/>
           </a:p>
           <a:p>
             <a:pPr marL="342900" indent="-342900">
@@ -5221,7 +5175,7 @@
             </a:r>
             <a:r>
               <a:rPr lang="en-ID" sz="1600" dirty="0" smtClean="0"/>
-              <a:t>conflict(s) manually with IDE/Editor</a:t>
+              <a:t>conflict(s)</a:t>
             </a:r>
           </a:p>
           <a:p>
@@ -5230,12 +5184,99 @@
             </a:pPr>
             <a:r>
               <a:rPr lang="en-ID" sz="1600" dirty="0" smtClean="0"/>
-              <a:t>Continue rebase process</a:t>
+              <a:t>Continue </a:t>
+            </a:r>
+            <a:r>
+              <a:rPr lang="en-ID" sz="1600" dirty="0" smtClean="0"/>
+              <a:t>rebase process</a:t>
             </a:r>
             <a:endParaRPr lang="en-US" sz="1600" dirty="0"/>
           </a:p>
         </p:txBody>
       </p:sp>
+      <p:sp>
+        <p:nvSpPr>
+          <p:cNvPr id="3" name="Rectangle 2"/>
+          <p:cNvSpPr/>
+          <p:nvPr/>
+        </p:nvSpPr>
+        <p:spPr>
+          <a:xfrm>
+            <a:off x="3327828" y="1571771"/>
+            <a:ext cx="3429000" cy="584775"/>
+          </a:xfrm>
+          <a:prstGeom prst="rect">
+            <a:avLst/>
+          </a:prstGeom>
+        </p:spPr>
+        <p:txBody>
+          <a:bodyPr>
+            <a:spAutoFit/>
+          </a:bodyPr>
+          <a:lstStyle/>
+          <a:p>
+            <a:r>
+              <a:rPr lang="en-ID" sz="1600" dirty="0" smtClean="0">
+                <a:solidFill>
+                  <a:srgbClr val="FF0000"/>
+                </a:solidFill>
+              </a:rPr>
+              <a:t>“The </a:t>
+            </a:r>
+            <a:r>
+              <a:rPr lang="en-ID" sz="1600" dirty="0">
+                <a:solidFill>
+                  <a:srgbClr val="FF0000"/>
+                </a:solidFill>
+              </a:rPr>
+              <a:t>primary reason for rebasing is to maintain a linear project history</a:t>
+            </a:r>
+            <a:r>
+              <a:rPr lang="en-ID" sz="1600" dirty="0" smtClean="0">
+                <a:solidFill>
+                  <a:srgbClr val="FF0000"/>
+                </a:solidFill>
+              </a:rPr>
+              <a:t>.”</a:t>
+            </a:r>
+            <a:endParaRPr lang="en-US" sz="1600" dirty="0">
+              <a:solidFill>
+                <a:srgbClr val="FF0000"/>
+              </a:solidFill>
+            </a:endParaRPr>
+          </a:p>
+        </p:txBody>
+      </p:sp>
+      <p:pic>
+        <p:nvPicPr>
+          <p:cNvPr id="10" name="Picture 9"/>
+          <p:cNvPicPr>
+            <a:picLocks noChangeAspect="1"/>
+          </p:cNvPicPr>
+          <p:nvPr/>
+        </p:nvPicPr>
+        <p:blipFill>
+          <a:blip r:embed="rId3">
+            <a:extLst>
+              <a:ext uri="{28A0092B-C50C-407E-A947-70E740481C1C}">
+                <a14:useLocalDpi xmlns:a14="http://schemas.microsoft.com/office/drawing/2010/main" val="0"/>
+              </a:ext>
+            </a:extLst>
+          </a:blip>
+          <a:stretch>
+            <a:fillRect/>
+          </a:stretch>
+        </p:blipFill>
+        <p:spPr>
+          <a:xfrm>
+            <a:off x="3645024" y="2156546"/>
+            <a:ext cx="2849554" cy="2528614"/>
+          </a:xfrm>
+          <a:prstGeom prst="rect">
+            <a:avLst/>
+          </a:prstGeom>
+        </p:spPr>
+      </p:pic>
     </p:spTree>
     <p:extLst>
       <p:ext uri="{BB962C8B-B14F-4D97-AF65-F5344CB8AC3E}">
@@ -5302,79 +5343,7 @@
                 </a:solidFill>
                 <a:latin typeface="Bookman Old Style" panose="02050604050505020204" pitchFamily="18" charset="0"/>
               </a:rPr>
-              <a:t>CDC – git merging / Part </a:t>
-            </a:r>
-            <a:r>
-              <a:rPr lang="en-ID" b="1" dirty="0" smtClean="0">
-                <a:solidFill>
-                  <a:srgbClr val="392900"/>
-                </a:solidFill>
-                <a:latin typeface="Bookman Old Style" panose="02050604050505020204" pitchFamily="18" charset="0"/>
-              </a:rPr>
-              <a:t>V </a:t>
-            </a:r>
-            <a:r>
-              <a:rPr lang="en-ID" b="1" dirty="0" smtClean="0">
-                <a:solidFill>
-                  <a:srgbClr val="392900"/>
-                </a:solidFill>
-                <a:latin typeface="Bookman Old Style" panose="02050604050505020204" pitchFamily="18" charset="0"/>
-              </a:rPr>
-              <a:t>– </a:t>
-            </a:r>
-            <a:r>
-              <a:rPr lang="en-ID" b="1" dirty="0" smtClean="0">
-                <a:solidFill>
-                  <a:srgbClr val="392900"/>
-                </a:solidFill>
-                <a:latin typeface="Bookman Old Style" panose="02050604050505020204" pitchFamily="18" charset="0"/>
-              </a:rPr>
-              <a:t>“Practice” </a:t>
-            </a:r>
-            <a:endParaRPr lang="en-ID" b="1" dirty="0" smtClean="0">
-              <a:solidFill>
-                <a:srgbClr val="392900"/>
-              </a:solidFill>
-              <a:latin typeface="Bookman Old Style" panose="02050604050505020204" pitchFamily="18" charset="0"/>
-            </a:endParaRPr>
-          </a:p>
-        </p:txBody>
-      </p:sp>
-      <p:sp>
-        <p:nvSpPr>
-          <p:cNvPr id="6" name="TextBox 5"/>
-          <p:cNvSpPr txBox="1"/>
-          <p:nvPr/>
-        </p:nvSpPr>
-        <p:spPr>
-          <a:xfrm>
-            <a:off x="4149080" y="4240875"/>
-            <a:ext cx="2808312" cy="369332"/>
-          </a:xfrm>
-          <a:prstGeom prst="rect">
-            <a:avLst/>
-          </a:prstGeom>
-          <a:noFill/>
-        </p:spPr>
-        <p:txBody>
-          <a:bodyPr wrap="square" rtlCol="0">
-            <a:spAutoFit/>
-          </a:bodyPr>
-          <a:lstStyle/>
-          <a:p>
-            <a:r>
-              <a:rPr lang="en-ID" dirty="0" smtClean="0">
-                <a:ln w="0"/>
-                <a:effectLst>
-                  <a:outerShdw blurRad="38100" dist="19050" dir="2700000" algn="tl" rotWithShape="0">
-                    <a:schemeClr val="dk1">
-                      <a:alpha val="40000"/>
-                    </a:schemeClr>
-                  </a:outerShdw>
-                </a:effectLst>
-                <a:latin typeface="Berlin Sans FB" panose="020E0602020502020306" pitchFamily="34" charset="0"/>
-              </a:rPr>
-              <a:t>“The shell is my friend!”</a:t>
+              <a:t>CDC – git merging / Part V – “Practice” </a:t>
             </a:r>
           </a:p>
         </p:txBody>
@@ -5388,7 +5357,7 @@
         <p:spPr>
           <a:xfrm>
             <a:off x="485056" y="2794325"/>
-            <a:ext cx="5904656" cy="1815882"/>
+            <a:ext cx="5904656" cy="1569660"/>
           </a:xfrm>
           <a:prstGeom prst="rect">
             <a:avLst/>
@@ -5415,7 +5384,6 @@
               <a:rPr lang="en-ID" sz="1600" dirty="0" smtClean="0"/>
               <a:t>Clone repository with branch develop</a:t>
             </a:r>
-            <a:endParaRPr lang="en-ID" sz="1600" dirty="0" smtClean="0"/>
           </a:p>
           <a:p>
             <a:pPr marL="285750" indent="-285750">
@@ -5454,7 +5422,40 @@
             </a:pPr>
             <a:r>
               <a:rPr lang="en-ID" sz="1600" dirty="0" smtClean="0"/>
-              <a:t>Publish to remote</a:t>
+              <a:t>Delete </a:t>
+            </a:r>
+            <a:r>
+              <a:rPr lang="en-ID" sz="1600" dirty="0" smtClean="0"/>
+              <a:t>feature-branch</a:t>
+            </a:r>
+          </a:p>
+        </p:txBody>
+      </p:sp>
+      <p:sp>
+        <p:nvSpPr>
+          <p:cNvPr id="11" name="TextBox 10"/>
+          <p:cNvSpPr txBox="1"/>
+          <p:nvPr/>
+        </p:nvSpPr>
+        <p:spPr>
+          <a:xfrm>
+            <a:off x="485056" y="923950"/>
+            <a:ext cx="5680248" cy="1815882"/>
+          </a:xfrm>
+          <a:prstGeom prst="rect">
+            <a:avLst/>
+          </a:prstGeom>
+          <a:noFill/>
+        </p:spPr>
+        <p:txBody>
+          <a:bodyPr wrap="square" rtlCol="0">
+            <a:spAutoFit/>
+          </a:bodyPr>
+          <a:lstStyle/>
+          <a:p>
+            <a:r>
+              <a:rPr lang="en-ID" sz="1600" dirty="0" smtClean="0"/>
+              <a:t>Exercise 1 – Merge strategy - recursive.</a:t>
             </a:r>
           </a:p>
           <a:p>
@@ -5464,48 +5465,8 @@
             </a:pPr>
             <a:r>
               <a:rPr lang="en-ID" sz="1600" dirty="0" smtClean="0"/>
-              <a:t>Delete feature-branch</a:t>
-            </a:r>
-          </a:p>
-        </p:txBody>
-      </p:sp>
-      <p:sp>
-        <p:nvSpPr>
-          <p:cNvPr id="11" name="TextBox 10"/>
-          <p:cNvSpPr txBox="1"/>
-          <p:nvPr/>
-        </p:nvSpPr>
-        <p:spPr>
-          <a:xfrm>
-            <a:off x="485056" y="923950"/>
-            <a:ext cx="5904656" cy="1815882"/>
-          </a:xfrm>
-          <a:prstGeom prst="rect">
-            <a:avLst/>
-          </a:prstGeom>
-          <a:noFill/>
-        </p:spPr>
-        <p:txBody>
-          <a:bodyPr wrap="square" rtlCol="0">
-            <a:spAutoFit/>
-          </a:bodyPr>
-          <a:lstStyle/>
-          <a:p>
-            <a:r>
-              <a:rPr lang="en-ID" sz="1600" dirty="0" smtClean="0"/>
-              <a:t>Exercise 1 – Merge strategy - recursive.</a:t>
-            </a:r>
-          </a:p>
-          <a:p>
-            <a:pPr marL="285750" indent="-285750">
-              <a:buFont typeface="Arial" panose="020B0604020202020204" pitchFamily="34" charset="0"/>
-              <a:buChar char="•"/>
-            </a:pPr>
-            <a:r>
-              <a:rPr lang="en-ID" sz="1600" dirty="0" smtClean="0"/>
               <a:t>Clone repository with branch develop</a:t>
             </a:r>
-            <a:endParaRPr lang="en-ID" sz="1600" dirty="0" smtClean="0"/>
           </a:p>
           <a:p>
             <a:pPr marL="285750" indent="-285750">
@@ -5630,79 +5591,7 @@
                 </a:solidFill>
                 <a:latin typeface="Bookman Old Style" panose="02050604050505020204" pitchFamily="18" charset="0"/>
               </a:rPr>
-              <a:t>CDC – git merging / Part </a:t>
-            </a:r>
-            <a:r>
-              <a:rPr lang="en-ID" b="1" dirty="0" smtClean="0">
-                <a:solidFill>
-                  <a:srgbClr val="392900"/>
-                </a:solidFill>
-                <a:latin typeface="Bookman Old Style" panose="02050604050505020204" pitchFamily="18" charset="0"/>
-              </a:rPr>
-              <a:t>V </a:t>
-            </a:r>
-            <a:r>
-              <a:rPr lang="en-ID" b="1" dirty="0" smtClean="0">
-                <a:solidFill>
-                  <a:srgbClr val="392900"/>
-                </a:solidFill>
-                <a:latin typeface="Bookman Old Style" panose="02050604050505020204" pitchFamily="18" charset="0"/>
-              </a:rPr>
-              <a:t>– </a:t>
-            </a:r>
-            <a:r>
-              <a:rPr lang="en-ID" b="1" dirty="0" smtClean="0">
-                <a:solidFill>
-                  <a:srgbClr val="392900"/>
-                </a:solidFill>
-                <a:latin typeface="Bookman Old Style" panose="02050604050505020204" pitchFamily="18" charset="0"/>
-              </a:rPr>
-              <a:t>“Practice” </a:t>
-            </a:r>
-            <a:endParaRPr lang="en-ID" b="1" dirty="0" smtClean="0">
-              <a:solidFill>
-                <a:srgbClr val="392900"/>
-              </a:solidFill>
-              <a:latin typeface="Bookman Old Style" panose="02050604050505020204" pitchFamily="18" charset="0"/>
-            </a:endParaRPr>
-          </a:p>
-        </p:txBody>
-      </p:sp>
-      <p:sp>
-        <p:nvSpPr>
-          <p:cNvPr id="6" name="TextBox 5"/>
-          <p:cNvSpPr txBox="1"/>
-          <p:nvPr/>
-        </p:nvSpPr>
-        <p:spPr>
-          <a:xfrm>
-            <a:off x="4149080" y="4240875"/>
-            <a:ext cx="2808312" cy="369332"/>
-          </a:xfrm>
-          <a:prstGeom prst="rect">
-            <a:avLst/>
-          </a:prstGeom>
-          <a:noFill/>
-        </p:spPr>
-        <p:txBody>
-          <a:bodyPr wrap="square" rtlCol="0">
-            <a:spAutoFit/>
-          </a:bodyPr>
-          <a:lstStyle/>
-          <a:p>
-            <a:r>
-              <a:rPr lang="en-ID" dirty="0" smtClean="0">
-                <a:ln w="0"/>
-                <a:effectLst>
-                  <a:outerShdw blurRad="38100" dist="19050" dir="2700000" algn="tl" rotWithShape="0">
-                    <a:schemeClr val="dk1">
-                      <a:alpha val="40000"/>
-                    </a:schemeClr>
-                  </a:outerShdw>
-                </a:effectLst>
-                <a:latin typeface="Berlin Sans FB" panose="020E0602020502020306" pitchFamily="34" charset="0"/>
-              </a:rPr>
-              <a:t>“The shell is my friend!”</a:t>
+              <a:t>CDC – git merging / Part V – “Practice” </a:t>
             </a:r>
           </a:p>
         </p:txBody>
@@ -5743,7 +5632,6 @@
               <a:rPr lang="en-ID" sz="1600" dirty="0" smtClean="0"/>
               <a:t>Clone repository with branch develop</a:t>
             </a:r>
-            <a:endParaRPr lang="en-ID" sz="1600" dirty="0" smtClean="0"/>
           </a:p>
           <a:p>
             <a:pPr marL="285750" indent="-285750">
@@ -5782,7 +5670,6 @@
               <a:rPr lang="en-ID" sz="1600" dirty="0" smtClean="0"/>
               <a:t>)</a:t>
             </a:r>
-            <a:endParaRPr lang="en-ID" sz="1600" dirty="0" smtClean="0"/>
           </a:p>
           <a:p>
             <a:pPr marL="285750" indent="-285750">
@@ -5916,25 +5803,7 @@
                 </a:solidFill>
                 <a:latin typeface="Bookman Old Style" panose="02050604050505020204" pitchFamily="18" charset="0"/>
               </a:rPr>
-              <a:t>CDC – git merging / </a:t>
-            </a:r>
-            <a:r>
-              <a:rPr lang="en-ID" b="1" dirty="0" smtClean="0">
-                <a:solidFill>
-                  <a:srgbClr val="392900"/>
-                </a:solidFill>
-                <a:latin typeface="Bookman Old Style" panose="02050604050505020204" pitchFamily="18" charset="0"/>
-              </a:rPr>
-              <a:t>Introduction</a:t>
-            </a:r>
-            <a:r>
-              <a:rPr lang="en-ID" b="1" dirty="0" smtClean="0">
-                <a:solidFill>
-                  <a:srgbClr val="392900"/>
-                </a:solidFill>
-                <a:latin typeface="Bookman Old Style" panose="02050604050505020204" pitchFamily="18" charset="0"/>
-              </a:rPr>
-              <a:t> – “Workflow”</a:t>
+              <a:t>CDC – git merging / Introduction – “Workflow”</a:t>
             </a:r>
             <a:endParaRPr lang="en-US" b="1" dirty="0">
               <a:solidFill>
@@ -6011,16 +5880,7 @@
                 </a:solidFill>
                 <a:latin typeface="Bookman Old Style" panose="02050604050505020204" pitchFamily="18" charset="0"/>
               </a:rPr>
-              <a:t>CDC – git merging / </a:t>
-            </a:r>
-            <a:r>
-              <a:rPr lang="en-ID" b="1" dirty="0" smtClean="0">
-                <a:solidFill>
-                  <a:srgbClr val="392900"/>
-                </a:solidFill>
-                <a:latin typeface="Bookman Old Style" panose="02050604050505020204" pitchFamily="18" charset="0"/>
-              </a:rPr>
-              <a:t>Introduction – “Workflow”</a:t>
+              <a:t>CDC – git merging / Introduction – “Workflow”</a:t>
             </a:r>
             <a:endParaRPr lang="en-US" b="1" dirty="0">
               <a:solidFill>
@@ -6339,16 +6199,7 @@
                 </a:solidFill>
                 <a:latin typeface="Bookman Old Style" panose="02050604050505020204" pitchFamily="18" charset="0"/>
               </a:rPr>
-              <a:t>CDC – git merging / </a:t>
-            </a:r>
-            <a:r>
-              <a:rPr lang="en-ID" b="1" dirty="0" smtClean="0">
-                <a:solidFill>
-                  <a:srgbClr val="392900"/>
-                </a:solidFill>
-                <a:latin typeface="Bookman Old Style" panose="02050604050505020204" pitchFamily="18" charset="0"/>
-              </a:rPr>
-              <a:t>Introduction – “Conventions”</a:t>
+              <a:t>CDC – git merging / Introduction – “Conventions”</a:t>
             </a:r>
             <a:endParaRPr lang="en-US" b="1" dirty="0">
               <a:solidFill>
@@ -6433,23 +6284,8 @@
                 </a:solidFill>
                 <a:latin typeface="Bookman Old Style" panose="02050604050505020204" pitchFamily="18" charset="0"/>
               </a:rPr>
-              <a:t>CDC – git merging / Part I </a:t>
-            </a:r>
-            <a:r>
-              <a:rPr lang="en-ID" b="1" dirty="0" smtClean="0">
-                <a:solidFill>
-                  <a:srgbClr val="392900"/>
-                </a:solidFill>
-                <a:latin typeface="Bookman Old Style" panose="02050604050505020204" pitchFamily="18" charset="0"/>
-              </a:rPr>
-              <a:t>– “Setup”</a:t>
-            </a:r>
-            <a:endParaRPr lang="en-ID" b="1" dirty="0" smtClean="0">
-              <a:solidFill>
-                <a:srgbClr val="392900"/>
-              </a:solidFill>
-              <a:latin typeface="Bookman Old Style" panose="02050604050505020204" pitchFamily="18" charset="0"/>
-            </a:endParaRPr>
+              <a:t>CDC – git merging / Part I – “Setup”</a:t>
+            </a:r>
           </a:p>
           <a:p>
             <a:r>
@@ -6544,11 +6380,7 @@
             </a:pPr>
             <a:r>
               <a:rPr lang="en-ID" dirty="0" smtClean="0"/>
-              <a:t>Project </a:t>
-            </a:r>
-            <a:r>
-              <a:rPr lang="en-ID" dirty="0" smtClean="0"/>
-              <a:t>URL to a repository</a:t>
+              <a:t>Project URL to a repository</a:t>
             </a:r>
           </a:p>
           <a:p>
@@ -6568,11 +6400,7 @@
             </a:pPr>
             <a:r>
               <a:rPr lang="en-ID" dirty="0" smtClean="0"/>
-              <a:t>Working with “</a:t>
-            </a:r>
-            <a:r>
-              <a:rPr lang="en-ID" dirty="0" smtClean="0"/>
-              <a:t>Gitflow”</a:t>
+              <a:t>Working with “Gitflow”</a:t>
             </a:r>
           </a:p>
           <a:p>
@@ -6582,29 +6410,8 @@
             </a:pPr>
             <a:r>
               <a:rPr lang="en-ID" dirty="0" smtClean="0"/>
-              <a:t>Branch </a:t>
-            </a:r>
-            <a:r>
-              <a:rPr lang="en-ID" dirty="0" smtClean="0"/>
-              <a:t>from develop, create a local feature branch, implement your task, </a:t>
-            </a:r>
-            <a:r>
-              <a:rPr lang="en-ID" dirty="0" smtClean="0"/>
-              <a:t>merge it back and push </a:t>
-            </a:r>
-            <a:r>
-              <a:rPr lang="en-ID" dirty="0" smtClean="0"/>
-              <a:t>it </a:t>
-            </a:r>
-            <a:r>
-              <a:rPr lang="en-ID" dirty="0" smtClean="0"/>
-              <a:t>to develop! </a:t>
-            </a:r>
-            <a:r>
-              <a:rPr lang="en-ID" dirty="0" smtClean="0"/>
-              <a:t>ASAP</a:t>
-            </a:r>
-            <a:endParaRPr lang="en-ID" dirty="0" smtClean="0"/>
+              <a:t>Branch from develop, create a local feature branch, implement your task, merge it back and push it to develop! ASAP</a:t>
+            </a:r>
           </a:p>
           <a:p>
             <a:endParaRPr lang="en-US" dirty="0"/>
@@ -6783,23 +6590,8 @@
                 </a:solidFill>
                 <a:latin typeface="Bookman Old Style" panose="02050604050505020204" pitchFamily="18" charset="0"/>
               </a:rPr>
-              <a:t>CDC – git merging / Part I </a:t>
-            </a:r>
-            <a:r>
-              <a:rPr lang="en-ID" b="1" dirty="0" smtClean="0">
-                <a:solidFill>
-                  <a:srgbClr val="392900"/>
-                </a:solidFill>
-                <a:latin typeface="Bookman Old Style" panose="02050604050505020204" pitchFamily="18" charset="0"/>
-              </a:rPr>
-              <a:t>– “Setup”</a:t>
-            </a:r>
-            <a:endParaRPr lang="en-ID" b="1" dirty="0" smtClean="0">
-              <a:solidFill>
-                <a:srgbClr val="392900"/>
-              </a:solidFill>
-              <a:latin typeface="Bookman Old Style" panose="02050604050505020204" pitchFamily="18" charset="0"/>
-            </a:endParaRPr>
+              <a:t>CDC – git merging / Part I – “Setup”</a:t>
+            </a:r>
           </a:p>
           <a:p>
             <a:r>
@@ -6999,23 +6791,8 @@
                 </a:solidFill>
                 <a:latin typeface="Bookman Old Style" panose="02050604050505020204" pitchFamily="18" charset="0"/>
               </a:rPr>
-              <a:t>CDC – git merging / Part I </a:t>
-            </a:r>
-            <a:r>
-              <a:rPr lang="en-ID" b="1" dirty="0" smtClean="0">
-                <a:solidFill>
-                  <a:srgbClr val="392900"/>
-                </a:solidFill>
-                <a:latin typeface="Bookman Old Style" panose="02050604050505020204" pitchFamily="18" charset="0"/>
-              </a:rPr>
-              <a:t>– “Setup”</a:t>
-            </a:r>
-            <a:endParaRPr lang="en-ID" b="1" dirty="0" smtClean="0">
-              <a:solidFill>
-                <a:srgbClr val="392900"/>
-              </a:solidFill>
-              <a:latin typeface="Bookman Old Style" panose="02050604050505020204" pitchFamily="18" charset="0"/>
-            </a:endParaRPr>
+              <a:t>CDC – git merging / Part I – “Setup”</a:t>
+            </a:r>
           </a:p>
           <a:p>
             <a:r>
@@ -8006,15 +7783,7 @@
                   <a:srgbClr val="FFC000"/>
                 </a:solidFill>
               </a:rPr>
-              <a:t>Edit some </a:t>
-            </a:r>
-            <a:r>
-              <a:rPr lang="en-ID" sz="1400" dirty="0" smtClean="0">
-                <a:solidFill>
-                  <a:srgbClr val="FFC000"/>
-                </a:solidFill>
-              </a:rPr>
-              <a:t>files…</a:t>
+              <a:t>Edit some files…</a:t>
             </a:r>
             <a:endParaRPr lang="en-US" sz="1400" dirty="0">
               <a:solidFill>
@@ -8243,14 +8012,7 @@
                 <a:latin typeface="Courier New" panose="02070309020205020404" pitchFamily="49" charset="0"/>
                 <a:cs typeface="Courier New" panose="02070309020205020404" pitchFamily="49" charset="0"/>
               </a:rPr>
-              <a:t>$git </a:t>
-            </a:r>
-            <a:r>
-              <a:rPr lang="en-ID" sz="1200" dirty="0" smtClean="0">
-                <a:latin typeface="Courier New" panose="02070309020205020404" pitchFamily="49" charset="0"/>
-                <a:cs typeface="Courier New" panose="02070309020205020404" pitchFamily="49" charset="0"/>
-              </a:rPr>
-              <a:t>pull </a:t>
+              <a:t>$git pull </a:t>
             </a:r>
             <a:endParaRPr lang="en-ID" sz="1200" dirty="0">
               <a:latin typeface="Courier New" panose="02070309020205020404" pitchFamily="49" charset="0"/>
@@ -8263,49 +8025,35 @@
                 <a:latin typeface="Courier New" panose="02070309020205020404" pitchFamily="49" charset="0"/>
                 <a:cs typeface="Courier New" panose="02070309020205020404" pitchFamily="49" charset="0"/>
               </a:rPr>
-              <a:t>$</a:t>
+              <a:t>$git </a:t>
+            </a:r>
+            <a:r>
+              <a:rPr lang="en-ID" sz="1200" dirty="0">
+                <a:latin typeface="Courier New" panose="02070309020205020404" pitchFamily="49" charset="0"/>
+                <a:cs typeface="Courier New" panose="02070309020205020404" pitchFamily="49" charset="0"/>
+              </a:rPr>
+              <a:t>merge </a:t>
             </a:r>
             <a:r>
               <a:rPr lang="en-ID" sz="1200" dirty="0" smtClean="0">
                 <a:latin typeface="Courier New" panose="02070309020205020404" pitchFamily="49" charset="0"/>
                 <a:cs typeface="Courier New" panose="02070309020205020404" pitchFamily="49" charset="0"/>
               </a:rPr>
-              <a:t>git </a:t>
-            </a:r>
-            <a:r>
-              <a:rPr lang="en-ID" sz="1200" dirty="0">
+              <a:t>--no-</a:t>
+            </a:r>
+            <a:r>
+              <a:rPr lang="en-ID" sz="1200" dirty="0" err="1" smtClean="0">
                 <a:latin typeface="Courier New" panose="02070309020205020404" pitchFamily="49" charset="0"/>
                 <a:cs typeface="Courier New" panose="02070309020205020404" pitchFamily="49" charset="0"/>
               </a:rPr>
-              <a:t>merge </a:t>
+              <a:t>ff</a:t>
             </a:r>
             <a:r>
               <a:rPr lang="en-ID" sz="1200" dirty="0" smtClean="0">
                 <a:latin typeface="Courier New" panose="02070309020205020404" pitchFamily="49" charset="0"/>
                 <a:cs typeface="Courier New" panose="02070309020205020404" pitchFamily="49" charset="0"/>
               </a:rPr>
-              <a:t>--no-</a:t>
-            </a:r>
-            <a:r>
-              <a:rPr lang="en-ID" sz="1200" dirty="0" err="1" smtClean="0">
-                <a:latin typeface="Courier New" panose="02070309020205020404" pitchFamily="49" charset="0"/>
-                <a:cs typeface="Courier New" panose="02070309020205020404" pitchFamily="49" charset="0"/>
-              </a:rPr>
-              <a:t>ff</a:t>
-            </a:r>
-            <a:r>
-              <a:rPr lang="en-ID" sz="1200" dirty="0" smtClean="0">
-                <a:latin typeface="Courier New" panose="02070309020205020404" pitchFamily="49" charset="0"/>
-                <a:cs typeface="Courier New" panose="02070309020205020404" pitchFamily="49" charset="0"/>
-              </a:rPr>
-              <a:t> &lt;unique-name</a:t>
-            </a:r>
-            <a:r>
-              <a:rPr lang="en-ID" sz="1200" dirty="0" smtClean="0">
-                <a:latin typeface="Courier New" panose="02070309020205020404" pitchFamily="49" charset="0"/>
-                <a:cs typeface="Courier New" panose="02070309020205020404" pitchFamily="49" charset="0"/>
-              </a:rPr>
-              <a:t>&gt;</a:t>
+              <a:t> &lt;unique-name&gt;</a:t>
             </a:r>
           </a:p>
           <a:p>
@@ -8407,11 +8155,7 @@
           <a:p>
             <a:r>
               <a:rPr lang="en-ID" dirty="0" smtClean="0"/>
-              <a:t>Commit your done </a:t>
-            </a:r>
-            <a:r>
-              <a:rPr lang="en-ID" dirty="0" smtClean="0"/>
-              <a:t>work</a:t>
+              <a:t>Commit your done work</a:t>
             </a:r>
             <a:endParaRPr lang="en-US" dirty="0"/>
           </a:p>
@@ -8475,15 +8219,7 @@
             </a:r>
             <a:r>
               <a:rPr lang="en-ID" b="1" u="sng" dirty="0" smtClean="0"/>
-              <a:t>ain </a:t>
-            </a:r>
-            <a:r>
-              <a:rPr lang="en-ID" b="1" u="sng" dirty="0" smtClean="0"/>
-              <a:t>workflow to </a:t>
-            </a:r>
-            <a:r>
-              <a:rPr lang="en-ID" b="1" u="sng" dirty="0" smtClean="0"/>
-              <a:t>merge</a:t>
+              <a:t>ain workflow to merge</a:t>
             </a:r>
             <a:endParaRPr lang="en-US" dirty="0"/>
           </a:p>
@@ -9326,15 +9062,6 @@
 </file>
 
 <file path=customXml/item1.xml><?xml version="1.0" encoding="utf-8"?>
-<?mso-contentType ?>
-<FormTemplates xmlns="http://schemas.microsoft.com/sharepoint/v3/contenttype/forms">
-  <Display>DocumentLibraryForm</Display>
-  <Edit>DocumentLibraryForm</Edit>
-  <New>DocumentLibraryForm</New>
-</FormTemplates>
-</file>
-
-<file path=customXml/item2.xml><?xml version="1.0" encoding="utf-8"?>
 <ct:contentTypeSchema xmlns:ct="http://schemas.microsoft.com/office/2006/metadata/contentType" xmlns:ma="http://schemas.microsoft.com/office/2006/metadata/properties/metaAttributes" ct:_="" ma:_="" ma:contentTypeName="Document" ma:contentTypeID="0x0101003684E481DE84C9499EF0F81972D7EF96" ma:contentTypeVersion="0" ma:contentTypeDescription="Create a new document." ma:contentTypeScope="" ma:versionID="1082b6f87e9a9efb3f4dd16ca55e9303">
   <xsd:schema xmlns:xsd="http://www.w3.org/2001/XMLSchema" xmlns:xs="http://www.w3.org/2001/XMLSchema" xmlns:p="http://schemas.microsoft.com/office/2006/metadata/properties" targetNamespace="http://schemas.microsoft.com/office/2006/metadata/properties" ma:root="true" ma:fieldsID="1b05d82d297216baf5b26c55225140df">
     <xsd:element name="properties">
@@ -9448,6 +9175,15 @@
 </ct:contentTypeSchema>
 </file>
 
+<file path=customXml/item2.xml><?xml version="1.0" encoding="utf-8"?>
+<?mso-contentType ?>
+<FormTemplates xmlns="http://schemas.microsoft.com/sharepoint/v3/contenttype/forms">
+  <Display>DocumentLibraryForm</Display>
+  <Edit>DocumentLibraryForm</Edit>
+  <New>DocumentLibraryForm</New>
+</FormTemplates>
+</file>
+
 <file path=customXml/item3.xml><?xml version="1.0" encoding="utf-8"?>
 <p:properties xmlns:p="http://schemas.microsoft.com/office/2006/metadata/properties" xmlns:xsi="http://www.w3.org/2001/XMLSchema-instance" xmlns:pc="http://schemas.microsoft.com/office/infopath/2007/PartnerControls">
   <documentManagement/>
@@ -9455,14 +9191,6 @@
 </file>
 
 <file path=customXml/itemProps1.xml><?xml version="1.0" encoding="utf-8"?>
-<ds:datastoreItem xmlns:ds="http://schemas.openxmlformats.org/officeDocument/2006/customXml" ds:itemID="{DB5E681D-860B-4D22-80CF-C7472F8C312F}">
-  <ds:schemaRefs>
-    <ds:schemaRef ds:uri="http://schemas.microsoft.com/sharepoint/v3/contenttype/forms"/>
-  </ds:schemaRefs>
-</ds:datastoreItem>
-</file>
-
-<file path=customXml/itemProps2.xml><?xml version="1.0" encoding="utf-8"?>
 <ds:datastoreItem xmlns:ds="http://schemas.openxmlformats.org/officeDocument/2006/customXml" ds:itemID="{6B82694F-752F-4827-A348-4AA5A968F420}">
   <ds:schemaRefs>
     <ds:schemaRef ds:uri="http://schemas.microsoft.com/office/2006/metadata/contentType"/>
@@ -9478,17 +9206,25 @@
 </ds:datastoreItem>
 </file>
 
+<file path=customXml/itemProps2.xml><?xml version="1.0" encoding="utf-8"?>
+<ds:datastoreItem xmlns:ds="http://schemas.openxmlformats.org/officeDocument/2006/customXml" ds:itemID="{DB5E681D-860B-4D22-80CF-C7472F8C312F}">
+  <ds:schemaRefs>
+    <ds:schemaRef ds:uri="http://schemas.microsoft.com/sharepoint/v3/contenttype/forms"/>
+  </ds:schemaRefs>
+</ds:datastoreItem>
+</file>
+
 <file path=customXml/itemProps3.xml><?xml version="1.0" encoding="utf-8"?>
 <ds:datastoreItem xmlns:ds="http://schemas.openxmlformats.org/officeDocument/2006/customXml" ds:itemID="{12B43294-76B4-4246-849F-628E6870A5FD}">
   <ds:schemaRefs>
-    <ds:schemaRef ds:uri="http://purl.org/dc/elements/1.1/"/>
     <ds:schemaRef ds:uri="http://schemas.microsoft.com/office/2006/metadata/properties"/>
+    <ds:schemaRef ds:uri="http://schemas.microsoft.com/office/2006/documentManagement/types"/>
     <ds:schemaRef ds:uri="http://purl.org/dc/terms/"/>
     <ds:schemaRef ds:uri="http://schemas.openxmlformats.org/package/2006/metadata/core-properties"/>
-    <ds:schemaRef ds:uri="http://schemas.microsoft.com/office/2006/documentManagement/types"/>
+    <ds:schemaRef ds:uri="http://purl.org/dc/dcmitype/"/>
     <ds:schemaRef ds:uri="http://schemas.microsoft.com/office/infopath/2007/PartnerControls"/>
+    <ds:schemaRef ds:uri="http://purl.org/dc/elements/1.1/"/>
     <ds:schemaRef ds:uri="http://www.w3.org/XML/1998/namespace"/>
-    <ds:schemaRef ds:uri="http://purl.org/dc/dcmitype/"/>
   </ds:schemaRefs>
 </ds:datastoreItem>
 </file>
</xml_diff>

<commit_message>
added last slides for exercises
</commit_message>
<xml_diff>
--- a/cdc_git_ws1.pptx
+++ b/cdc_git_ws1.pptx
@@ -1043,9 +1043,41 @@
           <a:bodyPr/>
           <a:lstStyle/>
           <a:p>
-            <a:r>
-              <a:rPr lang="en-US" b="1" dirty="0" smtClean="0"/>
+            <a:pPr marL="171450" indent="-171450">
+              <a:buFont typeface="Arial" panose="020B0604020202020204" pitchFamily="34" charset="0"/>
+              <a:buChar char="•"/>
+            </a:pPr>
+            <a:r>
+              <a:rPr lang="en-US" b="0" dirty="0" smtClean="0"/>
               <a:t>Rebasing Deletes Merge Commits!</a:t>
+            </a:r>
+          </a:p>
+          <a:p>
+            <a:pPr marL="171450" indent="-171450">
+              <a:buFont typeface="Arial" panose="020B0604020202020204" pitchFamily="34" charset="0"/>
+              <a:buChar char="•"/>
+            </a:pPr>
+            <a:r>
+              <a:rPr lang="en-ID" dirty="0" smtClean="0"/>
+              <a:t>Golden Rule:</a:t>
+            </a:r>
+            <a:r>
+              <a:rPr lang="en-ID" baseline="0" dirty="0" smtClean="0"/>
+              <a:t> </a:t>
+            </a:r>
+            <a:r>
+              <a:rPr lang="en-ID" dirty="0" smtClean="0"/>
+              <a:t>Rebase only for local branches or single developer remote branches, never rebase published branches which others use (because commit IDs will change with their related source code)</a:t>
+            </a:r>
+          </a:p>
+          <a:p>
+            <a:pPr marL="171450" indent="-171450">
+              <a:buFont typeface="Arial" panose="020B0604020202020204" pitchFamily="34" charset="0"/>
+              <a:buChar char="•"/>
+            </a:pPr>
+            <a:r>
+              <a:rPr lang="en-ID" dirty="0" smtClean="0"/>
+              <a:t>Rebasing is like masturbation - it is better if you do it in private - if you do it n public, you will be scorned.</a:t>
             </a:r>
             <a:endParaRPr lang="en-US" dirty="0"/>
           </a:p>
@@ -3563,14 +3595,7 @@
                 <a:latin typeface="Courier New" panose="02070309020205020404" pitchFamily="49" charset="0"/>
                 <a:cs typeface="Courier New" panose="02070309020205020404" pitchFamily="49" charset="0"/>
               </a:rPr>
-              <a:t> </a:t>
-            </a:r>
-            <a:r>
-              <a:rPr lang="en-ID" sz="1200" dirty="0" smtClean="0">
-                <a:latin typeface="Courier New" panose="02070309020205020404" pitchFamily="49" charset="0"/>
-                <a:cs typeface="Courier New" panose="02070309020205020404" pitchFamily="49" charset="0"/>
-              </a:rPr>
-              <a:t>--decorate –graph --all</a:t>
+              <a:t> --decorate –graph --all</a:t>
             </a:r>
             <a:endParaRPr lang="en-US" sz="1200" dirty="0"/>
           </a:p>
@@ -3683,7 +3708,7 @@
         <p:spPr>
           <a:xfrm>
             <a:off x="336676" y="3052297"/>
-            <a:ext cx="6332684" cy="923330"/>
+            <a:ext cx="4316460" cy="923330"/>
           </a:xfrm>
           <a:prstGeom prst="rect">
             <a:avLst/>
@@ -4338,7 +4363,21 @@
                 <a:latin typeface="Courier New" panose="02070309020205020404" pitchFamily="49" charset="0"/>
                 <a:cs typeface="Courier New" panose="02070309020205020404" pitchFamily="49" charset="0"/>
               </a:rPr>
-              <a:t>merge &lt;branch-name&gt;</a:t>
+              <a:t>merge </a:t>
+            </a:r>
+            <a:r>
+              <a:rPr lang="en-ID" sz="1200" dirty="0" smtClean="0">
+                <a:latin typeface="Courier New" panose="02070309020205020404" pitchFamily="49" charset="0"/>
+                <a:cs typeface="Courier New" panose="02070309020205020404" pitchFamily="49" charset="0"/>
+              </a:rPr>
+              <a:t>&lt;branch-name</a:t>
+            </a:r>
+            <a:r>
+              <a:rPr lang="en-ID" sz="1200" dirty="0" smtClean="0">
+                <a:latin typeface="Courier New" panose="02070309020205020404" pitchFamily="49" charset="0"/>
+                <a:cs typeface="Courier New" panose="02070309020205020404" pitchFamily="49" charset="0"/>
+              </a:rPr>
+              <a:t>&gt;</a:t>
             </a:r>
             <a:endParaRPr lang="en-US" sz="1200" dirty="0"/>
           </a:p>
@@ -5157,13 +5196,8 @@
           <a:p>
             <a:r>
               <a:rPr lang="en-ID" sz="1600" dirty="0" smtClean="0"/>
-              <a:t>Merge </a:t>
-            </a:r>
-            <a:r>
-              <a:rPr lang="en-ID" sz="1600" dirty="0" smtClean="0"/>
-              <a:t>conflicts</a:t>
-            </a:r>
-            <a:endParaRPr lang="en-ID" sz="1600" dirty="0" smtClean="0"/>
+              <a:t>Merge conflicts</a:t>
+            </a:r>
           </a:p>
           <a:p>
             <a:pPr marL="342900" indent="-342900">
@@ -5171,11 +5205,7 @@
             </a:pPr>
             <a:r>
               <a:rPr lang="en-ID" sz="1600" dirty="0" smtClean="0"/>
-              <a:t>Solve </a:t>
-            </a:r>
-            <a:r>
-              <a:rPr lang="en-ID" sz="1600" dirty="0" smtClean="0"/>
-              <a:t>conflict(s)</a:t>
+              <a:t>Solve conflict(s)</a:t>
             </a:r>
           </a:p>
           <a:p>
@@ -5184,11 +5214,7 @@
             </a:pPr>
             <a:r>
               <a:rPr lang="en-ID" sz="1600" dirty="0" smtClean="0"/>
-              <a:t>Continue </a:t>
-            </a:r>
-            <a:r>
-              <a:rPr lang="en-ID" sz="1600" dirty="0" smtClean="0"/>
-              <a:t>rebase process</a:t>
+              <a:t>Continue rebase process</a:t>
             </a:r>
             <a:endParaRPr lang="en-US" sz="1600" dirty="0"/>
           </a:p>
@@ -5422,11 +5448,7 @@
             </a:pPr>
             <a:r>
               <a:rPr lang="en-ID" sz="1600" dirty="0" smtClean="0"/>
-              <a:t>Delete </a:t>
-            </a:r>
-            <a:r>
-              <a:rPr lang="en-ID" sz="1600" dirty="0" smtClean="0"/>
-              <a:t>feature-branch</a:t>
+              <a:t>Delete feature-branch</a:t>
             </a:r>
           </a:p>
         </p:txBody>
@@ -5509,7 +5531,15 @@
             </a:r>
             <a:r>
               <a:rPr lang="en-US" sz="1600" dirty="0" smtClean="0"/>
-              <a:t> to remote</a:t>
+              <a:t> </a:t>
+            </a:r>
+            <a:r>
+              <a:rPr lang="en-US" sz="1600" dirty="0" smtClean="0"/>
+              <a:t>develop-branch to </a:t>
+            </a:r>
+            <a:r>
+              <a:rPr lang="en-US" sz="1600" dirty="0" smtClean="0"/>
+              <a:t>remote</a:t>
             </a:r>
             <a:endParaRPr lang="en-ID" sz="1600" dirty="0" smtClean="0"/>
           </a:p>

</xml_diff>

<commit_message>
add comments in the slides as steps, fixed the command errors
</commit_message>
<xml_diff>
--- a/cdc_git_ws1.pptx
+++ b/cdc_git_ws1.pptx
@@ -242,7 +242,7 @@
           <a:p>
             <a:fld id="{88EB923B-AC8F-4B84-A8E4-8B1F68B80157}" type="datetimeFigureOut">
               <a:rPr lang="en-US" smtClean="0"/>
-              <a:t>10/24/2016</a:t>
+              <a:t>10/31/2016</a:t>
             </a:fld>
             <a:endParaRPr lang="en-US"/>
           </a:p>
@@ -555,20 +555,57 @@
           <a:lstStyle/>
           <a:p>
             <a:r>
-              <a:rPr lang="en-ID" dirty="0" smtClean="0"/>
-              <a:t>We will cover development</a:t>
-            </a:r>
-            <a:r>
-              <a:rPr lang="en-ID" baseline="0" dirty="0" smtClean="0"/>
-              <a:t> for now</a:t>
-            </a:r>
-          </a:p>
-          <a:p>
-            <a:r>
-              <a:rPr lang="en-ID" baseline="0" dirty="0" smtClean="0"/>
-              <a:t>Pull request comes later </a:t>
-            </a:r>
-            <a:endParaRPr lang="en-US" dirty="0"/>
+              <a:rPr lang="en-ID" dirty="0" smtClean="0">
+                <a:sym typeface="Wingdings" panose="05000000000000000000" pitchFamily="2" charset="2"/>
+              </a:rPr>
+              <a:t></a:t>
+            </a:r>
+          </a:p>
+          <a:p>
+            <a:endParaRPr lang="en-ID" dirty="0" smtClean="0">
+              <a:sym typeface="Wingdings" panose="05000000000000000000" pitchFamily="2" charset="2"/>
+            </a:endParaRPr>
+          </a:p>
+          <a:p>
+            <a:r>
+              <a:rPr lang="en-ID" dirty="0" smtClean="0">
+                <a:sym typeface="Wingdings" panose="05000000000000000000" pitchFamily="2" charset="2"/>
+              </a:rPr>
+              <a:t>Try to add attendees besides as collaborator </a:t>
+            </a:r>
+          </a:p>
+          <a:p>
+            <a:r>
+              <a:rPr lang="en-ID" dirty="0" smtClean="0">
+                <a:sym typeface="Wingdings" panose="05000000000000000000" pitchFamily="2" charset="2"/>
+              </a:rPr>
+              <a:t>They have</a:t>
+            </a:r>
+            <a:r>
+              <a:rPr lang="en-ID" baseline="0" dirty="0" smtClean="0">
+                <a:sym typeface="Wingdings" panose="05000000000000000000" pitchFamily="2" charset="2"/>
+              </a:rPr>
+              <a:t> to accept invitation link (comes with registered </a:t>
+            </a:r>
+            <a:r>
+              <a:rPr lang="en-ID" baseline="0" dirty="0" err="1" smtClean="0">
+                <a:sym typeface="Wingdings" panose="05000000000000000000" pitchFamily="2" charset="2"/>
+              </a:rPr>
+              <a:t>github</a:t>
+            </a:r>
+            <a:r>
+              <a:rPr lang="en-ID" baseline="0" smtClean="0">
+                <a:sym typeface="Wingdings" panose="05000000000000000000" pitchFamily="2" charset="2"/>
+              </a:rPr>
+              <a:t> account email</a:t>
+            </a:r>
+            <a:r>
+              <a:rPr lang="en-ID" baseline="0" dirty="0" smtClean="0">
+                <a:sym typeface="Wingdings" panose="05000000000000000000" pitchFamily="2" charset="2"/>
+              </a:rPr>
+              <a:t>)</a:t>
+            </a:r>
+            <a:endParaRPr lang="en-ID" dirty="0" smtClean="0"/>
           </a:p>
         </p:txBody>
       </p:sp>
@@ -589,7 +626,7 @@
           <a:p>
             <a:fld id="{7959948B-77FA-4B75-B65F-C5051F11C89F}" type="slidenum">
               <a:rPr lang="en-US" smtClean="0"/>
-              <a:t>2</a:t>
+              <a:t>1</a:t>
             </a:fld>
             <a:endParaRPr lang="en-US"/>
           </a:p>
@@ -598,7 +635,661 @@
     </p:spTree>
     <p:extLst>
       <p:ext uri="{BB962C8B-B14F-4D97-AF65-F5344CB8AC3E}">
-        <p14:creationId xmlns:p14="http://schemas.microsoft.com/office/powerpoint/2010/main" val="1323297392"/>
+        <p14:creationId xmlns:p14="http://schemas.microsoft.com/office/powerpoint/2010/main" val="4283235121"/>
+      </p:ext>
+    </p:extLst>
+  </p:cSld>
+  <p:clrMapOvr>
+    <a:masterClrMapping/>
+  </p:clrMapOvr>
+</p:notes>
+</file>
+
+<file path=ppt/notesSlides/notesSlide10.xml><?xml version="1.0" encoding="utf-8"?>
+<p:notes xmlns:a="http://schemas.openxmlformats.org/drawingml/2006/main" xmlns:r="http://schemas.openxmlformats.org/officeDocument/2006/relationships" xmlns:p="http://schemas.openxmlformats.org/presentationml/2006/main">
+  <p:cSld>
+    <p:spTree>
+      <p:nvGrpSpPr>
+        <p:cNvPr id="1" name=""/>
+        <p:cNvGrpSpPr/>
+        <p:nvPr/>
+      </p:nvGrpSpPr>
+      <p:grpSpPr>
+        <a:xfrm>
+          <a:off x="0" y="0"/>
+          <a:ext cx="0" cy="0"/>
+          <a:chOff x="0" y="0"/>
+          <a:chExt cx="0" cy="0"/>
+        </a:xfrm>
+      </p:grpSpPr>
+      <p:sp>
+        <p:nvSpPr>
+          <p:cNvPr id="2" name="Slide Image Placeholder 1"/>
+          <p:cNvSpPr>
+            <a:spLocks noGrp="1" noRot="1" noChangeAspect="1"/>
+          </p:cNvSpPr>
+          <p:nvPr>
+            <p:ph type="sldImg"/>
+          </p:nvPr>
+        </p:nvSpPr>
+        <p:spPr/>
+      </p:sp>
+      <p:sp>
+        <p:nvSpPr>
+          <p:cNvPr id="3" name="Notes Placeholder 2"/>
+          <p:cNvSpPr>
+            <a:spLocks noGrp="1"/>
+          </p:cNvSpPr>
+          <p:nvPr>
+            <p:ph type="body" idx="1"/>
+          </p:nvPr>
+        </p:nvSpPr>
+        <p:spPr/>
+        <p:txBody>
+          <a:bodyPr/>
+          <a:lstStyle/>
+          <a:p>
+            <a:pPr marL="171450" indent="-171450">
+              <a:buFontTx/>
+              <a:buChar char="-"/>
+            </a:pPr>
+            <a:r>
+              <a:rPr lang="en-ID" dirty="0" smtClean="0"/>
+              <a:t>Explain concepts of</a:t>
+            </a:r>
+            <a:r>
+              <a:rPr lang="en-ID" baseline="0" dirty="0" smtClean="0"/>
+              <a:t> merge and what to</a:t>
+            </a:r>
+            <a:endParaRPr lang="en-US" baseline="0" dirty="0" smtClean="0"/>
+          </a:p>
+          <a:p>
+            <a:pPr marL="171450" indent="-171450">
+              <a:buFontTx/>
+              <a:buChar char="-"/>
+            </a:pPr>
+            <a:r>
+              <a:rPr lang="en-ID" baseline="0" dirty="0" smtClean="0"/>
+              <a:t>Try to show anyhow a merge conflict (change the current develop, pull, merge), present it</a:t>
+            </a:r>
+          </a:p>
+          <a:p>
+            <a:pPr marL="171450" indent="-171450">
+              <a:buFontTx/>
+              <a:buChar char="-"/>
+            </a:pPr>
+            <a:r>
+              <a:rPr lang="en-ID" baseline="0" dirty="0" smtClean="0"/>
+              <a:t>Don’t exercise merge conflicts with all attendees </a:t>
+            </a:r>
+            <a:r>
+              <a:rPr lang="en-ID" baseline="0" dirty="0" smtClean="0">
+                <a:sym typeface="Wingdings" panose="05000000000000000000" pitchFamily="2" charset="2"/>
+              </a:rPr>
+              <a:t> just show them maybe 1-2 times</a:t>
+            </a:r>
+            <a:endParaRPr lang="en-ID" baseline="0" dirty="0" smtClean="0"/>
+          </a:p>
+        </p:txBody>
+      </p:sp>
+      <p:sp>
+        <p:nvSpPr>
+          <p:cNvPr id="4" name="Slide Number Placeholder 3"/>
+          <p:cNvSpPr>
+            <a:spLocks noGrp="1"/>
+          </p:cNvSpPr>
+          <p:nvPr>
+            <p:ph type="sldNum" sz="quarter" idx="10"/>
+          </p:nvPr>
+        </p:nvSpPr>
+        <p:spPr/>
+        <p:txBody>
+          <a:bodyPr/>
+          <a:lstStyle/>
+          <a:p>
+            <a:fld id="{7959948B-77FA-4B75-B65F-C5051F11C89F}" type="slidenum">
+              <a:rPr lang="en-US" smtClean="0"/>
+              <a:t>11</a:t>
+            </a:fld>
+            <a:endParaRPr lang="en-US"/>
+          </a:p>
+        </p:txBody>
+      </p:sp>
+    </p:spTree>
+    <p:extLst>
+      <p:ext uri="{BB962C8B-B14F-4D97-AF65-F5344CB8AC3E}">
+        <p14:creationId xmlns:p14="http://schemas.microsoft.com/office/powerpoint/2010/main" val="3987339871"/>
+      </p:ext>
+    </p:extLst>
+  </p:cSld>
+  <p:clrMapOvr>
+    <a:masterClrMapping/>
+  </p:clrMapOvr>
+</p:notes>
+</file>
+
+<file path=ppt/notesSlides/notesSlide11.xml><?xml version="1.0" encoding="utf-8"?>
+<p:notes xmlns:a="http://schemas.openxmlformats.org/drawingml/2006/main" xmlns:r="http://schemas.openxmlformats.org/officeDocument/2006/relationships" xmlns:p="http://schemas.openxmlformats.org/presentationml/2006/main">
+  <p:cSld>
+    <p:spTree>
+      <p:nvGrpSpPr>
+        <p:cNvPr id="1" name=""/>
+        <p:cNvGrpSpPr/>
+        <p:nvPr/>
+      </p:nvGrpSpPr>
+      <p:grpSpPr>
+        <a:xfrm>
+          <a:off x="0" y="0"/>
+          <a:ext cx="0" cy="0"/>
+          <a:chOff x="0" y="0"/>
+          <a:chExt cx="0" cy="0"/>
+        </a:xfrm>
+      </p:grpSpPr>
+      <p:sp>
+        <p:nvSpPr>
+          <p:cNvPr id="2" name="Slide Image Placeholder 1"/>
+          <p:cNvSpPr>
+            <a:spLocks noGrp="1" noRot="1" noChangeAspect="1"/>
+          </p:cNvSpPr>
+          <p:nvPr>
+            <p:ph type="sldImg"/>
+          </p:nvPr>
+        </p:nvSpPr>
+        <p:spPr/>
+      </p:sp>
+      <p:sp>
+        <p:nvSpPr>
+          <p:cNvPr id="3" name="Notes Placeholder 2"/>
+          <p:cNvSpPr>
+            <a:spLocks noGrp="1"/>
+          </p:cNvSpPr>
+          <p:nvPr>
+            <p:ph type="body" idx="1"/>
+          </p:nvPr>
+        </p:nvSpPr>
+        <p:spPr/>
+        <p:txBody>
+          <a:bodyPr/>
+          <a:lstStyle/>
+          <a:p>
+            <a:endParaRPr lang="en-US" dirty="0"/>
+          </a:p>
+        </p:txBody>
+      </p:sp>
+      <p:sp>
+        <p:nvSpPr>
+          <p:cNvPr id="4" name="Slide Number Placeholder 3"/>
+          <p:cNvSpPr>
+            <a:spLocks noGrp="1"/>
+          </p:cNvSpPr>
+          <p:nvPr>
+            <p:ph type="sldNum" sz="quarter" idx="10"/>
+          </p:nvPr>
+        </p:nvSpPr>
+        <p:spPr/>
+        <p:txBody>
+          <a:bodyPr/>
+          <a:lstStyle/>
+          <a:p>
+            <a:fld id="{7959948B-77FA-4B75-B65F-C5051F11C89F}" type="slidenum">
+              <a:rPr lang="en-US" smtClean="0"/>
+              <a:t>12</a:t>
+            </a:fld>
+            <a:endParaRPr lang="en-US"/>
+          </a:p>
+        </p:txBody>
+      </p:sp>
+    </p:spTree>
+    <p:extLst>
+      <p:ext uri="{BB962C8B-B14F-4D97-AF65-F5344CB8AC3E}">
+        <p14:creationId xmlns:p14="http://schemas.microsoft.com/office/powerpoint/2010/main" val="3631971732"/>
+      </p:ext>
+    </p:extLst>
+  </p:cSld>
+  <p:clrMapOvr>
+    <a:masterClrMapping/>
+  </p:clrMapOvr>
+</p:notes>
+</file>
+
+<file path=ppt/notesSlides/notesSlide12.xml><?xml version="1.0" encoding="utf-8"?>
+<p:notes xmlns:a="http://schemas.openxmlformats.org/drawingml/2006/main" xmlns:r="http://schemas.openxmlformats.org/officeDocument/2006/relationships" xmlns:p="http://schemas.openxmlformats.org/presentationml/2006/main">
+  <p:cSld>
+    <p:spTree>
+      <p:nvGrpSpPr>
+        <p:cNvPr id="1" name=""/>
+        <p:cNvGrpSpPr/>
+        <p:nvPr/>
+      </p:nvGrpSpPr>
+      <p:grpSpPr>
+        <a:xfrm>
+          <a:off x="0" y="0"/>
+          <a:ext cx="0" cy="0"/>
+          <a:chOff x="0" y="0"/>
+          <a:chExt cx="0" cy="0"/>
+        </a:xfrm>
+      </p:grpSpPr>
+      <p:sp>
+        <p:nvSpPr>
+          <p:cNvPr id="2" name="Slide Image Placeholder 1"/>
+          <p:cNvSpPr>
+            <a:spLocks noGrp="1" noRot="1" noChangeAspect="1"/>
+          </p:cNvSpPr>
+          <p:nvPr>
+            <p:ph type="sldImg"/>
+          </p:nvPr>
+        </p:nvSpPr>
+        <p:spPr/>
+      </p:sp>
+      <p:sp>
+        <p:nvSpPr>
+          <p:cNvPr id="3" name="Notes Placeholder 2"/>
+          <p:cNvSpPr>
+            <a:spLocks noGrp="1"/>
+          </p:cNvSpPr>
+          <p:nvPr>
+            <p:ph type="body" idx="1"/>
+          </p:nvPr>
+        </p:nvSpPr>
+        <p:spPr/>
+        <p:txBody>
+          <a:bodyPr/>
+          <a:lstStyle/>
+          <a:p>
+            <a:pPr marL="171450" indent="-171450">
+              <a:buFont typeface="Arial" panose="020B0604020202020204" pitchFamily="34" charset="0"/>
+              <a:buChar char="•"/>
+            </a:pPr>
+            <a:r>
+              <a:rPr lang="en-ID" dirty="0" smtClean="0"/>
+              <a:t>Explain recursive merge and merge commit</a:t>
+            </a:r>
+            <a:endParaRPr lang="en-US" dirty="0"/>
+          </a:p>
+        </p:txBody>
+      </p:sp>
+      <p:sp>
+        <p:nvSpPr>
+          <p:cNvPr id="4" name="Slide Number Placeholder 3"/>
+          <p:cNvSpPr>
+            <a:spLocks noGrp="1"/>
+          </p:cNvSpPr>
+          <p:nvPr>
+            <p:ph type="sldNum" sz="quarter" idx="10"/>
+          </p:nvPr>
+        </p:nvSpPr>
+        <p:spPr/>
+        <p:txBody>
+          <a:bodyPr/>
+          <a:lstStyle/>
+          <a:p>
+            <a:fld id="{7959948B-77FA-4B75-B65F-C5051F11C89F}" type="slidenum">
+              <a:rPr lang="en-US" smtClean="0"/>
+              <a:t>13</a:t>
+            </a:fld>
+            <a:endParaRPr lang="en-US"/>
+          </a:p>
+        </p:txBody>
+      </p:sp>
+    </p:spTree>
+    <p:extLst>
+      <p:ext uri="{BB962C8B-B14F-4D97-AF65-F5344CB8AC3E}">
+        <p14:creationId xmlns:p14="http://schemas.microsoft.com/office/powerpoint/2010/main" val="613651284"/>
+      </p:ext>
+    </p:extLst>
+  </p:cSld>
+  <p:clrMapOvr>
+    <a:masterClrMapping/>
+  </p:clrMapOvr>
+</p:notes>
+</file>
+
+<file path=ppt/notesSlides/notesSlide13.xml><?xml version="1.0" encoding="utf-8"?>
+<p:notes xmlns:a="http://schemas.openxmlformats.org/drawingml/2006/main" xmlns:r="http://schemas.openxmlformats.org/officeDocument/2006/relationships" xmlns:p="http://schemas.openxmlformats.org/presentationml/2006/main">
+  <p:cSld>
+    <p:spTree>
+      <p:nvGrpSpPr>
+        <p:cNvPr id="1" name=""/>
+        <p:cNvGrpSpPr/>
+        <p:nvPr/>
+      </p:nvGrpSpPr>
+      <p:grpSpPr>
+        <a:xfrm>
+          <a:off x="0" y="0"/>
+          <a:ext cx="0" cy="0"/>
+          <a:chOff x="0" y="0"/>
+          <a:chExt cx="0" cy="0"/>
+        </a:xfrm>
+      </p:grpSpPr>
+      <p:sp>
+        <p:nvSpPr>
+          <p:cNvPr id="2" name="Slide Image Placeholder 1"/>
+          <p:cNvSpPr>
+            <a:spLocks noGrp="1" noRot="1" noChangeAspect="1"/>
+          </p:cNvSpPr>
+          <p:nvPr>
+            <p:ph type="sldImg"/>
+          </p:nvPr>
+        </p:nvSpPr>
+        <p:spPr/>
+      </p:sp>
+      <p:sp>
+        <p:nvSpPr>
+          <p:cNvPr id="3" name="Notes Placeholder 2"/>
+          <p:cNvSpPr>
+            <a:spLocks noGrp="1"/>
+          </p:cNvSpPr>
+          <p:nvPr>
+            <p:ph type="body" idx="1"/>
+          </p:nvPr>
+        </p:nvSpPr>
+        <p:spPr/>
+        <p:txBody>
+          <a:bodyPr/>
+          <a:lstStyle/>
+          <a:p>
+            <a:pPr marL="171450" indent="-171450">
+              <a:buFont typeface="Arial" panose="020B0604020202020204" pitchFamily="34" charset="0"/>
+              <a:buChar char="•"/>
+            </a:pPr>
+            <a:r>
+              <a:rPr lang="en-ID" b="0" dirty="0" smtClean="0"/>
+              <a:t>Explain the differences between merging and rebasing, don’t jump to deep!</a:t>
+            </a:r>
+          </a:p>
+          <a:p>
+            <a:pPr marL="171450" indent="-171450">
+              <a:buFont typeface="Arial" panose="020B0604020202020204" pitchFamily="34" charset="0"/>
+              <a:buChar char="•"/>
+            </a:pPr>
+            <a:endParaRPr lang="en-ID" b="0" dirty="0" smtClean="0"/>
+          </a:p>
+          <a:p>
+            <a:pPr marL="171450" indent="-171450">
+              <a:buFont typeface="Arial" panose="020B0604020202020204" pitchFamily="34" charset="0"/>
+              <a:buChar char="•"/>
+            </a:pPr>
+            <a:endParaRPr lang="en-US" b="0" dirty="0" smtClean="0"/>
+          </a:p>
+          <a:p>
+            <a:pPr marL="171450" indent="-171450">
+              <a:buFont typeface="Arial" panose="020B0604020202020204" pitchFamily="34" charset="0"/>
+              <a:buChar char="•"/>
+            </a:pPr>
+            <a:r>
+              <a:rPr lang="en-US" b="0" dirty="0" smtClean="0"/>
+              <a:t>Rebasing </a:t>
+            </a:r>
+            <a:r>
+              <a:rPr lang="en-US" b="0" dirty="0" smtClean="0"/>
+              <a:t>Deletes Merge Commits!</a:t>
+            </a:r>
+          </a:p>
+          <a:p>
+            <a:pPr marL="171450" indent="-171450">
+              <a:buFont typeface="Arial" panose="020B0604020202020204" pitchFamily="34" charset="0"/>
+              <a:buChar char="•"/>
+            </a:pPr>
+            <a:r>
+              <a:rPr lang="en-ID" dirty="0" smtClean="0"/>
+              <a:t>Golden Rule:</a:t>
+            </a:r>
+            <a:r>
+              <a:rPr lang="en-ID" baseline="0" dirty="0" smtClean="0"/>
+              <a:t> </a:t>
+            </a:r>
+            <a:r>
+              <a:rPr lang="en-ID" dirty="0" smtClean="0"/>
+              <a:t>Rebase only for local branches or single developer remote branches, never rebase published branches which others use (because commit IDs will change with their related source code)</a:t>
+            </a:r>
+          </a:p>
+          <a:p>
+            <a:pPr marL="171450" indent="-171450">
+              <a:buFont typeface="Arial" panose="020B0604020202020204" pitchFamily="34" charset="0"/>
+              <a:buChar char="•"/>
+            </a:pPr>
+            <a:r>
+              <a:rPr lang="en-ID" dirty="0" smtClean="0"/>
+              <a:t>Rebasing is like masturbation - it is better if you do it in private - if you do it n public, you will be scorned.</a:t>
+            </a:r>
+            <a:endParaRPr lang="en-US" dirty="0"/>
+          </a:p>
+        </p:txBody>
+      </p:sp>
+      <p:sp>
+        <p:nvSpPr>
+          <p:cNvPr id="4" name="Slide Number Placeholder 3"/>
+          <p:cNvSpPr>
+            <a:spLocks noGrp="1"/>
+          </p:cNvSpPr>
+          <p:nvPr>
+            <p:ph type="sldNum" sz="quarter" idx="10"/>
+          </p:nvPr>
+        </p:nvSpPr>
+        <p:spPr/>
+        <p:txBody>
+          <a:bodyPr/>
+          <a:lstStyle/>
+          <a:p>
+            <a:fld id="{7959948B-77FA-4B75-B65F-C5051F11C89F}" type="slidenum">
+              <a:rPr lang="en-US" smtClean="0"/>
+              <a:t>14</a:t>
+            </a:fld>
+            <a:endParaRPr lang="en-US"/>
+          </a:p>
+        </p:txBody>
+      </p:sp>
+    </p:spTree>
+    <p:extLst>
+      <p:ext uri="{BB962C8B-B14F-4D97-AF65-F5344CB8AC3E}">
+        <p14:creationId xmlns:p14="http://schemas.microsoft.com/office/powerpoint/2010/main" val="2801166786"/>
+      </p:ext>
+    </p:extLst>
+  </p:cSld>
+  <p:clrMapOvr>
+    <a:masterClrMapping/>
+  </p:clrMapOvr>
+</p:notes>
+</file>
+
+<file path=ppt/notesSlides/notesSlide14.xml><?xml version="1.0" encoding="utf-8"?>
+<p:notes xmlns:a="http://schemas.openxmlformats.org/drawingml/2006/main" xmlns:r="http://schemas.openxmlformats.org/officeDocument/2006/relationships" xmlns:p="http://schemas.openxmlformats.org/presentationml/2006/main">
+  <p:cSld>
+    <p:spTree>
+      <p:nvGrpSpPr>
+        <p:cNvPr id="1" name=""/>
+        <p:cNvGrpSpPr/>
+        <p:nvPr/>
+      </p:nvGrpSpPr>
+      <p:grpSpPr>
+        <a:xfrm>
+          <a:off x="0" y="0"/>
+          <a:ext cx="0" cy="0"/>
+          <a:chOff x="0" y="0"/>
+          <a:chExt cx="0" cy="0"/>
+        </a:xfrm>
+      </p:grpSpPr>
+      <p:sp>
+        <p:nvSpPr>
+          <p:cNvPr id="2" name="Slide Image Placeholder 1"/>
+          <p:cNvSpPr>
+            <a:spLocks noGrp="1" noRot="1" noChangeAspect="1"/>
+          </p:cNvSpPr>
+          <p:nvPr>
+            <p:ph type="sldImg"/>
+          </p:nvPr>
+        </p:nvSpPr>
+        <p:spPr/>
+      </p:sp>
+      <p:sp>
+        <p:nvSpPr>
+          <p:cNvPr id="3" name="Notes Placeholder 2"/>
+          <p:cNvSpPr>
+            <a:spLocks noGrp="1"/>
+          </p:cNvSpPr>
+          <p:nvPr>
+            <p:ph type="body" idx="1"/>
+          </p:nvPr>
+        </p:nvSpPr>
+        <p:spPr/>
+        <p:txBody>
+          <a:bodyPr/>
+          <a:lstStyle/>
+          <a:p>
+            <a:r>
+              <a:rPr lang="en-ID" dirty="0" smtClean="0"/>
+              <a:t>- If time is short, skip E2</a:t>
+            </a:r>
+            <a:endParaRPr lang="en-US" dirty="0"/>
+          </a:p>
+        </p:txBody>
+      </p:sp>
+      <p:sp>
+        <p:nvSpPr>
+          <p:cNvPr id="4" name="Slide Number Placeholder 3"/>
+          <p:cNvSpPr>
+            <a:spLocks noGrp="1"/>
+          </p:cNvSpPr>
+          <p:nvPr>
+            <p:ph type="sldNum" sz="quarter" idx="10"/>
+          </p:nvPr>
+        </p:nvSpPr>
+        <p:spPr/>
+        <p:txBody>
+          <a:bodyPr/>
+          <a:lstStyle/>
+          <a:p>
+            <a:fld id="{7959948B-77FA-4B75-B65F-C5051F11C89F}" type="slidenum">
+              <a:rPr lang="en-US" smtClean="0"/>
+              <a:t>15</a:t>
+            </a:fld>
+            <a:endParaRPr lang="en-US"/>
+          </a:p>
+        </p:txBody>
+      </p:sp>
+    </p:spTree>
+    <p:extLst>
+      <p:ext uri="{BB962C8B-B14F-4D97-AF65-F5344CB8AC3E}">
+        <p14:creationId xmlns:p14="http://schemas.microsoft.com/office/powerpoint/2010/main" val="647520961"/>
+      </p:ext>
+    </p:extLst>
+  </p:cSld>
+  <p:clrMapOvr>
+    <a:masterClrMapping/>
+  </p:clrMapOvr>
+</p:notes>
+</file>
+
+<file path=ppt/notesSlides/notesSlide15.xml><?xml version="1.0" encoding="utf-8"?>
+<p:notes xmlns:a="http://schemas.openxmlformats.org/drawingml/2006/main" xmlns:r="http://schemas.openxmlformats.org/officeDocument/2006/relationships" xmlns:p="http://schemas.openxmlformats.org/presentationml/2006/main">
+  <p:cSld>
+    <p:spTree>
+      <p:nvGrpSpPr>
+        <p:cNvPr id="1" name=""/>
+        <p:cNvGrpSpPr/>
+        <p:nvPr/>
+      </p:nvGrpSpPr>
+      <p:grpSpPr>
+        <a:xfrm>
+          <a:off x="0" y="0"/>
+          <a:ext cx="0" cy="0"/>
+          <a:chOff x="0" y="0"/>
+          <a:chExt cx="0" cy="0"/>
+        </a:xfrm>
+      </p:grpSpPr>
+      <p:sp>
+        <p:nvSpPr>
+          <p:cNvPr id="2" name="Slide Image Placeholder 1"/>
+          <p:cNvSpPr>
+            <a:spLocks noGrp="1" noRot="1" noChangeAspect="1"/>
+          </p:cNvSpPr>
+          <p:nvPr>
+            <p:ph type="sldImg"/>
+          </p:nvPr>
+        </p:nvSpPr>
+        <p:spPr/>
+      </p:sp>
+      <p:sp>
+        <p:nvSpPr>
+          <p:cNvPr id="3" name="Notes Placeholder 2"/>
+          <p:cNvSpPr>
+            <a:spLocks noGrp="1"/>
+          </p:cNvSpPr>
+          <p:nvPr>
+            <p:ph type="body" idx="1"/>
+          </p:nvPr>
+        </p:nvSpPr>
+        <p:spPr/>
+        <p:txBody>
+          <a:bodyPr/>
+          <a:lstStyle/>
+          <a:p>
+            <a:r>
+              <a:rPr lang="en-ID" dirty="0" smtClean="0"/>
+              <a:t>$git push -u origin feature-branch</a:t>
+            </a:r>
+          </a:p>
+          <a:p>
+            <a:r>
+              <a:rPr lang="en-US" dirty="0" smtClean="0"/>
+              <a:t>$git push origin feature-branch</a:t>
+            </a:r>
+          </a:p>
+          <a:p>
+            <a:endParaRPr lang="en-ID" dirty="0" smtClean="0"/>
+          </a:p>
+          <a:p>
+            <a:r>
+              <a:rPr lang="en-ID" dirty="0" smtClean="0"/>
+              <a:t>To check if branch is deleted on</a:t>
+            </a:r>
+            <a:r>
+              <a:rPr lang="en-ID" baseline="0" dirty="0" smtClean="0"/>
+              <a:t> remote and sync on local:</a:t>
+            </a:r>
+          </a:p>
+          <a:p>
+            <a:r>
+              <a:rPr lang="en-ID" baseline="0" dirty="0" smtClean="0"/>
+              <a:t>$git fetch –f</a:t>
+            </a:r>
+          </a:p>
+          <a:p>
+            <a:r>
+              <a:rPr lang="en-ID" baseline="0" dirty="0" smtClean="0"/>
+              <a:t>$git branch –a/-r</a:t>
+            </a:r>
+            <a:endParaRPr lang="en-US" dirty="0"/>
+          </a:p>
+        </p:txBody>
+      </p:sp>
+      <p:sp>
+        <p:nvSpPr>
+          <p:cNvPr id="4" name="Slide Number Placeholder 3"/>
+          <p:cNvSpPr>
+            <a:spLocks noGrp="1"/>
+          </p:cNvSpPr>
+          <p:nvPr>
+            <p:ph type="sldNum" sz="quarter" idx="10"/>
+          </p:nvPr>
+        </p:nvSpPr>
+        <p:spPr/>
+        <p:txBody>
+          <a:bodyPr/>
+          <a:lstStyle/>
+          <a:p>
+            <a:fld id="{7959948B-77FA-4B75-B65F-C5051F11C89F}" type="slidenum">
+              <a:rPr lang="en-US" smtClean="0"/>
+              <a:t>16</a:t>
+            </a:fld>
+            <a:endParaRPr lang="en-US"/>
+          </a:p>
+        </p:txBody>
+      </p:sp>
+    </p:spTree>
+    <p:extLst>
+      <p:ext uri="{BB962C8B-B14F-4D97-AF65-F5344CB8AC3E}">
+        <p14:creationId xmlns:p14="http://schemas.microsoft.com/office/powerpoint/2010/main" val="1837064347"/>
       </p:ext>
     </p:extLst>
   </p:cSld>
@@ -652,21 +1343,42 @@
           <a:bodyPr/>
           <a:lstStyle/>
           <a:p>
+            <a:pPr marL="171450" indent="-171450">
+              <a:buFont typeface="Arial" panose="020B0604020202020204" pitchFamily="34" charset="0"/>
+              <a:buChar char="•"/>
+            </a:pPr>
             <a:r>
               <a:rPr lang="en-ID" dirty="0" smtClean="0"/>
-              <a:t>We will cover development</a:t>
+              <a:t>Explain</a:t>
             </a:r>
             <a:r>
               <a:rPr lang="en-ID" baseline="0" dirty="0" smtClean="0"/>
-              <a:t> for now</a:t>
-            </a:r>
-          </a:p>
-          <a:p>
+              <a:t> briefly gitflow workflow</a:t>
+            </a:r>
+          </a:p>
+          <a:p>
+            <a:pPr marL="171450" indent="-171450">
+              <a:buFont typeface="Arial" panose="020B0604020202020204" pitchFamily="34" charset="0"/>
+              <a:buChar char="•"/>
+            </a:pPr>
+            <a:r>
+              <a:rPr lang="en-ID" dirty="0" smtClean="0"/>
+              <a:t>Concentrate</a:t>
+            </a:r>
             <a:r>
               <a:rPr lang="en-ID" baseline="0" dirty="0" smtClean="0"/>
-              <a:t>Pull request comes later </a:t>
-            </a:r>
-            <a:endParaRPr lang="en-US" dirty="0"/>
+              <a:t> on deployment branches</a:t>
+            </a:r>
+          </a:p>
+          <a:p>
+            <a:pPr marL="171450" indent="-171450">
+              <a:buFont typeface="Arial" panose="020B0604020202020204" pitchFamily="34" charset="0"/>
+              <a:buChar char="•"/>
+            </a:pPr>
+            <a:r>
+              <a:rPr lang="en-ID" baseline="0" dirty="0" smtClean="0"/>
+              <a:t>Release branches with pull requests come later</a:t>
+            </a:r>
           </a:p>
         </p:txBody>
       </p:sp>
@@ -687,7 +1399,7 @@
           <a:p>
             <a:fld id="{7959948B-77FA-4B75-B65F-C5051F11C89F}" type="slidenum">
               <a:rPr lang="en-US" smtClean="0"/>
-              <a:t>3</a:t>
+              <a:t>2</a:t>
             </a:fld>
             <a:endParaRPr lang="en-US"/>
           </a:p>
@@ -696,7 +1408,7 @@
     </p:spTree>
     <p:extLst>
       <p:ext uri="{BB962C8B-B14F-4D97-AF65-F5344CB8AC3E}">
-        <p14:creationId xmlns:p14="http://schemas.microsoft.com/office/powerpoint/2010/main" val="3385480470"/>
+        <p14:creationId xmlns:p14="http://schemas.microsoft.com/office/powerpoint/2010/main" val="1323297392"/>
       </p:ext>
     </p:extLst>
   </p:cSld>
@@ -750,6 +1462,18 @@
           <a:bodyPr/>
           <a:lstStyle/>
           <a:p>
+            <a:pPr marL="171450" indent="-171450">
+              <a:buFont typeface="Arial" panose="020B0604020202020204" pitchFamily="34" charset="0"/>
+              <a:buChar char="•"/>
+            </a:pPr>
+            <a:r>
+              <a:rPr lang="en-ID" dirty="0" smtClean="0"/>
+              <a:t>That</a:t>
+            </a:r>
+            <a:r>
+              <a:rPr lang="en-ID" baseline="0" dirty="0" smtClean="0"/>
+              <a:t> will be todays situation, we branch at time x from develop, create features branches</a:t>
+            </a:r>
             <a:endParaRPr lang="en-US" dirty="0"/>
           </a:p>
         </p:txBody>
@@ -771,7 +1495,7 @@
           <a:p>
             <a:fld id="{7959948B-77FA-4B75-B65F-C5051F11C89F}" type="slidenum">
               <a:rPr lang="en-US" smtClean="0"/>
-              <a:t>8</a:t>
+              <a:t>3</a:t>
             </a:fld>
             <a:endParaRPr lang="en-US"/>
           </a:p>
@@ -780,7 +1504,7 @@
     </p:spTree>
     <p:extLst>
       <p:ext uri="{BB962C8B-B14F-4D97-AF65-F5344CB8AC3E}">
-        <p14:creationId xmlns:p14="http://schemas.microsoft.com/office/powerpoint/2010/main" val="1234506666"/>
+        <p14:creationId xmlns:p14="http://schemas.microsoft.com/office/powerpoint/2010/main" val="3385480470"/>
       </p:ext>
     </p:extLst>
   </p:cSld>
@@ -834,46 +1558,17 @@
           <a:bodyPr/>
           <a:lstStyle/>
           <a:p>
+            <a:pPr marL="171450" indent="-171450">
+              <a:buFont typeface="Arial" panose="020B0604020202020204" pitchFamily="34" charset="0"/>
+              <a:buChar char="•"/>
+            </a:pPr>
             <a:r>
               <a:rPr lang="en-ID" dirty="0" smtClean="0"/>
-              <a:t>Feature</a:t>
+              <a:t>Related</a:t>
             </a:r>
             <a:r>
               <a:rPr lang="en-ID" baseline="0" dirty="0" smtClean="0"/>
-              <a:t> branch is local!</a:t>
-            </a:r>
-            <a:endParaRPr lang="en-ID" dirty="0" smtClean="0"/>
-          </a:p>
-          <a:p>
-            <a:pPr marL="171450" indent="-171450">
-              <a:buFontTx/>
-              <a:buChar char="-"/>
-            </a:pPr>
-            <a:r>
-              <a:rPr lang="en-ID" dirty="0" smtClean="0"/>
-              <a:t>Focus on –no-</a:t>
-            </a:r>
-            <a:r>
-              <a:rPr lang="en-ID" dirty="0" err="1" smtClean="0"/>
-              <a:t>ff</a:t>
-            </a:r>
-            <a:r>
-              <a:rPr lang="en-ID" dirty="0" smtClean="0"/>
-              <a:t> </a:t>
-            </a:r>
-          </a:p>
-          <a:p>
-            <a:pPr marL="171450" indent="-171450">
-              <a:buFontTx/>
-              <a:buChar char="-"/>
-            </a:pPr>
-            <a:r>
-              <a:rPr lang="en-ID" dirty="0" smtClean="0"/>
-              <a:t>Don’t</a:t>
-            </a:r>
-            <a:r>
-              <a:rPr lang="en-ID" baseline="0" dirty="0" smtClean="0"/>
-              <a:t> forget to push back … </a:t>
+              <a:t> to gitflow workflow, explain common branch and merge conventions </a:t>
             </a:r>
             <a:endParaRPr lang="en-US" dirty="0"/>
           </a:p>
@@ -896,7 +1591,7 @@
           <a:p>
             <a:fld id="{7959948B-77FA-4B75-B65F-C5051F11C89F}" type="slidenum">
               <a:rPr lang="en-US" smtClean="0"/>
-              <a:t>9</a:t>
+              <a:t>4</a:t>
             </a:fld>
             <a:endParaRPr lang="en-US"/>
           </a:p>
@@ -905,7 +1600,7 @@
     </p:spTree>
     <p:extLst>
       <p:ext uri="{BB962C8B-B14F-4D97-AF65-F5344CB8AC3E}">
-        <p14:creationId xmlns:p14="http://schemas.microsoft.com/office/powerpoint/2010/main" val="2087103439"/>
+        <p14:creationId xmlns:p14="http://schemas.microsoft.com/office/powerpoint/2010/main" val="3337389282"/>
       </p:ext>
     </p:extLst>
   </p:cSld>
@@ -959,7 +1654,18 @@
           <a:bodyPr/>
           <a:lstStyle/>
           <a:p>
-            <a:endParaRPr lang="en-US" dirty="0"/>
+            <a:pPr marL="171450" indent="-171450">
+              <a:buFont typeface="Arial" panose="020B0604020202020204" pitchFamily="34" charset="0"/>
+              <a:buChar char="•"/>
+            </a:pPr>
+            <a:r>
+              <a:rPr lang="en-ID" dirty="0" smtClean="0"/>
+              <a:t>A normal situation</a:t>
+            </a:r>
+            <a:r>
+              <a:rPr lang="en-ID" baseline="0" dirty="0" smtClean="0"/>
+              <a:t> a SE have to face</a:t>
+            </a:r>
           </a:p>
         </p:txBody>
       </p:sp>
@@ -980,7 +1686,7 @@
           <a:p>
             <a:fld id="{7959948B-77FA-4B75-B65F-C5051F11C89F}" type="slidenum">
               <a:rPr lang="en-US" smtClean="0"/>
-              <a:t>13</a:t>
+              <a:t>5</a:t>
             </a:fld>
             <a:endParaRPr lang="en-US"/>
           </a:p>
@@ -989,7 +1695,7 @@
     </p:spTree>
     <p:extLst>
       <p:ext uri="{BB962C8B-B14F-4D97-AF65-F5344CB8AC3E}">
-        <p14:creationId xmlns:p14="http://schemas.microsoft.com/office/powerpoint/2010/main" val="613651284"/>
+        <p14:creationId xmlns:p14="http://schemas.microsoft.com/office/powerpoint/2010/main" val="2562273612"/>
       </p:ext>
     </p:extLst>
   </p:cSld>
@@ -1048,36 +1754,16 @@
               <a:buChar char="•"/>
             </a:pPr>
             <a:r>
-              <a:rPr lang="en-US" b="0" dirty="0" smtClean="0"/>
-              <a:t>Rebasing Deletes Merge Commits!</a:t>
-            </a:r>
-          </a:p>
-          <a:p>
-            <a:pPr marL="171450" indent="-171450">
-              <a:buFont typeface="Arial" panose="020B0604020202020204" pitchFamily="34" charset="0"/>
-              <a:buChar char="•"/>
-            </a:pPr>
-            <a:r>
               <a:rPr lang="en-ID" dirty="0" smtClean="0"/>
-              <a:t>Golden Rule:</a:t>
+              <a:t>Base</a:t>
             </a:r>
             <a:r>
               <a:rPr lang="en-ID" baseline="0" dirty="0" smtClean="0"/>
-              <a:t> </a:t>
-            </a:r>
-            <a:r>
-              <a:rPr lang="en-ID" dirty="0" smtClean="0"/>
-              <a:t>Rebase only for local branches or single developer remote branches, never rebase published branches which others use (because commit IDs will change with their related source code)</a:t>
-            </a:r>
-          </a:p>
-          <a:p>
-            <a:pPr marL="171450" indent="-171450">
-              <a:buFont typeface="Arial" panose="020B0604020202020204" pitchFamily="34" charset="0"/>
-              <a:buChar char="•"/>
-            </a:pPr>
-            <a:r>
-              <a:rPr lang="en-ID" dirty="0" smtClean="0"/>
-              <a:t>Rebasing is like masturbation - it is better if you do it in private - if you do it n public, you will be scorned.</a:t>
+              <a:t> config parts, focus on name, email… mention about </a:t>
+            </a:r>
+            <a:r>
+              <a:rPr lang="en-ID" baseline="0" dirty="0" err="1" smtClean="0"/>
+              <a:t>aliase</a:t>
             </a:r>
             <a:endParaRPr lang="en-US" dirty="0"/>
           </a:p>
@@ -1100,7 +1786,7 @@
           <a:p>
             <a:fld id="{7959948B-77FA-4B75-B65F-C5051F11C89F}" type="slidenum">
               <a:rPr lang="en-US" smtClean="0"/>
-              <a:t>14</a:t>
+              <a:t>7</a:t>
             </a:fld>
             <a:endParaRPr lang="en-US"/>
           </a:p>
@@ -1109,7 +1795,7 @@
     </p:spTree>
     <p:extLst>
       <p:ext uri="{BB962C8B-B14F-4D97-AF65-F5344CB8AC3E}">
-        <p14:creationId xmlns:p14="http://schemas.microsoft.com/office/powerpoint/2010/main" val="2801166786"/>
+        <p14:creationId xmlns:p14="http://schemas.microsoft.com/office/powerpoint/2010/main" val="2131070176"/>
       </p:ext>
     </p:extLst>
   </p:cSld>
@@ -1184,7 +1870,7 @@
           <a:p>
             <a:fld id="{7959948B-77FA-4B75-B65F-C5051F11C89F}" type="slidenum">
               <a:rPr lang="en-US" smtClean="0"/>
-              <a:t>15</a:t>
+              <a:t>8</a:t>
             </a:fld>
             <a:endParaRPr lang="en-US"/>
           </a:p>
@@ -1193,7 +1879,7 @@
     </p:spTree>
     <p:extLst>
       <p:ext uri="{BB962C8B-B14F-4D97-AF65-F5344CB8AC3E}">
-        <p14:creationId xmlns:p14="http://schemas.microsoft.com/office/powerpoint/2010/main" val="647520961"/>
+        <p14:creationId xmlns:p14="http://schemas.microsoft.com/office/powerpoint/2010/main" val="1234506666"/>
       </p:ext>
     </p:extLst>
   </p:cSld>
@@ -1249,38 +1935,78 @@
           <a:p>
             <a:r>
               <a:rPr lang="en-ID" dirty="0" smtClean="0"/>
-              <a:t>$git push -u origin feature-branch</a:t>
-            </a:r>
-          </a:p>
-          <a:p>
-            <a:r>
-              <a:rPr lang="en-US" dirty="0" smtClean="0"/>
-              <a:t>$git push origin feature-branch</a:t>
-            </a:r>
-          </a:p>
-          <a:p>
+              <a:t>Feature</a:t>
+            </a:r>
+            <a:r>
+              <a:rPr lang="en-ID" baseline="0" dirty="0" smtClean="0"/>
+              <a:t> branch is local!</a:t>
+            </a:r>
             <a:endParaRPr lang="en-ID" dirty="0" smtClean="0"/>
           </a:p>
           <a:p>
+            <a:pPr marL="171450" indent="-171450">
+              <a:buFontTx/>
+              <a:buChar char="-"/>
+            </a:pPr>
             <a:r>
               <a:rPr lang="en-ID" dirty="0" smtClean="0"/>
-              <a:t>To check if branch is deleted on</a:t>
+              <a:t>Focus on –no-</a:t>
+            </a:r>
+            <a:r>
+              <a:rPr lang="en-ID" dirty="0" err="1" smtClean="0"/>
+              <a:t>ff</a:t>
+            </a:r>
+            <a:r>
+              <a:rPr lang="en-ID" dirty="0" smtClean="0"/>
+              <a:t> </a:t>
+            </a:r>
+          </a:p>
+          <a:p>
+            <a:pPr marL="171450" indent="-171450">
+              <a:buFontTx/>
+              <a:buChar char="-"/>
+            </a:pPr>
+            <a:r>
+              <a:rPr lang="en-ID" dirty="0" smtClean="0"/>
+              <a:t>Don’t</a:t>
             </a:r>
             <a:r>
               <a:rPr lang="en-ID" baseline="0" dirty="0" smtClean="0"/>
-              <a:t> remote and sync on local:</a:t>
-            </a:r>
-          </a:p>
-          <a:p>
+              <a:t> forget to push back </a:t>
+            </a:r>
             <a:r>
               <a:rPr lang="en-ID" baseline="0" dirty="0" smtClean="0"/>
-              <a:t>$git fetch –f</a:t>
-            </a:r>
-          </a:p>
-          <a:p>
+              <a:t>…</a:t>
+            </a:r>
+          </a:p>
+          <a:p>
+            <a:pPr marL="171450" indent="-171450">
+              <a:buFontTx/>
+              <a:buChar char="-"/>
+            </a:pPr>
             <a:r>
               <a:rPr lang="en-ID" baseline="0" dirty="0" smtClean="0"/>
-              <a:t>$git branch –a/-r</a:t>
+              <a:t>Try to produce a merge error</a:t>
+            </a:r>
+          </a:p>
+          <a:p>
+            <a:pPr marL="171450" indent="-171450">
+              <a:buFontTx/>
+              <a:buChar char="-"/>
+            </a:pPr>
+            <a:r>
+              <a:rPr lang="en-ID" baseline="0" dirty="0" smtClean="0"/>
+              <a:t>Explain a commit .. See comment in slide</a:t>
+            </a:r>
+          </a:p>
+          <a:p>
+            <a:pPr marL="171450" indent="-171450">
+              <a:buFontTx/>
+              <a:buChar char="-"/>
+            </a:pPr>
+            <a:r>
+              <a:rPr lang="en-ID" baseline="0" dirty="0" smtClean="0"/>
+              <a:t>If time, explain –D (force deleting branch when not merged back)</a:t>
             </a:r>
             <a:endParaRPr lang="en-US" dirty="0"/>
           </a:p>
@@ -1303,7 +2029,7 @@
           <a:p>
             <a:fld id="{7959948B-77FA-4B75-B65F-C5051F11C89F}" type="slidenum">
               <a:rPr lang="en-US" smtClean="0"/>
-              <a:t>16</a:t>
+              <a:t>9</a:t>
             </a:fld>
             <a:endParaRPr lang="en-US"/>
           </a:p>
@@ -1312,7 +2038,91 @@
     </p:spTree>
     <p:extLst>
       <p:ext uri="{BB962C8B-B14F-4D97-AF65-F5344CB8AC3E}">
-        <p14:creationId xmlns:p14="http://schemas.microsoft.com/office/powerpoint/2010/main" val="1837064347"/>
+        <p14:creationId xmlns:p14="http://schemas.microsoft.com/office/powerpoint/2010/main" val="2087103439"/>
+      </p:ext>
+    </p:extLst>
+  </p:cSld>
+  <p:clrMapOvr>
+    <a:masterClrMapping/>
+  </p:clrMapOvr>
+</p:notes>
+</file>
+
+<file path=ppt/notesSlides/notesSlide9.xml><?xml version="1.0" encoding="utf-8"?>
+<p:notes xmlns:a="http://schemas.openxmlformats.org/drawingml/2006/main" xmlns:r="http://schemas.openxmlformats.org/officeDocument/2006/relationships" xmlns:p="http://schemas.openxmlformats.org/presentationml/2006/main">
+  <p:cSld>
+    <p:spTree>
+      <p:nvGrpSpPr>
+        <p:cNvPr id="1" name=""/>
+        <p:cNvGrpSpPr/>
+        <p:nvPr/>
+      </p:nvGrpSpPr>
+      <p:grpSpPr>
+        <a:xfrm>
+          <a:off x="0" y="0"/>
+          <a:ext cx="0" cy="0"/>
+          <a:chOff x="0" y="0"/>
+          <a:chExt cx="0" cy="0"/>
+        </a:xfrm>
+      </p:grpSpPr>
+      <p:sp>
+        <p:nvSpPr>
+          <p:cNvPr id="2" name="Slide Image Placeholder 1"/>
+          <p:cNvSpPr>
+            <a:spLocks noGrp="1" noRot="1" noChangeAspect="1"/>
+          </p:cNvSpPr>
+          <p:nvPr>
+            <p:ph type="sldImg"/>
+          </p:nvPr>
+        </p:nvSpPr>
+        <p:spPr/>
+      </p:sp>
+      <p:sp>
+        <p:nvSpPr>
+          <p:cNvPr id="3" name="Notes Placeholder 2"/>
+          <p:cNvSpPr>
+            <a:spLocks noGrp="1"/>
+          </p:cNvSpPr>
+          <p:nvPr>
+            <p:ph type="body" idx="1"/>
+          </p:nvPr>
+        </p:nvSpPr>
+        <p:spPr/>
+        <p:txBody>
+          <a:bodyPr/>
+          <a:lstStyle/>
+          <a:p>
+            <a:endParaRPr lang="en-US" dirty="0"/>
+          </a:p>
+        </p:txBody>
+      </p:sp>
+      <p:sp>
+        <p:nvSpPr>
+          <p:cNvPr id="4" name="Slide Number Placeholder 3"/>
+          <p:cNvSpPr>
+            <a:spLocks noGrp="1"/>
+          </p:cNvSpPr>
+          <p:nvPr>
+            <p:ph type="sldNum" sz="quarter" idx="10"/>
+          </p:nvPr>
+        </p:nvSpPr>
+        <p:spPr/>
+        <p:txBody>
+          <a:bodyPr/>
+          <a:lstStyle/>
+          <a:p>
+            <a:fld id="{7959948B-77FA-4B75-B65F-C5051F11C89F}" type="slidenum">
+              <a:rPr lang="en-US" smtClean="0"/>
+              <a:t>10</a:t>
+            </a:fld>
+            <a:endParaRPr lang="en-US"/>
+          </a:p>
+        </p:txBody>
+      </p:sp>
+    </p:spTree>
+    <p:extLst>
+      <p:ext uri="{BB962C8B-B14F-4D97-AF65-F5344CB8AC3E}">
+        <p14:creationId xmlns:p14="http://schemas.microsoft.com/office/powerpoint/2010/main" val="233165004"/>
       </p:ext>
     </p:extLst>
   </p:cSld>
@@ -1544,7 +2354,7 @@
           <a:p>
             <a:fld id="{0C0B920D-9F26-4AE8-900D-2A69C73BB646}" type="datetimeFigureOut">
               <a:rPr lang="en-US" smtClean="0"/>
-              <a:t>10/24/2016</a:t>
+              <a:t>10/31/2016</a:t>
             </a:fld>
             <a:endParaRPr lang="en-US"/>
           </a:p>
@@ -1798,7 +2608,7 @@
           <a:p>
             <a:fld id="{0C0B920D-9F26-4AE8-900D-2A69C73BB646}" type="datetimeFigureOut">
               <a:rPr lang="en-US" smtClean="0"/>
-              <a:t>10/24/2016</a:t>
+              <a:t>10/31/2016</a:t>
             </a:fld>
             <a:endParaRPr lang="en-US"/>
           </a:p>
@@ -2036,7 +2846,7 @@
           <a:p>
             <a:fld id="{0C0B920D-9F26-4AE8-900D-2A69C73BB646}" type="datetimeFigureOut">
               <a:rPr lang="en-US" smtClean="0"/>
-              <a:t>10/24/2016</a:t>
+              <a:t>10/31/2016</a:t>
             </a:fld>
             <a:endParaRPr lang="en-US"/>
           </a:p>
@@ -2357,7 +3167,7 @@
           <a:p>
             <a:fld id="{0C0B920D-9F26-4AE8-900D-2A69C73BB646}" type="datetimeFigureOut">
               <a:rPr lang="en-US" smtClean="0"/>
-              <a:t>10/24/2016</a:t>
+              <a:t>10/31/2016</a:t>
             </a:fld>
             <a:endParaRPr lang="en-US"/>
           </a:p>
@@ -2623,7 +3433,7 @@
           <a:p>
             <a:fld id="{0C0B920D-9F26-4AE8-900D-2A69C73BB646}" type="datetimeFigureOut">
               <a:rPr lang="en-US" smtClean="0"/>
-              <a:t>10/24/2016</a:t>
+              <a:t>10/31/2016</a:t>
             </a:fld>
             <a:endParaRPr lang="en-US"/>
           </a:p>
@@ -2902,7 +3712,7 @@
           <a:p>
             <a:fld id="{0C0B920D-9F26-4AE8-900D-2A69C73BB646}" type="datetimeFigureOut">
               <a:rPr lang="en-US" smtClean="0"/>
-              <a:t>10/24/2016</a:t>
+              <a:t>10/31/2016</a:t>
             </a:fld>
             <a:endParaRPr lang="en-US"/>
           </a:p>
@@ -3322,7 +4132,7 @@
           <p:nvPr/>
         </p:nvPicPr>
         <p:blipFill>
-          <a:blip r:embed="rId2" cstate="print">
+          <a:blip r:embed="rId3" cstate="print">
             <a:extLst>
               <a:ext uri="{28A0092B-C50C-407E-A947-70E740481C1C}">
                 <a14:useLocalDpi xmlns:a14="http://schemas.microsoft.com/office/drawing/2010/main" val="0"/>
@@ -3439,7 +4249,7 @@
           <p:nvPr/>
         </p:nvPicPr>
         <p:blipFill>
-          <a:blip r:embed="rId3">
+          <a:blip r:embed="rId4">
             <a:extLst>
               <a:ext uri="{28A0092B-C50C-407E-A947-70E740481C1C}">
                 <a14:useLocalDpi xmlns:a14="http://schemas.microsoft.com/office/drawing/2010/main" val="0"/>
@@ -3595,7 +4405,21 @@
                 <a:latin typeface="Courier New" panose="02070309020205020404" pitchFamily="49" charset="0"/>
                 <a:cs typeface="Courier New" panose="02070309020205020404" pitchFamily="49" charset="0"/>
               </a:rPr>
-              <a:t> --decorate –graph --all</a:t>
+              <a:t> --decorate </a:t>
+            </a:r>
+            <a:r>
+              <a:rPr lang="en-ID" sz="1200" dirty="0" smtClean="0">
+                <a:latin typeface="Courier New" panose="02070309020205020404" pitchFamily="49" charset="0"/>
+                <a:cs typeface="Courier New" panose="02070309020205020404" pitchFamily="49" charset="0"/>
+              </a:rPr>
+              <a:t>--graph </a:t>
+            </a:r>
+            <a:r>
+              <a:rPr lang="en-ID" sz="1200" dirty="0" smtClean="0">
+                <a:latin typeface="Courier New" panose="02070309020205020404" pitchFamily="49" charset="0"/>
+                <a:cs typeface="Courier New" panose="02070309020205020404" pitchFamily="49" charset="0"/>
+              </a:rPr>
+              <a:t>--all</a:t>
             </a:r>
             <a:endParaRPr lang="en-US" sz="1200" dirty="0"/>
           </a:p>
@@ -3678,7 +4502,7 @@
           <p:nvPr/>
         </p:nvPicPr>
         <p:blipFill>
-          <a:blip r:embed="rId2">
+          <a:blip r:embed="rId3">
             <a:extLst>
               <a:ext uri="{28A0092B-C50C-407E-A947-70E740481C1C}">
                 <a14:useLocalDpi xmlns:a14="http://schemas.microsoft.com/office/drawing/2010/main" val="0"/>
@@ -3888,7 +4712,7 @@
           <p:nvPr/>
         </p:nvPicPr>
         <p:blipFill>
-          <a:blip r:embed="rId3" cstate="print">
+          <a:blip r:embed="rId4" cstate="print">
             <a:extLst>
               <a:ext uri="{28A0092B-C50C-407E-A947-70E740481C1C}">
                 <a14:useLocalDpi xmlns:a14="http://schemas.microsoft.com/office/drawing/2010/main" val="0"/>
@@ -3918,7 +4742,7 @@
           <p:nvPr/>
         </p:nvPicPr>
         <p:blipFill>
-          <a:blip r:embed="rId4" cstate="print">
+          <a:blip r:embed="rId5" cstate="print">
             <a:extLst>
               <a:ext uri="{28A0092B-C50C-407E-A947-70E740481C1C}">
                 <a14:useLocalDpi xmlns:a14="http://schemas.microsoft.com/office/drawing/2010/main" val="0"/>
@@ -4058,7 +4882,7 @@
           <p:nvPr/>
         </p:nvPicPr>
         <p:blipFill>
-          <a:blip r:embed="rId2">
+          <a:blip r:embed="rId3">
             <a:extLst>
               <a:ext uri="{28A0092B-C50C-407E-A947-70E740481C1C}">
                 <a14:useLocalDpi xmlns:a14="http://schemas.microsoft.com/office/drawing/2010/main" val="0"/>
@@ -4363,21 +5187,7 @@
                 <a:latin typeface="Courier New" panose="02070309020205020404" pitchFamily="49" charset="0"/>
                 <a:cs typeface="Courier New" panose="02070309020205020404" pitchFamily="49" charset="0"/>
               </a:rPr>
-              <a:t>merge </a:t>
-            </a:r>
-            <a:r>
-              <a:rPr lang="en-ID" sz="1200" dirty="0" smtClean="0">
-                <a:latin typeface="Courier New" panose="02070309020205020404" pitchFamily="49" charset="0"/>
-                <a:cs typeface="Courier New" panose="02070309020205020404" pitchFamily="49" charset="0"/>
-              </a:rPr>
-              <a:t>&lt;branch-name</a:t>
-            </a:r>
-            <a:r>
-              <a:rPr lang="en-ID" sz="1200" dirty="0" smtClean="0">
-                <a:latin typeface="Courier New" panose="02070309020205020404" pitchFamily="49" charset="0"/>
-                <a:cs typeface="Courier New" panose="02070309020205020404" pitchFamily="49" charset="0"/>
-              </a:rPr>
-              <a:t>&gt;</a:t>
+              <a:t>merge &lt;branch-name&gt;</a:t>
             </a:r>
             <a:endParaRPr lang="en-US" sz="1200" dirty="0"/>
           </a:p>
@@ -4482,7 +5292,7 @@
           <p:nvPr/>
         </p:nvPicPr>
         <p:blipFill>
-          <a:blip r:embed="rId2">
+          <a:blip r:embed="rId3">
             <a:extLst>
               <a:ext uri="{28A0092B-C50C-407E-A947-70E740481C1C}">
                 <a14:useLocalDpi xmlns:a14="http://schemas.microsoft.com/office/drawing/2010/main" val="0"/>
@@ -5531,15 +6341,7 @@
             </a:r>
             <a:r>
               <a:rPr lang="en-US" sz="1600" dirty="0" smtClean="0"/>
-              <a:t> </a:t>
-            </a:r>
-            <a:r>
-              <a:rPr lang="en-US" sz="1600" dirty="0" smtClean="0"/>
-              <a:t>develop-branch to </a:t>
-            </a:r>
-            <a:r>
-              <a:rPr lang="en-US" sz="1600" dirty="0" smtClean="0"/>
-              <a:t>remote</a:t>
+              <a:t> develop-branch to remote</a:t>
             </a:r>
             <a:endParaRPr lang="en-ID" sz="1600" dirty="0" smtClean="0"/>
           </a:p>
@@ -6457,7 +7259,7 @@
           <p:nvPr/>
         </p:nvPicPr>
         <p:blipFill>
-          <a:blip r:embed="rId2">
+          <a:blip r:embed="rId3">
             <a:extLst>
               <a:ext uri="{28A0092B-C50C-407E-A947-70E740481C1C}">
                 <a14:useLocalDpi xmlns:a14="http://schemas.microsoft.com/office/drawing/2010/main" val="0"/>
@@ -8092,7 +8894,21 @@
                 <a:latin typeface="Courier New" panose="02070309020205020404" pitchFamily="49" charset="0"/>
                 <a:cs typeface="Courier New" panose="02070309020205020404" pitchFamily="49" charset="0"/>
               </a:rPr>
-              <a:t>$git delete –d &lt;unique-name&gt;</a:t>
+              <a:t>$git </a:t>
+            </a:r>
+            <a:r>
+              <a:rPr lang="en-ID" sz="1200" dirty="0" smtClean="0">
+                <a:latin typeface="Courier New" panose="02070309020205020404" pitchFamily="49" charset="0"/>
+                <a:cs typeface="Courier New" panose="02070309020205020404" pitchFamily="49" charset="0"/>
+              </a:rPr>
+              <a:t>branch </a:t>
+            </a:r>
+            <a:r>
+              <a:rPr lang="en-ID" sz="1200" dirty="0" smtClean="0">
+                <a:latin typeface="Courier New" panose="02070309020205020404" pitchFamily="49" charset="0"/>
+                <a:cs typeface="Courier New" panose="02070309020205020404" pitchFamily="49" charset="0"/>
+              </a:rPr>
+              <a:t>–d &lt;unique-name&gt;</a:t>
             </a:r>
             <a:endParaRPr lang="en-ID" sz="1200" dirty="0">
               <a:latin typeface="Courier New" panose="02070309020205020404" pitchFamily="49" charset="0"/>
@@ -8155,7 +8971,21 @@
                 <a:latin typeface="Courier New" panose="02070309020205020404" pitchFamily="49" charset="0"/>
                 <a:cs typeface="Courier New" panose="02070309020205020404" pitchFamily="49" charset="0"/>
               </a:rPr>
-              <a:t>commit –m “commit-message”</a:t>
+              <a:t>commit </a:t>
+            </a:r>
+            <a:r>
+              <a:rPr lang="en-ID" sz="1200" dirty="0" smtClean="0">
+                <a:latin typeface="Courier New" panose="02070309020205020404" pitchFamily="49" charset="0"/>
+                <a:cs typeface="Courier New" panose="02070309020205020404" pitchFamily="49" charset="0"/>
+              </a:rPr>
+              <a:t>–am </a:t>
+            </a:r>
+            <a:r>
+              <a:rPr lang="en-ID" sz="1200" dirty="0" smtClean="0">
+                <a:latin typeface="Courier New" panose="02070309020205020404" pitchFamily="49" charset="0"/>
+                <a:cs typeface="Courier New" panose="02070309020205020404" pitchFamily="49" charset="0"/>
+              </a:rPr>
+              <a:t>“commit-message”</a:t>
             </a:r>
             <a:endParaRPr lang="en-US" sz="1200" dirty="0"/>
           </a:p>
@@ -9092,6 +9922,21 @@
 </file>
 
 <file path=customXml/item1.xml><?xml version="1.0" encoding="utf-8"?>
+<p:properties xmlns:p="http://schemas.microsoft.com/office/2006/metadata/properties" xmlns:xsi="http://www.w3.org/2001/XMLSchema-instance" xmlns:pc="http://schemas.microsoft.com/office/infopath/2007/PartnerControls">
+  <documentManagement/>
+</p:properties>
+</file>
+
+<file path=customXml/item2.xml><?xml version="1.0" encoding="utf-8"?>
+<?mso-contentType ?>
+<FormTemplates xmlns="http://schemas.microsoft.com/sharepoint/v3/contenttype/forms">
+  <Display>DocumentLibraryForm</Display>
+  <Edit>DocumentLibraryForm</Edit>
+  <New>DocumentLibraryForm</New>
+</FormTemplates>
+</file>
+
+<file path=customXml/item3.xml><?xml version="1.0" encoding="utf-8"?>
 <ct:contentTypeSchema xmlns:ct="http://schemas.microsoft.com/office/2006/metadata/contentType" xmlns:ma="http://schemas.microsoft.com/office/2006/metadata/properties/metaAttributes" ct:_="" ma:_="" ma:contentTypeName="Document" ma:contentTypeID="0x0101003684E481DE84C9499EF0F81972D7EF96" ma:contentTypeVersion="0" ma:contentTypeDescription="Create a new document." ma:contentTypeScope="" ma:versionID="1082b6f87e9a9efb3f4dd16ca55e9303">
   <xsd:schema xmlns:xsd="http://www.w3.org/2001/XMLSchema" xmlns:xs="http://www.w3.org/2001/XMLSchema" xmlns:p="http://schemas.microsoft.com/office/2006/metadata/properties" targetNamespace="http://schemas.microsoft.com/office/2006/metadata/properties" ma:root="true" ma:fieldsID="1b05d82d297216baf5b26c55225140df">
     <xsd:element name="properties">
@@ -9205,22 +10050,30 @@
 </ct:contentTypeSchema>
 </file>
 
-<file path=customXml/item2.xml><?xml version="1.0" encoding="utf-8"?>
-<?mso-contentType ?>
-<FormTemplates xmlns="http://schemas.microsoft.com/sharepoint/v3/contenttype/forms">
-  <Display>DocumentLibraryForm</Display>
-  <Edit>DocumentLibraryForm</Edit>
-  <New>DocumentLibraryForm</New>
-</FormTemplates>
+<file path=customXml/itemProps1.xml><?xml version="1.0" encoding="utf-8"?>
+<ds:datastoreItem xmlns:ds="http://schemas.openxmlformats.org/officeDocument/2006/customXml" ds:itemID="{12B43294-76B4-4246-849F-628E6870A5FD}">
+  <ds:schemaRefs>
+    <ds:schemaRef ds:uri="http://schemas.microsoft.com/office/2006/metadata/properties"/>
+    <ds:schemaRef ds:uri="http://schemas.microsoft.com/office/2006/documentManagement/types"/>
+    <ds:schemaRef ds:uri="http://purl.org/dc/terms/"/>
+    <ds:schemaRef ds:uri="http://schemas.openxmlformats.org/package/2006/metadata/core-properties"/>
+    <ds:schemaRef ds:uri="http://purl.org/dc/dcmitype/"/>
+    <ds:schemaRef ds:uri="http://schemas.microsoft.com/office/infopath/2007/PartnerControls"/>
+    <ds:schemaRef ds:uri="http://purl.org/dc/elements/1.1/"/>
+    <ds:schemaRef ds:uri="http://www.w3.org/XML/1998/namespace"/>
+  </ds:schemaRefs>
+</ds:datastoreItem>
 </file>
 
-<file path=customXml/item3.xml><?xml version="1.0" encoding="utf-8"?>
-<p:properties xmlns:p="http://schemas.microsoft.com/office/2006/metadata/properties" xmlns:xsi="http://www.w3.org/2001/XMLSchema-instance" xmlns:pc="http://schemas.microsoft.com/office/infopath/2007/PartnerControls">
-  <documentManagement/>
-</p:properties>
+<file path=customXml/itemProps2.xml><?xml version="1.0" encoding="utf-8"?>
+<ds:datastoreItem xmlns:ds="http://schemas.openxmlformats.org/officeDocument/2006/customXml" ds:itemID="{DB5E681D-860B-4D22-80CF-C7472F8C312F}">
+  <ds:schemaRefs>
+    <ds:schemaRef ds:uri="http://schemas.microsoft.com/sharepoint/v3/contenttype/forms"/>
+  </ds:schemaRefs>
+</ds:datastoreItem>
 </file>
 
-<file path=customXml/itemProps1.xml><?xml version="1.0" encoding="utf-8"?>
+<file path=customXml/itemProps3.xml><?xml version="1.0" encoding="utf-8"?>
 <ds:datastoreItem xmlns:ds="http://schemas.openxmlformats.org/officeDocument/2006/customXml" ds:itemID="{6B82694F-752F-4827-A348-4AA5A968F420}">
   <ds:schemaRefs>
     <ds:schemaRef ds:uri="http://schemas.microsoft.com/office/2006/metadata/contentType"/>
@@ -9234,27 +10087,4 @@
     <ds:schemaRef ds:uri="http://schemas.microsoft.com/office/infopath/2007/PartnerControls"/>
   </ds:schemaRefs>
 </ds:datastoreItem>
-</file>
-
-<file path=customXml/itemProps2.xml><?xml version="1.0" encoding="utf-8"?>
-<ds:datastoreItem xmlns:ds="http://schemas.openxmlformats.org/officeDocument/2006/customXml" ds:itemID="{DB5E681D-860B-4D22-80CF-C7472F8C312F}">
-  <ds:schemaRefs>
-    <ds:schemaRef ds:uri="http://schemas.microsoft.com/sharepoint/v3/contenttype/forms"/>
-  </ds:schemaRefs>
-</ds:datastoreItem>
-</file>
-
-<file path=customXml/itemProps3.xml><?xml version="1.0" encoding="utf-8"?>
-<ds:datastoreItem xmlns:ds="http://schemas.openxmlformats.org/officeDocument/2006/customXml" ds:itemID="{12B43294-76B4-4246-849F-628E6870A5FD}">
-  <ds:schemaRefs>
-    <ds:schemaRef ds:uri="http://schemas.microsoft.com/office/2006/metadata/properties"/>
-    <ds:schemaRef ds:uri="http://schemas.microsoft.com/office/2006/documentManagement/types"/>
-    <ds:schemaRef ds:uri="http://purl.org/dc/terms/"/>
-    <ds:schemaRef ds:uri="http://schemas.openxmlformats.org/package/2006/metadata/core-properties"/>
-    <ds:schemaRef ds:uri="http://purl.org/dc/dcmitype/"/>
-    <ds:schemaRef ds:uri="http://schemas.microsoft.com/office/infopath/2007/PartnerControls"/>
-    <ds:schemaRef ds:uri="http://purl.org/dc/elements/1.1/"/>
-    <ds:schemaRef ds:uri="http://www.w3.org/XML/1998/namespace"/>
-  </ds:schemaRefs>
-</ds:datastoreItem>
 </file>
</xml_diff>

<commit_message>
kicked out E2, add git status command
</commit_message>
<xml_diff>
--- a/cdc_git_ws1.pptx
+++ b/cdc_git_ws1.pptx
@@ -5,7 +5,7 @@
     <p:sldMasterId id="2147483648" r:id="rId4"/>
   </p:sldMasterIdLst>
   <p:notesMasterIdLst>
-    <p:notesMasterId r:id="rId21"/>
+    <p:notesMasterId r:id="rId20"/>
   </p:notesMasterIdLst>
   <p:sldIdLst>
     <p:sldId id="256" r:id="rId5"/>
@@ -23,7 +23,6 @@
     <p:sldId id="304" r:id="rId17"/>
     <p:sldId id="306" r:id="rId18"/>
     <p:sldId id="309" r:id="rId19"/>
-    <p:sldId id="310" r:id="rId20"/>
   </p:sldIdLst>
   <p:sldSz cx="6858000" cy="5143500"/>
   <p:notesSz cx="6858000" cy="9144000"/>
@@ -242,7 +241,7 @@
           <a:p>
             <a:fld id="{88EB923B-AC8F-4B84-A8E4-8B1F68B80157}" type="datetimeFigureOut">
               <a:rPr lang="en-US" smtClean="0"/>
-              <a:t>10/31/2016</a:t>
+              <a:t>11/1/2016</a:t>
             </a:fld>
             <a:endParaRPr lang="en-US"/>
           </a:p>
@@ -1018,11 +1017,7 @@
             </a:pPr>
             <a:r>
               <a:rPr lang="en-US" b="0" dirty="0" smtClean="0"/>
-              <a:t>Rebasing </a:t>
-            </a:r>
-            <a:r>
-              <a:rPr lang="en-US" b="0" dirty="0" smtClean="0"/>
-              <a:t>Deletes Merge Commits!</a:t>
+              <a:t>Rebasing Deletes Merge Commits!</a:t>
             </a:r>
           </a:p>
           <a:p>
@@ -1136,10 +1131,6 @@
           <a:bodyPr/>
           <a:lstStyle/>
           <a:p>
-            <a:r>
-              <a:rPr lang="en-ID" dirty="0" smtClean="0"/>
-              <a:t>- If time is short, skip E2</a:t>
-            </a:r>
             <a:endParaRPr lang="en-US" dirty="0"/>
           </a:p>
         </p:txBody>
@@ -1171,125 +1162,6 @@
     <p:extLst>
       <p:ext uri="{BB962C8B-B14F-4D97-AF65-F5344CB8AC3E}">
         <p14:creationId xmlns:p14="http://schemas.microsoft.com/office/powerpoint/2010/main" val="647520961"/>
-      </p:ext>
-    </p:extLst>
-  </p:cSld>
-  <p:clrMapOvr>
-    <a:masterClrMapping/>
-  </p:clrMapOvr>
-</p:notes>
-</file>
-
-<file path=ppt/notesSlides/notesSlide15.xml><?xml version="1.0" encoding="utf-8"?>
-<p:notes xmlns:a="http://schemas.openxmlformats.org/drawingml/2006/main" xmlns:r="http://schemas.openxmlformats.org/officeDocument/2006/relationships" xmlns:p="http://schemas.openxmlformats.org/presentationml/2006/main">
-  <p:cSld>
-    <p:spTree>
-      <p:nvGrpSpPr>
-        <p:cNvPr id="1" name=""/>
-        <p:cNvGrpSpPr/>
-        <p:nvPr/>
-      </p:nvGrpSpPr>
-      <p:grpSpPr>
-        <a:xfrm>
-          <a:off x="0" y="0"/>
-          <a:ext cx="0" cy="0"/>
-          <a:chOff x="0" y="0"/>
-          <a:chExt cx="0" cy="0"/>
-        </a:xfrm>
-      </p:grpSpPr>
-      <p:sp>
-        <p:nvSpPr>
-          <p:cNvPr id="2" name="Slide Image Placeholder 1"/>
-          <p:cNvSpPr>
-            <a:spLocks noGrp="1" noRot="1" noChangeAspect="1"/>
-          </p:cNvSpPr>
-          <p:nvPr>
-            <p:ph type="sldImg"/>
-          </p:nvPr>
-        </p:nvSpPr>
-        <p:spPr/>
-      </p:sp>
-      <p:sp>
-        <p:nvSpPr>
-          <p:cNvPr id="3" name="Notes Placeholder 2"/>
-          <p:cNvSpPr>
-            <a:spLocks noGrp="1"/>
-          </p:cNvSpPr>
-          <p:nvPr>
-            <p:ph type="body" idx="1"/>
-          </p:nvPr>
-        </p:nvSpPr>
-        <p:spPr/>
-        <p:txBody>
-          <a:bodyPr/>
-          <a:lstStyle/>
-          <a:p>
-            <a:r>
-              <a:rPr lang="en-ID" dirty="0" smtClean="0"/>
-              <a:t>$git push -u origin feature-branch</a:t>
-            </a:r>
-          </a:p>
-          <a:p>
-            <a:r>
-              <a:rPr lang="en-US" dirty="0" smtClean="0"/>
-              <a:t>$git push origin feature-branch</a:t>
-            </a:r>
-          </a:p>
-          <a:p>
-            <a:endParaRPr lang="en-ID" dirty="0" smtClean="0"/>
-          </a:p>
-          <a:p>
-            <a:r>
-              <a:rPr lang="en-ID" dirty="0" smtClean="0"/>
-              <a:t>To check if branch is deleted on</a:t>
-            </a:r>
-            <a:r>
-              <a:rPr lang="en-ID" baseline="0" dirty="0" smtClean="0"/>
-              <a:t> remote and sync on local:</a:t>
-            </a:r>
-          </a:p>
-          <a:p>
-            <a:r>
-              <a:rPr lang="en-ID" baseline="0" dirty="0" smtClean="0"/>
-              <a:t>$git fetch –f</a:t>
-            </a:r>
-          </a:p>
-          <a:p>
-            <a:r>
-              <a:rPr lang="en-ID" baseline="0" dirty="0" smtClean="0"/>
-              <a:t>$git branch –a/-r</a:t>
-            </a:r>
-            <a:endParaRPr lang="en-US" dirty="0"/>
-          </a:p>
-        </p:txBody>
-      </p:sp>
-      <p:sp>
-        <p:nvSpPr>
-          <p:cNvPr id="4" name="Slide Number Placeholder 3"/>
-          <p:cNvSpPr>
-            <a:spLocks noGrp="1"/>
-          </p:cNvSpPr>
-          <p:nvPr>
-            <p:ph type="sldNum" sz="quarter" idx="10"/>
-          </p:nvPr>
-        </p:nvSpPr>
-        <p:spPr/>
-        <p:txBody>
-          <a:bodyPr/>
-          <a:lstStyle/>
-          <a:p>
-            <a:fld id="{7959948B-77FA-4B75-B65F-C5051F11C89F}" type="slidenum">
-              <a:rPr lang="en-US" smtClean="0"/>
-              <a:t>16</a:t>
-            </a:fld>
-            <a:endParaRPr lang="en-US"/>
-          </a:p>
-        </p:txBody>
-      </p:sp>
-    </p:spTree>
-    <p:extLst>
-      <p:ext uri="{BB962C8B-B14F-4D97-AF65-F5344CB8AC3E}">
-        <p14:creationId xmlns:p14="http://schemas.microsoft.com/office/powerpoint/2010/main" val="1837064347"/>
       </p:ext>
     </p:extLst>
   </p:cSld>
@@ -1849,6 +1721,14 @@
           <a:bodyPr/>
           <a:lstStyle/>
           <a:p>
+            <a:r>
+              <a:rPr lang="en-ID" dirty="0" smtClean="0"/>
+              <a:t>- Remember that the URL will</a:t>
+            </a:r>
+            <a:r>
+              <a:rPr lang="en-ID" baseline="0" dirty="0" smtClean="0"/>
+              <a:t> be different! </a:t>
+            </a:r>
             <a:endParaRPr lang="en-US" dirty="0"/>
           </a:p>
         </p:txBody>
@@ -1972,11 +1852,7 @@
             </a:r>
             <a:r>
               <a:rPr lang="en-ID" baseline="0" dirty="0" smtClean="0"/>
-              <a:t> forget to push back </a:t>
-            </a:r>
-            <a:r>
-              <a:rPr lang="en-ID" baseline="0" dirty="0" smtClean="0"/>
-              <a:t>…</a:t>
+              <a:t> forget to push back …</a:t>
             </a:r>
           </a:p>
           <a:p>
@@ -2354,7 +2230,7 @@
           <a:p>
             <a:fld id="{0C0B920D-9F26-4AE8-900D-2A69C73BB646}" type="datetimeFigureOut">
               <a:rPr lang="en-US" smtClean="0"/>
-              <a:t>10/31/2016</a:t>
+              <a:t>11/1/2016</a:t>
             </a:fld>
             <a:endParaRPr lang="en-US"/>
           </a:p>
@@ -2608,7 +2484,7 @@
           <a:p>
             <a:fld id="{0C0B920D-9F26-4AE8-900D-2A69C73BB646}" type="datetimeFigureOut">
               <a:rPr lang="en-US" smtClean="0"/>
-              <a:t>10/31/2016</a:t>
+              <a:t>11/1/2016</a:t>
             </a:fld>
             <a:endParaRPr lang="en-US"/>
           </a:p>
@@ -2846,7 +2722,7 @@
           <a:p>
             <a:fld id="{0C0B920D-9F26-4AE8-900D-2A69C73BB646}" type="datetimeFigureOut">
               <a:rPr lang="en-US" smtClean="0"/>
-              <a:t>10/31/2016</a:t>
+              <a:t>11/1/2016</a:t>
             </a:fld>
             <a:endParaRPr lang="en-US"/>
           </a:p>
@@ -3167,7 +3043,7 @@
           <a:p>
             <a:fld id="{0C0B920D-9F26-4AE8-900D-2A69C73BB646}" type="datetimeFigureOut">
               <a:rPr lang="en-US" smtClean="0"/>
-              <a:t>10/31/2016</a:t>
+              <a:t>11/1/2016</a:t>
             </a:fld>
             <a:endParaRPr lang="en-US"/>
           </a:p>
@@ -3433,7 +3309,7 @@
           <a:p>
             <a:fld id="{0C0B920D-9F26-4AE8-900D-2A69C73BB646}" type="datetimeFigureOut">
               <a:rPr lang="en-US" smtClean="0"/>
-              <a:t>10/31/2016</a:t>
+              <a:t>11/1/2016</a:t>
             </a:fld>
             <a:endParaRPr lang="en-US"/>
           </a:p>
@@ -3712,7 +3588,7 @@
           <a:p>
             <a:fld id="{0C0B920D-9F26-4AE8-900D-2A69C73BB646}" type="datetimeFigureOut">
               <a:rPr lang="en-US" smtClean="0"/>
-              <a:t>10/31/2016</a:t>
+              <a:t>11/1/2016</a:t>
             </a:fld>
             <a:endParaRPr lang="en-US"/>
           </a:p>
@@ -4405,21 +4281,7 @@
                 <a:latin typeface="Courier New" panose="02070309020205020404" pitchFamily="49" charset="0"/>
                 <a:cs typeface="Courier New" panose="02070309020205020404" pitchFamily="49" charset="0"/>
               </a:rPr>
-              <a:t> --decorate </a:t>
-            </a:r>
-            <a:r>
-              <a:rPr lang="en-ID" sz="1200" dirty="0" smtClean="0">
-                <a:latin typeface="Courier New" panose="02070309020205020404" pitchFamily="49" charset="0"/>
-                <a:cs typeface="Courier New" panose="02070309020205020404" pitchFamily="49" charset="0"/>
-              </a:rPr>
-              <a:t>--graph </a:t>
-            </a:r>
-            <a:r>
-              <a:rPr lang="en-ID" sz="1200" dirty="0" smtClean="0">
-                <a:latin typeface="Courier New" panose="02070309020205020404" pitchFamily="49" charset="0"/>
-                <a:cs typeface="Courier New" panose="02070309020205020404" pitchFamily="49" charset="0"/>
-              </a:rPr>
-              <a:t>--all</a:t>
+              <a:t> --decorate --graph --all</a:t>
             </a:r>
             <a:endParaRPr lang="en-US" sz="1200" dirty="0"/>
           </a:p>
@@ -5460,7 +5322,14 @@
                 <a:latin typeface="Courier New" panose="02070309020205020404" pitchFamily="49" charset="0"/>
                 <a:cs typeface="Courier New" panose="02070309020205020404" pitchFamily="49" charset="0"/>
               </a:rPr>
-              <a:t>merge --no-</a:t>
+              <a:t>merge </a:t>
+            </a:r>
+            <a:r>
+              <a:rPr lang="en-ID" sz="1200" dirty="0" smtClean="0">
+                <a:latin typeface="Courier New" panose="02070309020205020404" pitchFamily="49" charset="0"/>
+                <a:cs typeface="Courier New" panose="02070309020205020404" pitchFamily="49" charset="0"/>
+              </a:rPr>
+              <a:t>--no-</a:t>
             </a:r>
             <a:r>
               <a:rPr lang="en-ID" sz="1200" dirty="0" err="1" smtClean="0">
@@ -5474,7 +5343,14 @@
                 <a:latin typeface="Courier New" panose="02070309020205020404" pitchFamily="49" charset="0"/>
                 <a:cs typeface="Courier New" panose="02070309020205020404" pitchFamily="49" charset="0"/>
               </a:rPr>
-              <a:t> &lt;branch-name&gt;</a:t>
+              <a:t> &lt;</a:t>
+            </a:r>
+            <a:r>
+              <a:rPr lang="en-ID" sz="1200" dirty="0" smtClean="0">
+                <a:latin typeface="Courier New" panose="02070309020205020404" pitchFamily="49" charset="0"/>
+                <a:cs typeface="Courier New" panose="02070309020205020404" pitchFamily="49" charset="0"/>
+              </a:rPr>
+              <a:t>branch-name&gt;</a:t>
             </a:r>
             <a:endParaRPr lang="en-US" sz="1200" dirty="0"/>
           </a:p>
@@ -6186,14 +6062,14 @@
       </p:sp>
       <p:sp>
         <p:nvSpPr>
-          <p:cNvPr id="10" name="TextBox 9"/>
+          <p:cNvPr id="11" name="TextBox 10"/>
           <p:cNvSpPr txBox="1"/>
           <p:nvPr/>
         </p:nvSpPr>
         <p:spPr>
           <a:xfrm>
-            <a:off x="485056" y="2794325"/>
-            <a:ext cx="5904656" cy="1569660"/>
+            <a:off x="485056" y="923950"/>
+            <a:ext cx="5680248" cy="1569660"/>
           </a:xfrm>
           <a:prstGeom prst="rect">
             <a:avLst/>
@@ -6208,7 +6084,7 @@
           <a:p>
             <a:r>
               <a:rPr lang="en-ID" sz="1600" dirty="0" smtClean="0"/>
-              <a:t>Exercise 2 – Merge Strategy - FF.</a:t>
+              <a:t>Exercise 1 – Merge strategy - recursive.</a:t>
             </a:r>
           </a:p>
           <a:p>
@@ -6248,7 +6124,7 @@
             </a:pPr>
             <a:r>
               <a:rPr lang="en-ID" sz="1600" dirty="0" smtClean="0"/>
-              <a:t>Merge back to develop with fast-forward (check history)</a:t>
+              <a:t>Merge back to develop with recursive- strategy (check history)</a:t>
             </a:r>
           </a:p>
           <a:p>
@@ -6265,14 +6141,14 @@
       </p:sp>
       <p:sp>
         <p:nvSpPr>
-          <p:cNvPr id="11" name="TextBox 10"/>
+          <p:cNvPr id="6" name="TextBox 5"/>
           <p:cNvSpPr txBox="1"/>
           <p:nvPr/>
         </p:nvSpPr>
         <p:spPr>
           <a:xfrm>
-            <a:off x="485056" y="923950"/>
-            <a:ext cx="5680248" cy="1815882"/>
+            <a:off x="485056" y="2493610"/>
+            <a:ext cx="5904656" cy="2062103"/>
           </a:xfrm>
           <a:prstGeom prst="rect">
             <a:avLst/>
@@ -6287,7 +6163,15 @@
           <a:p>
             <a:r>
               <a:rPr lang="en-ID" sz="1600" dirty="0" smtClean="0"/>
-              <a:t>Exercise 1 – Merge strategy - recursive.</a:t>
+              <a:t>Exercise </a:t>
+            </a:r>
+            <a:r>
+              <a:rPr lang="en-ID" sz="1600" dirty="0" smtClean="0"/>
+              <a:t>2 </a:t>
+            </a:r>
+            <a:r>
+              <a:rPr lang="en-ID" sz="1600" dirty="0" smtClean="0"/>
+              <a:t>– Working with remote feature branch:</a:t>
             </a:r>
           </a:p>
           <a:p>
@@ -6327,7 +6211,15 @@
             </a:pPr>
             <a:r>
               <a:rPr lang="en-ID" sz="1600" dirty="0" smtClean="0"/>
-              <a:t>Merge back to develop with recursive- strategy (check history)</a:t>
+              <a:t>Publish feature-branch to remote (check on </a:t>
+            </a:r>
+            <a:r>
+              <a:rPr lang="en-ID" sz="1600" dirty="0" err="1" smtClean="0"/>
+              <a:t>github</a:t>
+            </a:r>
+            <a:r>
+              <a:rPr lang="en-ID" sz="1600" dirty="0" smtClean="0"/>
+              <a:t>)</a:t>
             </a:r>
           </a:p>
           <a:p>
@@ -6337,13 +6229,8 @@
             </a:pPr>
             <a:r>
               <a:rPr lang="en-ID" sz="1600" dirty="0" smtClean="0"/>
-              <a:t>Publish</a:t>
-            </a:r>
-            <a:r>
-              <a:rPr lang="en-US" sz="1600" dirty="0" smtClean="0"/>
-              <a:t> develop-branch to remote</a:t>
-            </a:r>
-            <a:endParaRPr lang="en-ID" sz="1600" dirty="0" smtClean="0"/>
+              <a:t>Merge back to develop with recursive- strategy</a:t>
+            </a:r>
           </a:p>
           <a:p>
             <a:pPr marL="285750" indent="-285750">
@@ -6351,8 +6238,22 @@
               <a:buChar char="•"/>
             </a:pPr>
             <a:r>
+              <a:rPr lang="en-ID" sz="1600" dirty="0"/>
+              <a:t>Publish </a:t>
+            </a:r>
+            <a:r>
               <a:rPr lang="en-ID" sz="1600" dirty="0" smtClean="0"/>
-              <a:t>Delete feature-branch</a:t>
+              <a:t>to remote</a:t>
+            </a:r>
+          </a:p>
+          <a:p>
+            <a:pPr marL="285750" indent="-285750">
+              <a:buFont typeface="Arial" panose="020B0604020202020204" pitchFamily="34" charset="0"/>
+              <a:buChar char="•"/>
+            </a:pPr>
+            <a:r>
+              <a:rPr lang="en-ID" sz="1600" dirty="0" smtClean="0"/>
+              <a:t>Delete remote- feature-branch</a:t>
             </a:r>
           </a:p>
         </p:txBody>
@@ -6361,188 +6262,6 @@
     <p:extLst>
       <p:ext uri="{BB962C8B-B14F-4D97-AF65-F5344CB8AC3E}">
         <p14:creationId xmlns:p14="http://schemas.microsoft.com/office/powerpoint/2010/main" val="3693267280"/>
-      </p:ext>
-    </p:extLst>
-  </p:cSld>
-  <p:clrMapOvr>
-    <a:masterClrMapping/>
-  </p:clrMapOvr>
-  <p:timing>
-    <p:tnLst>
-      <p:par>
-        <p:cTn id="1" dur="indefinite" restart="never" nodeType="tmRoot"/>
-      </p:par>
-    </p:tnLst>
-  </p:timing>
-</p:sld>
-</file>
-
-<file path=ppt/slides/slide16.xml><?xml version="1.0" encoding="utf-8"?>
-<p:sld xmlns:a="http://schemas.openxmlformats.org/drawingml/2006/main" xmlns:r="http://schemas.openxmlformats.org/officeDocument/2006/relationships" xmlns:p="http://schemas.openxmlformats.org/presentationml/2006/main">
-  <p:cSld>
-    <p:spTree>
-      <p:nvGrpSpPr>
-        <p:cNvPr id="1" name=""/>
-        <p:cNvGrpSpPr/>
-        <p:nvPr/>
-      </p:nvGrpSpPr>
-      <p:grpSpPr>
-        <a:xfrm>
-          <a:off x="0" y="0"/>
-          <a:ext cx="0" cy="0"/>
-          <a:chOff x="0" y="0"/>
-          <a:chExt cx="0" cy="0"/>
-        </a:xfrm>
-      </p:grpSpPr>
-      <p:sp>
-        <p:nvSpPr>
-          <p:cNvPr id="5" name="TextBox 4"/>
-          <p:cNvSpPr txBox="1"/>
-          <p:nvPr/>
-        </p:nvSpPr>
-        <p:spPr>
-          <a:xfrm>
-            <a:off x="332656" y="195486"/>
-            <a:ext cx="5976664" cy="369332"/>
-          </a:xfrm>
-          <a:prstGeom prst="rect">
-            <a:avLst/>
-          </a:prstGeom>
-          <a:noFill/>
-        </p:spPr>
-        <p:txBody>
-          <a:bodyPr wrap="square" rtlCol="0">
-            <a:spAutoFit/>
-          </a:bodyPr>
-          <a:lstStyle/>
-          <a:p>
-            <a:r>
-              <a:rPr lang="en-ID" b="1" dirty="0" smtClean="0">
-                <a:solidFill>
-                  <a:srgbClr val="392900"/>
-                </a:solidFill>
-                <a:latin typeface="Bookman Old Style" panose="02050604050505020204" pitchFamily="18" charset="0"/>
-              </a:rPr>
-              <a:t>CDC – git merging / Part V – “Practice” </a:t>
-            </a:r>
-          </a:p>
-        </p:txBody>
-      </p:sp>
-      <p:sp>
-        <p:nvSpPr>
-          <p:cNvPr id="11" name="TextBox 10"/>
-          <p:cNvSpPr txBox="1"/>
-          <p:nvPr/>
-        </p:nvSpPr>
-        <p:spPr>
-          <a:xfrm>
-            <a:off x="485056" y="923950"/>
-            <a:ext cx="5904656" cy="2062103"/>
-          </a:xfrm>
-          <a:prstGeom prst="rect">
-            <a:avLst/>
-          </a:prstGeom>
-          <a:noFill/>
-        </p:spPr>
-        <p:txBody>
-          <a:bodyPr wrap="square" rtlCol="0">
-            <a:spAutoFit/>
-          </a:bodyPr>
-          <a:lstStyle/>
-          <a:p>
-            <a:r>
-              <a:rPr lang="en-ID" sz="1600" dirty="0" smtClean="0"/>
-              <a:t>Exercise 3 – Working with remote feature branch:</a:t>
-            </a:r>
-          </a:p>
-          <a:p>
-            <a:pPr marL="285750" indent="-285750">
-              <a:buFont typeface="Arial" panose="020B0604020202020204" pitchFamily="34" charset="0"/>
-              <a:buChar char="•"/>
-            </a:pPr>
-            <a:r>
-              <a:rPr lang="en-ID" sz="1600" dirty="0" smtClean="0"/>
-              <a:t>Clone repository with branch develop</a:t>
-            </a:r>
-          </a:p>
-          <a:p>
-            <a:pPr marL="285750" indent="-285750">
-              <a:buFont typeface="Arial" panose="020B0604020202020204" pitchFamily="34" charset="0"/>
-              <a:buChar char="•"/>
-            </a:pPr>
-            <a:r>
-              <a:rPr lang="en-ID" sz="1600" dirty="0" smtClean="0"/>
-              <a:t>Create local feature-branch</a:t>
-            </a:r>
-          </a:p>
-          <a:p>
-            <a:pPr marL="285750" indent="-285750">
-              <a:buFont typeface="Arial" panose="020B0604020202020204" pitchFamily="34" charset="0"/>
-              <a:buChar char="•"/>
-            </a:pPr>
-            <a:r>
-              <a:rPr lang="en-ID" sz="1600" dirty="0" smtClean="0"/>
-              <a:t>Change/Edit/Add and commit </a:t>
-            </a:r>
-          </a:p>
-          <a:p>
-            <a:pPr marL="285750" indent="-285750">
-              <a:buFont typeface="Arial" panose="020B0604020202020204" pitchFamily="34" charset="0"/>
-              <a:buChar char="•"/>
-            </a:pPr>
-            <a:r>
-              <a:rPr lang="en-ID" sz="1600" dirty="0" smtClean="0"/>
-              <a:t>Publish feature-branch to remote (check on </a:t>
-            </a:r>
-            <a:r>
-              <a:rPr lang="en-ID" sz="1600" dirty="0" err="1" smtClean="0"/>
-              <a:t>github</a:t>
-            </a:r>
-            <a:r>
-              <a:rPr lang="en-ID" sz="1600" dirty="0" smtClean="0"/>
-              <a:t>)</a:t>
-            </a:r>
-          </a:p>
-          <a:p>
-            <a:pPr marL="285750" indent="-285750">
-              <a:buFont typeface="Arial" panose="020B0604020202020204" pitchFamily="34" charset="0"/>
-              <a:buChar char="•"/>
-            </a:pPr>
-            <a:r>
-              <a:rPr lang="en-ID" sz="1600" dirty="0" smtClean="0"/>
-              <a:t>Merge back to develop with recursive- strategy</a:t>
-            </a:r>
-          </a:p>
-          <a:p>
-            <a:pPr marL="285750" indent="-285750">
-              <a:buFont typeface="Arial" panose="020B0604020202020204" pitchFamily="34" charset="0"/>
-              <a:buChar char="•"/>
-            </a:pPr>
-            <a:r>
-              <a:rPr lang="en-ID" sz="1600" dirty="0"/>
-              <a:t>Publish </a:t>
-            </a:r>
-            <a:r>
-              <a:rPr lang="en-ID" sz="1600" dirty="0" smtClean="0"/>
-              <a:t>to remote</a:t>
-            </a:r>
-          </a:p>
-          <a:p>
-            <a:pPr marL="285750" indent="-285750">
-              <a:buFont typeface="Arial" panose="020B0604020202020204" pitchFamily="34" charset="0"/>
-              <a:buChar char="•"/>
-            </a:pPr>
-            <a:r>
-              <a:rPr lang="en-ID" sz="1600" dirty="0" smtClean="0"/>
-              <a:t>Delete remote- feature-branch</a:t>
-            </a:r>
-          </a:p>
-        </p:txBody>
-      </p:sp>
-    </p:spTree>
-    <p:extLst>
-      <p:ext uri="{BB962C8B-B14F-4D97-AF65-F5344CB8AC3E}">
-        <p14:creationId xmlns:p14="http://schemas.microsoft.com/office/powerpoint/2010/main" val="555219424"/>
       </p:ext>
     </p:extLst>
   </p:cSld>
@@ -8894,21 +8613,7 @@
                 <a:latin typeface="Courier New" panose="02070309020205020404" pitchFamily="49" charset="0"/>
                 <a:cs typeface="Courier New" panose="02070309020205020404" pitchFamily="49" charset="0"/>
               </a:rPr>
-              <a:t>$git </a:t>
-            </a:r>
-            <a:r>
-              <a:rPr lang="en-ID" sz="1200" dirty="0" smtClean="0">
-                <a:latin typeface="Courier New" panose="02070309020205020404" pitchFamily="49" charset="0"/>
-                <a:cs typeface="Courier New" panose="02070309020205020404" pitchFamily="49" charset="0"/>
-              </a:rPr>
-              <a:t>branch </a:t>
-            </a:r>
-            <a:r>
-              <a:rPr lang="en-ID" sz="1200" dirty="0" smtClean="0">
-                <a:latin typeface="Courier New" panose="02070309020205020404" pitchFamily="49" charset="0"/>
-                <a:cs typeface="Courier New" panose="02070309020205020404" pitchFamily="49" charset="0"/>
-              </a:rPr>
-              <a:t>–d &lt;unique-name&gt;</a:t>
+              <a:t>$git branch –d &lt;unique-name&gt;</a:t>
             </a:r>
             <a:endParaRPr lang="en-ID" sz="1200" dirty="0">
               <a:latin typeface="Courier New" panose="02070309020205020404" pitchFamily="49" charset="0"/>
@@ -8926,7 +8631,7 @@
         <p:spPr>
           <a:xfrm>
             <a:off x="332656" y="1319557"/>
-            <a:ext cx="3168352" cy="276999"/>
+            <a:ext cx="3168352" cy="461665"/>
           </a:xfrm>
           <a:prstGeom prst="rect">
             <a:avLst/>
@@ -8953,10 +8658,26 @@
           <a:lstStyle/>
           <a:p>
             <a:r>
+              <a:rPr lang="en-ID" sz="1200" dirty="0">
+                <a:latin typeface="Courier New" panose="02070309020205020404" pitchFamily="49" charset="0"/>
+                <a:cs typeface="Courier New" panose="02070309020205020404" pitchFamily="49" charset="0"/>
+              </a:rPr>
+              <a:t>$</a:t>
+            </a:r>
+            <a:r>
               <a:rPr lang="en-ID" sz="1200" dirty="0" smtClean="0">
                 <a:latin typeface="Courier New" panose="02070309020205020404" pitchFamily="49" charset="0"/>
                 <a:cs typeface="Courier New" panose="02070309020205020404" pitchFamily="49" charset="0"/>
               </a:rPr>
+              <a:t>git status</a:t>
+            </a:r>
+          </a:p>
+          <a:p>
+            <a:r>
+              <a:rPr lang="en-ID" sz="1200" dirty="0" smtClean="0">
+                <a:latin typeface="Courier New" panose="02070309020205020404" pitchFamily="49" charset="0"/>
+                <a:cs typeface="Courier New" panose="02070309020205020404" pitchFamily="49" charset="0"/>
+              </a:rPr>
               <a:t>$</a:t>
             </a:r>
             <a:r>
@@ -8971,21 +8692,7 @@
                 <a:latin typeface="Courier New" panose="02070309020205020404" pitchFamily="49" charset="0"/>
                 <a:cs typeface="Courier New" panose="02070309020205020404" pitchFamily="49" charset="0"/>
               </a:rPr>
-              <a:t>commit </a:t>
-            </a:r>
-            <a:r>
-              <a:rPr lang="en-ID" sz="1200" dirty="0" smtClean="0">
-                <a:latin typeface="Courier New" panose="02070309020205020404" pitchFamily="49" charset="0"/>
-                <a:cs typeface="Courier New" panose="02070309020205020404" pitchFamily="49" charset="0"/>
-              </a:rPr>
-              <a:t>–am </a:t>
-            </a:r>
-            <a:r>
-              <a:rPr lang="en-ID" sz="1200" dirty="0" smtClean="0">
-                <a:latin typeface="Courier New" panose="02070309020205020404" pitchFamily="49" charset="0"/>
-                <a:cs typeface="Courier New" panose="02070309020205020404" pitchFamily="49" charset="0"/>
-              </a:rPr>
-              <a:t>“commit-message”</a:t>
+              <a:t>commit –am “commit-message”</a:t>
             </a:r>
             <a:endParaRPr lang="en-US" sz="1200" dirty="0"/>
           </a:p>
@@ -9253,7 +8960,7 @@
         </p:nvSpPr>
         <p:spPr>
           <a:xfrm>
-            <a:off x="919219" y="1793051"/>
+            <a:off x="952189" y="2059506"/>
             <a:ext cx="1970539" cy="307777"/>
           </a:xfrm>
           <a:prstGeom prst="rect">
@@ -9307,7 +9014,7 @@
         </p:blipFill>
         <p:spPr>
           <a:xfrm>
-            <a:off x="328932" y="1640940"/>
+            <a:off x="324506" y="1907395"/>
             <a:ext cx="612000" cy="612000"/>
           </a:xfrm>
           <a:prstGeom prst="rect">
@@ -9922,18 +9629,18 @@
 </file>
 
 <file path=customXml/item1.xml><?xml version="1.0" encoding="utf-8"?>
-<p:properties xmlns:p="http://schemas.microsoft.com/office/2006/metadata/properties" xmlns:xsi="http://www.w3.org/2001/XMLSchema-instance" xmlns:pc="http://schemas.microsoft.com/office/infopath/2007/PartnerControls">
-  <documentManagement/>
-</p:properties>
-</file>
-
-<file path=customXml/item2.xml><?xml version="1.0" encoding="utf-8"?>
 <?mso-contentType ?>
 <FormTemplates xmlns="http://schemas.microsoft.com/sharepoint/v3/contenttype/forms">
   <Display>DocumentLibraryForm</Display>
   <Edit>DocumentLibraryForm</Edit>
   <New>DocumentLibraryForm</New>
 </FormTemplates>
+</file>
+
+<file path=customXml/item2.xml><?xml version="1.0" encoding="utf-8"?>
+<p:properties xmlns:p="http://schemas.microsoft.com/office/2006/metadata/properties" xmlns:xsi="http://www.w3.org/2001/XMLSchema-instance" xmlns:pc="http://schemas.microsoft.com/office/infopath/2007/PartnerControls">
+  <documentManagement/>
+</p:properties>
 </file>
 
 <file path=customXml/item3.xml><?xml version="1.0" encoding="utf-8"?>
@@ -10051,6 +9758,14 @@
 </file>
 
 <file path=customXml/itemProps1.xml><?xml version="1.0" encoding="utf-8"?>
+<ds:datastoreItem xmlns:ds="http://schemas.openxmlformats.org/officeDocument/2006/customXml" ds:itemID="{DB5E681D-860B-4D22-80CF-C7472F8C312F}">
+  <ds:schemaRefs>
+    <ds:schemaRef ds:uri="http://schemas.microsoft.com/sharepoint/v3/contenttype/forms"/>
+  </ds:schemaRefs>
+</ds:datastoreItem>
+</file>
+
+<file path=customXml/itemProps2.xml><?xml version="1.0" encoding="utf-8"?>
 <ds:datastoreItem xmlns:ds="http://schemas.openxmlformats.org/officeDocument/2006/customXml" ds:itemID="{12B43294-76B4-4246-849F-628E6870A5FD}">
   <ds:schemaRefs>
     <ds:schemaRef ds:uri="http://schemas.microsoft.com/office/2006/metadata/properties"/>
@@ -10061,14 +9776,6 @@
     <ds:schemaRef ds:uri="http://schemas.microsoft.com/office/infopath/2007/PartnerControls"/>
     <ds:schemaRef ds:uri="http://purl.org/dc/elements/1.1/"/>
     <ds:schemaRef ds:uri="http://www.w3.org/XML/1998/namespace"/>
-  </ds:schemaRefs>
-</ds:datastoreItem>
-</file>
-
-<file path=customXml/itemProps2.xml><?xml version="1.0" encoding="utf-8"?>
-<ds:datastoreItem xmlns:ds="http://schemas.openxmlformats.org/officeDocument/2006/customXml" ds:itemID="{DB5E681D-860B-4D22-80CF-C7472F8C312F}">
-  <ds:schemaRefs>
-    <ds:schemaRef ds:uri="http://schemas.microsoft.com/sharepoint/v3/contenttype/forms"/>
   </ds:schemaRefs>
 </ds:datastoreItem>
 </file>

</xml_diff>